<commit_message>
updated diagrams and ppt
updated kafka and diagrams
</commit_message>
<xml_diff>
--- a/PPT/Kafka-Teaching-Flow.pptx
+++ b/PPT/Kafka-Teaching-Flow.pptx
@@ -64,6 +64,11 @@
     <p:sldId id="319" r:id="rId58"/>
     <p:sldId id="320" r:id="rId59"/>
     <p:sldId id="318" r:id="rId60"/>
+    <p:sldId id="321" r:id="rId61"/>
+    <p:sldId id="322" r:id="rId62"/>
+    <p:sldId id="323" r:id="rId63"/>
+    <p:sldId id="324" r:id="rId64"/>
+    <p:sldId id="326" r:id="rId65"/>
   </p:sldIdLst>
   <p:sldSz cx="9144000" cy="6858000" type="screen4x3"/>
   <p:notesSz cx="6858000" cy="9144000"/>
@@ -346,7 +351,7 @@
           <a:p>
             <a:fld id="{51149E06-0874-4241-ABF9-BAFA45916F2C}" type="datetimeFigureOut">
               <a:rPr lang="en-US" smtClean="0"/>
-              <a:t>3/6/2023</a:t>
+              <a:t>3/8/2023</a:t>
             </a:fld>
             <a:endParaRPr lang="en-US"/>
           </a:p>
@@ -516,7 +521,7 @@
           <a:p>
             <a:fld id="{51149E06-0874-4241-ABF9-BAFA45916F2C}" type="datetimeFigureOut">
               <a:rPr lang="en-US" smtClean="0"/>
-              <a:t>3/6/2023</a:t>
+              <a:t>3/8/2023</a:t>
             </a:fld>
             <a:endParaRPr lang="en-US"/>
           </a:p>
@@ -696,7 +701,7 @@
           <a:p>
             <a:fld id="{51149E06-0874-4241-ABF9-BAFA45916F2C}" type="datetimeFigureOut">
               <a:rPr lang="en-US" smtClean="0"/>
-              <a:t>3/6/2023</a:t>
+              <a:t>3/8/2023</a:t>
             </a:fld>
             <a:endParaRPr lang="en-US"/>
           </a:p>
@@ -866,7 +871,7 @@
           <a:p>
             <a:fld id="{51149E06-0874-4241-ABF9-BAFA45916F2C}" type="datetimeFigureOut">
               <a:rPr lang="en-US" smtClean="0"/>
-              <a:t>3/6/2023</a:t>
+              <a:t>3/8/2023</a:t>
             </a:fld>
             <a:endParaRPr lang="en-US"/>
           </a:p>
@@ -1112,7 +1117,7 @@
           <a:p>
             <a:fld id="{51149E06-0874-4241-ABF9-BAFA45916F2C}" type="datetimeFigureOut">
               <a:rPr lang="en-US" smtClean="0"/>
-              <a:t>3/6/2023</a:t>
+              <a:t>3/8/2023</a:t>
             </a:fld>
             <a:endParaRPr lang="en-US"/>
           </a:p>
@@ -1400,7 +1405,7 @@
           <a:p>
             <a:fld id="{51149E06-0874-4241-ABF9-BAFA45916F2C}" type="datetimeFigureOut">
               <a:rPr lang="en-US" smtClean="0"/>
-              <a:t>3/6/2023</a:t>
+              <a:t>3/8/2023</a:t>
             </a:fld>
             <a:endParaRPr lang="en-US"/>
           </a:p>
@@ -1822,7 +1827,7 @@
           <a:p>
             <a:fld id="{51149E06-0874-4241-ABF9-BAFA45916F2C}" type="datetimeFigureOut">
               <a:rPr lang="en-US" smtClean="0"/>
-              <a:t>3/6/2023</a:t>
+              <a:t>3/8/2023</a:t>
             </a:fld>
             <a:endParaRPr lang="en-US"/>
           </a:p>
@@ -1940,7 +1945,7 @@
           <a:p>
             <a:fld id="{51149E06-0874-4241-ABF9-BAFA45916F2C}" type="datetimeFigureOut">
               <a:rPr lang="en-US" smtClean="0"/>
-              <a:t>3/6/2023</a:t>
+              <a:t>3/8/2023</a:t>
             </a:fld>
             <a:endParaRPr lang="en-US"/>
           </a:p>
@@ -2035,7 +2040,7 @@
           <a:p>
             <a:fld id="{51149E06-0874-4241-ABF9-BAFA45916F2C}" type="datetimeFigureOut">
               <a:rPr lang="en-US" smtClean="0"/>
-              <a:t>3/6/2023</a:t>
+              <a:t>3/8/2023</a:t>
             </a:fld>
             <a:endParaRPr lang="en-US"/>
           </a:p>
@@ -2312,7 +2317,7 @@
           <a:p>
             <a:fld id="{51149E06-0874-4241-ABF9-BAFA45916F2C}" type="datetimeFigureOut">
               <a:rPr lang="en-US" smtClean="0"/>
-              <a:t>3/6/2023</a:t>
+              <a:t>3/8/2023</a:t>
             </a:fld>
             <a:endParaRPr lang="en-US"/>
           </a:p>
@@ -2565,7 +2570,7 @@
           <a:p>
             <a:fld id="{51149E06-0874-4241-ABF9-BAFA45916F2C}" type="datetimeFigureOut">
               <a:rPr lang="en-US" smtClean="0"/>
-              <a:t>3/6/2023</a:t>
+              <a:t>3/8/2023</a:t>
             </a:fld>
             <a:endParaRPr lang="en-US"/>
           </a:p>
@@ -2778,7 +2783,7 @@
           <a:p>
             <a:fld id="{51149E06-0874-4241-ABF9-BAFA45916F2C}" type="datetimeFigureOut">
               <a:rPr lang="en-US" smtClean="0"/>
-              <a:t>3/6/2023</a:t>
+              <a:t>3/8/2023</a:t>
             </a:fld>
             <a:endParaRPr lang="en-US"/>
           </a:p>
@@ -11077,11 +11082,7 @@
           <a:p>
             <a:r>
               <a:rPr lang="en-US" dirty="0" smtClean="0"/>
-              <a:t>Day </a:t>
-            </a:r>
-            <a:r>
-              <a:rPr lang="en-US" dirty="0" smtClean="0"/>
-              <a:t>13</a:t>
+              <a:t>Day 13</a:t>
             </a:r>
             <a:endParaRPr lang="en-US" dirty="0"/>
           </a:p>
@@ -11149,7 +11150,6 @@
               <a:rPr lang="en-US" dirty="0" smtClean="0"/>
               <a:t>Tuning Consumer configurations</a:t>
             </a:r>
-            <a:endParaRPr lang="en-US" dirty="0" smtClean="0"/>
           </a:p>
           <a:p>
             <a:pPr lvl="1">
@@ -11231,11 +11231,7 @@
           <a:p>
             <a:r>
               <a:rPr lang="en-US" dirty="0" smtClean="0"/>
-              <a:t>Agenda - Day </a:t>
-            </a:r>
-            <a:r>
-              <a:rPr lang="en-US" dirty="0" smtClean="0"/>
-              <a:t>13</a:t>
+              <a:t>Agenda - Day 13</a:t>
             </a:r>
             <a:endParaRPr lang="en-US" dirty="0"/>
           </a:p>
@@ -11264,15 +11260,7 @@
             </a:pPr>
             <a:r>
               <a:rPr lang="en-US" dirty="0" smtClean="0"/>
-              <a:t>Day </a:t>
-            </a:r>
-            <a:r>
-              <a:rPr lang="en-US" dirty="0" smtClean="0"/>
-              <a:t>12 </a:t>
-            </a:r>
-            <a:r>
-              <a:rPr lang="en-US" dirty="0" smtClean="0"/>
-              <a:t>Recap &amp; </a:t>
+              <a:t>Day 12 Recap &amp; </a:t>
             </a:r>
             <a:r>
               <a:rPr lang="en-US" dirty="0" err="1" smtClean="0"/>
@@ -11294,15 +11282,7 @@
             </a:pPr>
             <a:r>
               <a:rPr lang="en-US" dirty="0" smtClean="0"/>
-              <a:t>Spring </a:t>
-            </a:r>
-            <a:r>
-              <a:rPr lang="en-US" dirty="0" smtClean="0"/>
-              <a:t>Kafka Consumer </a:t>
-            </a:r>
-            <a:r>
-              <a:rPr lang="en-US" dirty="0" smtClean="0"/>
-              <a:t>Internals</a:t>
+              <a:t>Spring Kafka Consumer Internals</a:t>
             </a:r>
           </a:p>
           <a:p>
@@ -11438,11 +11418,7 @@
             </a:r>
             <a:r>
               <a:rPr lang="en-US" sz="3600" dirty="0" smtClean="0"/>
-              <a:t>- Day </a:t>
-            </a:r>
-            <a:r>
-              <a:rPr lang="en-US" sz="3600" dirty="0" smtClean="0"/>
-              <a:t>13</a:t>
+              <a:t>- Day 13</a:t>
             </a:r>
             <a:endParaRPr lang="en-US" sz="3600" dirty="0"/>
           </a:p>
@@ -11667,15 +11643,7 @@
             </a:r>
             <a:r>
               <a:rPr lang="en-US" sz="1400" dirty="0"/>
-              <a:t>Commit the offset when all the records returned by the </a:t>
-            </a:r>
-            <a:r>
-              <a:rPr lang="en-US" sz="1400" dirty="0"/>
-              <a:t>poll()</a:t>
-            </a:r>
-            <a:r>
-              <a:rPr lang="en-US" sz="1400" dirty="0"/>
-              <a:t> have been </a:t>
+              <a:t>Commit the offset when all the records returned by the poll() have been </a:t>
             </a:r>
             <a:r>
               <a:rPr lang="en-US" sz="1400" dirty="0" smtClean="0"/>
@@ -11704,35 +11672,7 @@
             </a:pPr>
             <a:r>
               <a:rPr lang="en-US" sz="1600" dirty="0"/>
-              <a:t> </a:t>
-            </a:r>
-            <a:r>
-              <a:rPr lang="en-US" sz="1600" dirty="0"/>
-              <a:t>he message listener is responsible to </a:t>
-            </a:r>
-            <a:r>
-              <a:rPr lang="en-US" sz="1600" dirty="0"/>
-              <a:t>acknowledge()</a:t>
-            </a:r>
-            <a:r>
-              <a:rPr lang="en-US" sz="1600" dirty="0"/>
-              <a:t> the </a:t>
-            </a:r>
-            <a:r>
-              <a:rPr lang="en-US" sz="1600" dirty="0"/>
-              <a:t>Acknowledgment</a:t>
-            </a:r>
-            <a:r>
-              <a:rPr lang="en-US" sz="1600" dirty="0"/>
-              <a:t>. After that, the same semantics as </a:t>
-            </a:r>
-            <a:r>
-              <a:rPr lang="en-US" sz="1600" dirty="0"/>
-              <a:t>BATCH</a:t>
-            </a:r>
-            <a:r>
-              <a:rPr lang="en-US" sz="1600" dirty="0"/>
-              <a:t> are applied</a:t>
+              <a:t> he message listener is responsible to acknowledge() the Acknowledgment. After that, the same semantics as BATCH are applied</a:t>
             </a:r>
             <a:r>
               <a:rPr lang="en-US" sz="1600" dirty="0" smtClean="0"/>
@@ -11769,11 +11709,7 @@
             </a:r>
             <a:r>
               <a:rPr lang="en-US" sz="1400" dirty="0"/>
-              <a:t>()</a:t>
-            </a:r>
-            <a:r>
-              <a:rPr lang="en-US" sz="1400" dirty="0"/>
-              <a:t> method is called by the listener</a:t>
+              <a:t>() method is called by the listener</a:t>
             </a:r>
             <a:endParaRPr lang="en-US" sz="1700" dirty="0" smtClean="0"/>
           </a:p>
@@ -12128,11 +12064,7 @@
           <a:p>
             <a:r>
               <a:rPr lang="en-US" dirty="0" smtClean="0"/>
-              <a:t>DIY Exercise - Day </a:t>
-            </a:r>
-            <a:r>
-              <a:rPr lang="en-US" dirty="0" smtClean="0"/>
-              <a:t>13</a:t>
+              <a:t>DIY Exercise - Day 13</a:t>
             </a:r>
             <a:endParaRPr lang="en-US" dirty="0"/>
           </a:p>
@@ -12431,6 +12363,896 @@
     <p:extLst>
       <p:ext uri="{BB962C8B-B14F-4D97-AF65-F5344CB8AC3E}">
         <p14:creationId xmlns:p14="http://schemas.microsoft.com/office/powerpoint/2010/main" val="1234029529"/>
+      </p:ext>
+    </p:extLst>
+  </p:cSld>
+  <p:clrMapOvr>
+    <a:masterClrMapping/>
+  </p:clrMapOvr>
+  <p:timing>
+    <p:tnLst>
+      <p:par>
+        <p:cTn id="1" dur="indefinite" restart="never" nodeType="tmRoot"/>
+      </p:par>
+    </p:tnLst>
+  </p:timing>
+</p:sld>
+</file>
+
+<file path=ppt/slides/slide60.xml><?xml version="1.0" encoding="utf-8"?>
+<p:sld xmlns:a="http://schemas.openxmlformats.org/drawingml/2006/main" xmlns:r="http://schemas.openxmlformats.org/officeDocument/2006/relationships" xmlns:p="http://schemas.openxmlformats.org/presentationml/2006/main">
+  <p:cSld>
+    <p:spTree>
+      <p:nvGrpSpPr>
+        <p:cNvPr id="1" name=""/>
+        <p:cNvGrpSpPr/>
+        <p:nvPr/>
+      </p:nvGrpSpPr>
+      <p:grpSpPr>
+        <a:xfrm>
+          <a:off x="0" y="0"/>
+          <a:ext cx="0" cy="0"/>
+          <a:chOff x="0" y="0"/>
+          <a:chExt cx="0" cy="0"/>
+        </a:xfrm>
+      </p:grpSpPr>
+      <p:sp>
+        <p:nvSpPr>
+          <p:cNvPr id="2" name="Title 1"/>
+          <p:cNvSpPr>
+            <a:spLocks noGrp="1"/>
+          </p:cNvSpPr>
+          <p:nvPr>
+            <p:ph type="title"/>
+          </p:nvPr>
+        </p:nvSpPr>
+        <p:spPr/>
+        <p:txBody>
+          <a:bodyPr/>
+          <a:lstStyle/>
+          <a:p>
+            <a:r>
+              <a:rPr lang="en-US" dirty="0" smtClean="0"/>
+              <a:t>Day </a:t>
+            </a:r>
+            <a:r>
+              <a:rPr lang="en-US" dirty="0" smtClean="0"/>
+              <a:t>14</a:t>
+            </a:r>
+            <a:endParaRPr lang="en-US" dirty="0"/>
+          </a:p>
+        </p:txBody>
+      </p:sp>
+      <p:sp>
+        <p:nvSpPr>
+          <p:cNvPr id="3" name="Content Placeholder 2"/>
+          <p:cNvSpPr>
+            <a:spLocks noGrp="1"/>
+          </p:cNvSpPr>
+          <p:nvPr>
+            <p:ph idx="1"/>
+          </p:nvPr>
+        </p:nvSpPr>
+        <p:spPr/>
+        <p:txBody>
+          <a:bodyPr>
+            <a:normAutofit/>
+          </a:bodyPr>
+          <a:lstStyle/>
+          <a:p>
+            <a:pPr marL="0" indent="0">
+              <a:buNone/>
+            </a:pPr>
+            <a:r>
+              <a:rPr lang="en-US" b="1" dirty="0" smtClean="0"/>
+              <a:t>Theme</a:t>
+            </a:r>
+          </a:p>
+          <a:p>
+            <a:pPr lvl="1"/>
+            <a:endParaRPr lang="en-US" dirty="0" smtClean="0"/>
+          </a:p>
+          <a:p>
+            <a:pPr lvl="1">
+              <a:buFont typeface="Arial" panose="020B0604020202020204" pitchFamily="34" charset="0"/>
+              <a:buChar char="•"/>
+            </a:pPr>
+            <a:r>
+              <a:rPr lang="en-US" dirty="0" smtClean="0"/>
+              <a:t>Error Handling in Consumer</a:t>
+            </a:r>
+          </a:p>
+          <a:p>
+            <a:pPr lvl="1">
+              <a:buFont typeface="Arial" panose="020B0604020202020204" pitchFamily="34" charset="0"/>
+              <a:buChar char="•"/>
+            </a:pPr>
+            <a:endParaRPr lang="en-US" dirty="0" smtClean="0"/>
+          </a:p>
+          <a:p>
+            <a:pPr lvl="1">
+              <a:buFont typeface="Arial" panose="020B0604020202020204" pitchFamily="34" charset="0"/>
+              <a:buChar char="•"/>
+            </a:pPr>
+            <a:r>
+              <a:rPr lang="en-US" dirty="0" smtClean="0"/>
+              <a:t>Failure Recovery</a:t>
+            </a:r>
+            <a:r>
+              <a:rPr lang="en-US" dirty="0"/>
+              <a:t> </a:t>
+            </a:r>
+            <a:r>
+              <a:rPr lang="en-US" dirty="0" smtClean="0"/>
+              <a:t>in Consumers</a:t>
+            </a:r>
+          </a:p>
+          <a:p>
+            <a:pPr lvl="1">
+              <a:buFont typeface="Arial" panose="020B0604020202020204" pitchFamily="34" charset="0"/>
+              <a:buChar char="•"/>
+            </a:pPr>
+            <a:endParaRPr lang="en-US" dirty="0"/>
+          </a:p>
+          <a:p>
+            <a:pPr lvl="1">
+              <a:buFont typeface="Arial" panose="020B0604020202020204" pitchFamily="34" charset="0"/>
+              <a:buChar char="•"/>
+            </a:pPr>
+            <a:r>
+              <a:rPr lang="en-US" dirty="0" smtClean="0"/>
+              <a:t>Intro to Security</a:t>
+            </a:r>
+            <a:endParaRPr lang="en-US" dirty="0" smtClean="0"/>
+          </a:p>
+          <a:p>
+            <a:pPr lvl="1">
+              <a:buFont typeface="Arial" panose="020B0604020202020204" pitchFamily="34" charset="0"/>
+              <a:buChar char="•"/>
+            </a:pPr>
+            <a:endParaRPr lang="en-US" dirty="0" smtClean="0"/>
+          </a:p>
+          <a:p>
+            <a:pPr marL="457200" lvl="1" indent="0">
+              <a:buNone/>
+            </a:pPr>
+            <a:endParaRPr lang="en-US" dirty="0" smtClean="0"/>
+          </a:p>
+          <a:p>
+            <a:pPr lvl="1"/>
+            <a:endParaRPr lang="en-US" dirty="0" smtClean="0"/>
+          </a:p>
+        </p:txBody>
+      </p:sp>
+    </p:spTree>
+    <p:extLst>
+      <p:ext uri="{BB962C8B-B14F-4D97-AF65-F5344CB8AC3E}">
+        <p14:creationId xmlns:p14="http://schemas.microsoft.com/office/powerpoint/2010/main" val="1150086957"/>
+      </p:ext>
+    </p:extLst>
+  </p:cSld>
+  <p:clrMapOvr>
+    <a:masterClrMapping/>
+  </p:clrMapOvr>
+  <p:timing>
+    <p:tnLst>
+      <p:par>
+        <p:cTn id="1" dur="indefinite" restart="never" nodeType="tmRoot"/>
+      </p:par>
+    </p:tnLst>
+  </p:timing>
+</p:sld>
+</file>
+
+<file path=ppt/slides/slide61.xml><?xml version="1.0" encoding="utf-8"?>
+<p:sld xmlns:a="http://schemas.openxmlformats.org/drawingml/2006/main" xmlns:r="http://schemas.openxmlformats.org/officeDocument/2006/relationships" xmlns:p="http://schemas.openxmlformats.org/presentationml/2006/main">
+  <p:cSld>
+    <p:spTree>
+      <p:nvGrpSpPr>
+        <p:cNvPr id="1" name=""/>
+        <p:cNvGrpSpPr/>
+        <p:nvPr/>
+      </p:nvGrpSpPr>
+      <p:grpSpPr>
+        <a:xfrm>
+          <a:off x="0" y="0"/>
+          <a:ext cx="0" cy="0"/>
+          <a:chOff x="0" y="0"/>
+          <a:chExt cx="0" cy="0"/>
+        </a:xfrm>
+      </p:grpSpPr>
+      <p:sp>
+        <p:nvSpPr>
+          <p:cNvPr id="2" name="Title 1"/>
+          <p:cNvSpPr>
+            <a:spLocks noGrp="1"/>
+          </p:cNvSpPr>
+          <p:nvPr>
+            <p:ph type="title"/>
+          </p:nvPr>
+        </p:nvSpPr>
+        <p:spPr/>
+        <p:txBody>
+          <a:bodyPr/>
+          <a:lstStyle/>
+          <a:p>
+            <a:r>
+              <a:rPr lang="en-US" dirty="0" smtClean="0"/>
+              <a:t>Agenda - Day </a:t>
+            </a:r>
+            <a:r>
+              <a:rPr lang="en-US" dirty="0" smtClean="0"/>
+              <a:t>14</a:t>
+            </a:r>
+            <a:endParaRPr lang="en-US" dirty="0"/>
+          </a:p>
+        </p:txBody>
+      </p:sp>
+      <p:sp>
+        <p:nvSpPr>
+          <p:cNvPr id="3" name="Content Placeholder 2"/>
+          <p:cNvSpPr>
+            <a:spLocks noGrp="1"/>
+          </p:cNvSpPr>
+          <p:nvPr>
+            <p:ph idx="1"/>
+          </p:nvPr>
+        </p:nvSpPr>
+        <p:spPr/>
+        <p:txBody>
+          <a:bodyPr>
+            <a:normAutofit fontScale="62500" lnSpcReduction="20000"/>
+          </a:bodyPr>
+          <a:lstStyle/>
+          <a:p>
+            <a:pPr lvl="1">
+              <a:buFont typeface="Arial" panose="020B0604020202020204" pitchFamily="34" charset="0"/>
+              <a:buChar char="•"/>
+            </a:pPr>
+            <a:r>
+              <a:rPr lang="en-US" dirty="0" smtClean="0"/>
+              <a:t>Day </a:t>
+            </a:r>
+            <a:r>
+              <a:rPr lang="en-US" dirty="0" smtClean="0"/>
+              <a:t>13 </a:t>
+            </a:r>
+            <a:r>
+              <a:rPr lang="en-US" dirty="0" smtClean="0"/>
+              <a:t>Recap &amp; </a:t>
+            </a:r>
+            <a:r>
+              <a:rPr lang="en-US" dirty="0" err="1" smtClean="0"/>
+              <a:t>QnA</a:t>
+            </a:r>
+            <a:endParaRPr lang="en-US" dirty="0" smtClean="0"/>
+          </a:p>
+          <a:p>
+            <a:pPr lvl="1">
+              <a:buFont typeface="Arial" panose="020B0604020202020204" pitchFamily="34" charset="0"/>
+              <a:buChar char="•"/>
+            </a:pPr>
+            <a:endParaRPr lang="en-US" dirty="0" smtClean="0"/>
+          </a:p>
+          <a:p>
+            <a:pPr lvl="1">
+              <a:buFont typeface="Arial" panose="020B0604020202020204" pitchFamily="34" charset="0"/>
+              <a:buChar char="•"/>
+            </a:pPr>
+            <a:r>
+              <a:rPr lang="en-US" dirty="0" smtClean="0"/>
+              <a:t>Error Handling</a:t>
+            </a:r>
+          </a:p>
+          <a:p>
+            <a:pPr lvl="1">
+              <a:buFont typeface="Arial" panose="020B0604020202020204" pitchFamily="34" charset="0"/>
+              <a:buChar char="•"/>
+            </a:pPr>
+            <a:endParaRPr lang="en-US" dirty="0" smtClean="0"/>
+          </a:p>
+          <a:p>
+            <a:pPr lvl="2">
+              <a:buFont typeface="Wingdings" panose="05000000000000000000" pitchFamily="2" charset="2"/>
+              <a:buChar char="Ø"/>
+            </a:pPr>
+            <a:r>
+              <a:rPr lang="en-US" dirty="0" smtClean="0"/>
+              <a:t>Custom Error Handling Configuration</a:t>
+            </a:r>
+          </a:p>
+          <a:p>
+            <a:pPr lvl="2">
+              <a:buFont typeface="Wingdings" panose="05000000000000000000" pitchFamily="2" charset="2"/>
+              <a:buChar char="Ø"/>
+            </a:pPr>
+            <a:endParaRPr lang="en-US" dirty="0" smtClean="0"/>
+          </a:p>
+          <a:p>
+            <a:pPr lvl="2">
+              <a:buFont typeface="Wingdings" panose="05000000000000000000" pitchFamily="2" charset="2"/>
+              <a:buChar char="Ø"/>
+            </a:pPr>
+            <a:r>
+              <a:rPr lang="en-US" dirty="0" smtClean="0"/>
+              <a:t>Fixed Back off</a:t>
+            </a:r>
+          </a:p>
+          <a:p>
+            <a:pPr lvl="2">
+              <a:buFont typeface="Wingdings" panose="05000000000000000000" pitchFamily="2" charset="2"/>
+              <a:buChar char="Ø"/>
+            </a:pPr>
+            <a:endParaRPr lang="en-US" dirty="0"/>
+          </a:p>
+          <a:p>
+            <a:pPr lvl="2">
+              <a:buFont typeface="Wingdings" panose="05000000000000000000" pitchFamily="2" charset="2"/>
+              <a:buChar char="Ø"/>
+            </a:pPr>
+            <a:r>
+              <a:rPr lang="en-US" dirty="0" smtClean="0"/>
+              <a:t>Exponential </a:t>
+            </a:r>
+            <a:r>
+              <a:rPr lang="en-US" dirty="0"/>
+              <a:t>Back off</a:t>
+            </a:r>
+          </a:p>
+          <a:p>
+            <a:pPr lvl="1">
+              <a:buFont typeface="Wingdings" panose="05000000000000000000" pitchFamily="2" charset="2"/>
+              <a:buChar char="Ø"/>
+            </a:pPr>
+            <a:endParaRPr lang="en-US" dirty="0" smtClean="0"/>
+          </a:p>
+          <a:p>
+            <a:pPr lvl="2">
+              <a:buFont typeface="Wingdings" panose="05000000000000000000" pitchFamily="2" charset="2"/>
+              <a:buChar char="Ø"/>
+            </a:pPr>
+            <a:r>
+              <a:rPr lang="en-US" dirty="0" smtClean="0"/>
+              <a:t>T</a:t>
+            </a:r>
+            <a:r>
+              <a:rPr lang="en-US" dirty="0" smtClean="0"/>
+              <a:t>uning Retry Policy to ignore Exceptions which need not be retried</a:t>
+            </a:r>
+          </a:p>
+          <a:p>
+            <a:pPr lvl="2">
+              <a:buFont typeface="Wingdings" panose="05000000000000000000" pitchFamily="2" charset="2"/>
+              <a:buChar char="Ø"/>
+            </a:pPr>
+            <a:endParaRPr lang="en-US" dirty="0" smtClean="0"/>
+          </a:p>
+          <a:p>
+            <a:pPr lvl="2">
+              <a:buFont typeface="Wingdings" panose="05000000000000000000" pitchFamily="2" charset="2"/>
+              <a:buChar char="Ø"/>
+            </a:pPr>
+            <a:r>
+              <a:rPr lang="en-US" dirty="0"/>
+              <a:t>Plug in additional handling during Retries</a:t>
+            </a:r>
+            <a:endParaRPr lang="en-US" dirty="0"/>
+          </a:p>
+          <a:p>
+            <a:pPr marL="457200" lvl="1" indent="0">
+              <a:buNone/>
+            </a:pPr>
+            <a:endParaRPr lang="en-US" dirty="0" smtClean="0"/>
+          </a:p>
+          <a:p>
+            <a:pPr lvl="1">
+              <a:buFont typeface="Arial" panose="020B0604020202020204" pitchFamily="34" charset="0"/>
+              <a:buChar char="•"/>
+            </a:pPr>
+            <a:r>
+              <a:rPr lang="en-US" dirty="0" smtClean="0"/>
+              <a:t>Failure Handling Strategies</a:t>
+            </a:r>
+          </a:p>
+          <a:p>
+            <a:pPr lvl="1">
+              <a:buFont typeface="Arial" panose="020B0604020202020204" pitchFamily="34" charset="0"/>
+              <a:buChar char="•"/>
+            </a:pPr>
+            <a:endParaRPr lang="en-US" dirty="0" smtClean="0"/>
+          </a:p>
+          <a:p>
+            <a:pPr lvl="1">
+              <a:buFont typeface="Arial" panose="020B0604020202020204" pitchFamily="34" charset="0"/>
+              <a:buChar char="•"/>
+            </a:pPr>
+            <a:r>
+              <a:rPr lang="en-US" dirty="0" smtClean="0"/>
+              <a:t>DIY Exercise</a:t>
+            </a:r>
+          </a:p>
+          <a:p>
+            <a:pPr marL="457200" lvl="1" indent="0">
+              <a:buNone/>
+            </a:pPr>
+            <a:endParaRPr lang="en-US" dirty="0"/>
+          </a:p>
+        </p:txBody>
+      </p:sp>
+    </p:spTree>
+    <p:extLst>
+      <p:ext uri="{BB962C8B-B14F-4D97-AF65-F5344CB8AC3E}">
+        <p14:creationId xmlns:p14="http://schemas.microsoft.com/office/powerpoint/2010/main" val="1833312442"/>
+      </p:ext>
+    </p:extLst>
+  </p:cSld>
+  <p:clrMapOvr>
+    <a:masterClrMapping/>
+  </p:clrMapOvr>
+  <p:timing>
+    <p:tnLst>
+      <p:par>
+        <p:cTn id="1" dur="indefinite" restart="never" nodeType="tmRoot"/>
+      </p:par>
+    </p:tnLst>
+  </p:timing>
+</p:sld>
+</file>
+
+<file path=ppt/slides/slide62.xml><?xml version="1.0" encoding="utf-8"?>
+<p:sld xmlns:a="http://schemas.openxmlformats.org/drawingml/2006/main" xmlns:r="http://schemas.openxmlformats.org/officeDocument/2006/relationships" xmlns:p="http://schemas.openxmlformats.org/presentationml/2006/main">
+  <p:cSld>
+    <p:spTree>
+      <p:nvGrpSpPr>
+        <p:cNvPr id="1" name=""/>
+        <p:cNvGrpSpPr/>
+        <p:nvPr/>
+      </p:nvGrpSpPr>
+      <p:grpSpPr>
+        <a:xfrm>
+          <a:off x="0" y="0"/>
+          <a:ext cx="0" cy="0"/>
+          <a:chOff x="0" y="0"/>
+          <a:chExt cx="0" cy="0"/>
+        </a:xfrm>
+      </p:grpSpPr>
+      <p:sp>
+        <p:nvSpPr>
+          <p:cNvPr id="2" name="Title 1"/>
+          <p:cNvSpPr>
+            <a:spLocks noGrp="1"/>
+          </p:cNvSpPr>
+          <p:nvPr>
+            <p:ph type="title"/>
+          </p:nvPr>
+        </p:nvSpPr>
+        <p:spPr>
+          <a:xfrm>
+            <a:off x="-252536" y="274638"/>
+            <a:ext cx="9577064" cy="1143000"/>
+          </a:xfrm>
+        </p:spPr>
+        <p:txBody>
+          <a:bodyPr>
+            <a:noAutofit/>
+          </a:bodyPr>
+          <a:lstStyle/>
+          <a:p>
+            <a:pPr lvl="1" algn="ctr" rtl="0">
+              <a:spcBef>
+                <a:spcPct val="0"/>
+              </a:spcBef>
+            </a:pPr>
+            <a:r>
+              <a:rPr lang="en-US" sz="3600" dirty="0" smtClean="0"/>
+              <a:t>Error &amp; Fault Recovery Implementation Insights - </a:t>
+            </a:r>
+            <a:r>
+              <a:rPr lang="en-US" sz="3600" dirty="0" smtClean="0"/>
+              <a:t>Day </a:t>
+            </a:r>
+            <a:r>
+              <a:rPr lang="en-US" sz="3600" dirty="0" smtClean="0"/>
+              <a:t>14</a:t>
+            </a:r>
+            <a:endParaRPr lang="en-US" sz="3600" dirty="0"/>
+          </a:p>
+        </p:txBody>
+      </p:sp>
+      <p:sp>
+        <p:nvSpPr>
+          <p:cNvPr id="3" name="Content Placeholder 2"/>
+          <p:cNvSpPr>
+            <a:spLocks noGrp="1"/>
+          </p:cNvSpPr>
+          <p:nvPr>
+            <p:ph idx="1"/>
+          </p:nvPr>
+        </p:nvSpPr>
+        <p:spPr/>
+        <p:txBody>
+          <a:bodyPr>
+            <a:normAutofit/>
+          </a:bodyPr>
+          <a:lstStyle/>
+          <a:p>
+            <a:pPr marL="457200" lvl="1" indent="0">
+              <a:buNone/>
+            </a:pPr>
+            <a:r>
+              <a:rPr lang="en-US" dirty="0" smtClean="0"/>
+              <a:t>Refer </a:t>
+            </a:r>
+            <a:r>
+              <a:rPr lang="en-US" dirty="0" smtClean="0"/>
+              <a:t>draw.io</a:t>
+            </a:r>
+          </a:p>
+          <a:p>
+            <a:pPr marL="457200" lvl="1" indent="0">
+              <a:buNone/>
+            </a:pPr>
+            <a:endParaRPr lang="en-US" dirty="0"/>
+          </a:p>
+          <a:p>
+            <a:pPr marL="457200" lvl="1" indent="0">
+              <a:buNone/>
+            </a:pPr>
+            <a:r>
+              <a:rPr lang="en-US" dirty="0" smtClean="0"/>
+              <a:t>Reference:</a:t>
+            </a:r>
+          </a:p>
+          <a:p>
+            <a:pPr marL="457200" lvl="1" indent="0">
+              <a:buNone/>
+            </a:pPr>
+            <a:r>
+              <a:rPr lang="en-US" dirty="0">
+                <a:hlinkClick r:id="rId2"/>
+              </a:rPr>
+              <a:t>https://docs.spring.io/spring-kafka/reference/html/#</a:t>
+            </a:r>
+            <a:r>
+              <a:rPr lang="en-US" dirty="0" smtClean="0">
+                <a:hlinkClick r:id="rId2"/>
+              </a:rPr>
+              <a:t>dead-letters</a:t>
+            </a:r>
+            <a:endParaRPr lang="en-US" dirty="0" smtClean="0"/>
+          </a:p>
+          <a:p>
+            <a:pPr marL="457200" lvl="1" indent="0">
+              <a:buNone/>
+            </a:pPr>
+            <a:endParaRPr lang="en-US" dirty="0"/>
+          </a:p>
+        </p:txBody>
+      </p:sp>
+    </p:spTree>
+    <p:extLst>
+      <p:ext uri="{BB962C8B-B14F-4D97-AF65-F5344CB8AC3E}">
+        <p14:creationId xmlns:p14="http://schemas.microsoft.com/office/powerpoint/2010/main" val="3722537722"/>
+      </p:ext>
+    </p:extLst>
+  </p:cSld>
+  <p:clrMapOvr>
+    <a:masterClrMapping/>
+  </p:clrMapOvr>
+  <p:timing>
+    <p:tnLst>
+      <p:par>
+        <p:cTn id="1" dur="indefinite" restart="never" nodeType="tmRoot"/>
+      </p:par>
+    </p:tnLst>
+  </p:timing>
+</p:sld>
+</file>
+
+<file path=ppt/slides/slide63.xml><?xml version="1.0" encoding="utf-8"?>
+<p:sld xmlns:a="http://schemas.openxmlformats.org/drawingml/2006/main" xmlns:r="http://schemas.openxmlformats.org/officeDocument/2006/relationships" xmlns:p="http://schemas.openxmlformats.org/presentationml/2006/main">
+  <p:cSld>
+    <p:spTree>
+      <p:nvGrpSpPr>
+        <p:cNvPr id="1" name=""/>
+        <p:cNvGrpSpPr/>
+        <p:nvPr/>
+      </p:nvGrpSpPr>
+      <p:grpSpPr>
+        <a:xfrm>
+          <a:off x="0" y="0"/>
+          <a:ext cx="0" cy="0"/>
+          <a:chOff x="0" y="0"/>
+          <a:chExt cx="0" cy="0"/>
+        </a:xfrm>
+      </p:grpSpPr>
+      <p:sp>
+        <p:nvSpPr>
+          <p:cNvPr id="2" name="Title 1"/>
+          <p:cNvSpPr>
+            <a:spLocks noGrp="1"/>
+          </p:cNvSpPr>
+          <p:nvPr>
+            <p:ph type="title"/>
+          </p:nvPr>
+        </p:nvSpPr>
+        <p:spPr>
+          <a:xfrm>
+            <a:off x="-252536" y="274638"/>
+            <a:ext cx="9577064" cy="1143000"/>
+          </a:xfrm>
+        </p:spPr>
+        <p:txBody>
+          <a:bodyPr>
+            <a:noAutofit/>
+          </a:bodyPr>
+          <a:lstStyle/>
+          <a:p>
+            <a:pPr lvl="1" algn="ctr" rtl="0">
+              <a:spcBef>
+                <a:spcPct val="0"/>
+              </a:spcBef>
+            </a:pPr>
+            <a:r>
+              <a:rPr lang="en-US" sz="3200" dirty="0" smtClean="0"/>
+              <a:t>Failure Handling Strategies – </a:t>
+            </a:r>
+            <a:r>
+              <a:rPr lang="en-US" sz="3200" dirty="0" smtClean="0"/>
+              <a:t>Day </a:t>
+            </a:r>
+            <a:r>
+              <a:rPr lang="en-US" sz="3200" dirty="0" smtClean="0"/>
+              <a:t>14</a:t>
+            </a:r>
+            <a:endParaRPr lang="en-US" sz="3200" dirty="0"/>
+          </a:p>
+        </p:txBody>
+      </p:sp>
+      <p:sp>
+        <p:nvSpPr>
+          <p:cNvPr id="3" name="Content Placeholder 2"/>
+          <p:cNvSpPr>
+            <a:spLocks noGrp="1"/>
+          </p:cNvSpPr>
+          <p:nvPr>
+            <p:ph idx="1"/>
+          </p:nvPr>
+        </p:nvSpPr>
+        <p:spPr/>
+        <p:txBody>
+          <a:bodyPr>
+            <a:normAutofit/>
+          </a:bodyPr>
+          <a:lstStyle/>
+          <a:p>
+            <a:pPr lvl="1">
+              <a:buFont typeface="Wingdings" panose="05000000000000000000" pitchFamily="2" charset="2"/>
+              <a:buChar char="Ø"/>
+            </a:pPr>
+            <a:r>
+              <a:rPr lang="en-US" dirty="0" smtClean="0"/>
+              <a:t>Approach 1 : Retry the failed messages</a:t>
+            </a:r>
+          </a:p>
+          <a:p>
+            <a:pPr lvl="1">
+              <a:buFont typeface="Wingdings" panose="05000000000000000000" pitchFamily="2" charset="2"/>
+              <a:buChar char="Ø"/>
+            </a:pPr>
+            <a:endParaRPr lang="en-US" dirty="0" smtClean="0"/>
+          </a:p>
+          <a:p>
+            <a:pPr marL="457200" lvl="1" indent="0">
+              <a:buNone/>
+            </a:pPr>
+            <a:r>
+              <a:rPr lang="en-US" sz="2400" dirty="0" smtClean="0"/>
+              <a:t>Example: Dependent Services temporarily down</a:t>
+            </a:r>
+          </a:p>
+          <a:p>
+            <a:pPr marL="457200" lvl="1" indent="0">
+              <a:buNone/>
+            </a:pPr>
+            <a:endParaRPr lang="en-US" dirty="0" smtClean="0"/>
+          </a:p>
+          <a:p>
+            <a:pPr lvl="1">
+              <a:buFont typeface="Wingdings" panose="05000000000000000000" pitchFamily="2" charset="2"/>
+              <a:buChar char="Ø"/>
+            </a:pPr>
+            <a:endParaRPr lang="en-US" dirty="0" smtClean="0"/>
+          </a:p>
+          <a:p>
+            <a:pPr lvl="1">
+              <a:buFont typeface="Wingdings" panose="05000000000000000000" pitchFamily="2" charset="2"/>
+              <a:buChar char="Ø"/>
+            </a:pPr>
+            <a:r>
+              <a:rPr lang="en-US" dirty="0" smtClean="0"/>
+              <a:t>Approach 2: Discard  the Messages in a trackable way</a:t>
+            </a:r>
+          </a:p>
+          <a:p>
+            <a:pPr marL="457200" lvl="1" indent="0">
+              <a:buNone/>
+            </a:pPr>
+            <a:endParaRPr lang="en-US" sz="2400" dirty="0" smtClean="0"/>
+          </a:p>
+          <a:p>
+            <a:pPr marL="457200" lvl="1" indent="0">
+              <a:buNone/>
+            </a:pPr>
+            <a:r>
+              <a:rPr lang="en-US" sz="2400" dirty="0" smtClean="0"/>
+              <a:t>Example: Invalid payloads </a:t>
+            </a:r>
+            <a:endParaRPr lang="en-US" sz="2400" dirty="0"/>
+          </a:p>
+        </p:txBody>
+      </p:sp>
+    </p:spTree>
+    <p:extLst>
+      <p:ext uri="{BB962C8B-B14F-4D97-AF65-F5344CB8AC3E}">
+        <p14:creationId xmlns:p14="http://schemas.microsoft.com/office/powerpoint/2010/main" val="4124340696"/>
+      </p:ext>
+    </p:extLst>
+  </p:cSld>
+  <p:clrMapOvr>
+    <a:masterClrMapping/>
+  </p:clrMapOvr>
+  <p:timing>
+    <p:tnLst>
+      <p:par>
+        <p:cTn id="1" dur="indefinite" restart="never" nodeType="tmRoot"/>
+      </p:par>
+    </p:tnLst>
+  </p:timing>
+</p:sld>
+</file>
+
+<file path=ppt/slides/slide64.xml><?xml version="1.0" encoding="utf-8"?>
+<p:sld xmlns:a="http://schemas.openxmlformats.org/drawingml/2006/main" xmlns:r="http://schemas.openxmlformats.org/officeDocument/2006/relationships" xmlns:p="http://schemas.openxmlformats.org/presentationml/2006/main">
+  <p:cSld>
+    <p:spTree>
+      <p:nvGrpSpPr>
+        <p:cNvPr id="1" name=""/>
+        <p:cNvGrpSpPr/>
+        <p:nvPr/>
+      </p:nvGrpSpPr>
+      <p:grpSpPr>
+        <a:xfrm>
+          <a:off x="0" y="0"/>
+          <a:ext cx="0" cy="0"/>
+          <a:chOff x="0" y="0"/>
+          <a:chExt cx="0" cy="0"/>
+        </a:xfrm>
+      </p:grpSpPr>
+      <p:sp>
+        <p:nvSpPr>
+          <p:cNvPr id="2" name="Title 1"/>
+          <p:cNvSpPr>
+            <a:spLocks noGrp="1"/>
+          </p:cNvSpPr>
+          <p:nvPr>
+            <p:ph type="title"/>
+          </p:nvPr>
+        </p:nvSpPr>
+        <p:spPr/>
+        <p:txBody>
+          <a:bodyPr/>
+          <a:lstStyle/>
+          <a:p>
+            <a:r>
+              <a:rPr lang="en-US" dirty="0" smtClean="0"/>
+              <a:t>DIY Exercise - Day </a:t>
+            </a:r>
+            <a:r>
+              <a:rPr lang="en-US" dirty="0" smtClean="0"/>
+              <a:t>14</a:t>
+            </a:r>
+            <a:endParaRPr lang="en-US" dirty="0"/>
+          </a:p>
+        </p:txBody>
+      </p:sp>
+      <p:sp>
+        <p:nvSpPr>
+          <p:cNvPr id="3" name="Content Placeholder 2"/>
+          <p:cNvSpPr>
+            <a:spLocks noGrp="1"/>
+          </p:cNvSpPr>
+          <p:nvPr>
+            <p:ph idx="1"/>
+          </p:nvPr>
+        </p:nvSpPr>
+        <p:spPr>
+          <a:xfrm>
+            <a:off x="467544" y="1484784"/>
+            <a:ext cx="8229600" cy="4525963"/>
+          </a:xfrm>
+        </p:spPr>
+        <p:txBody>
+          <a:bodyPr>
+            <a:normAutofit/>
+          </a:bodyPr>
+          <a:lstStyle/>
+          <a:p>
+            <a:pPr marL="457200" lvl="1" indent="0">
+              <a:buNone/>
+            </a:pPr>
+            <a:endParaRPr lang="en-US" dirty="0" smtClean="0"/>
+          </a:p>
+          <a:p>
+            <a:pPr fontAlgn="ctr"/>
+            <a:r>
+              <a:rPr lang="en-US" dirty="0" smtClean="0"/>
+              <a:t>Implement the Retry service which reads from Retry topic and triggers the re-processing</a:t>
+            </a:r>
+          </a:p>
+          <a:p>
+            <a:pPr fontAlgn="ctr"/>
+            <a:endParaRPr lang="en-US" dirty="0" smtClean="0"/>
+          </a:p>
+          <a:p>
+            <a:pPr fontAlgn="ctr"/>
+            <a:r>
+              <a:rPr lang="en-US" dirty="0" smtClean="0"/>
+              <a:t>Re-establish the Error and failure recovery handling in producer with sufficient demos</a:t>
+            </a:r>
+            <a:endParaRPr lang="en-US" dirty="0" smtClean="0"/>
+          </a:p>
+          <a:p>
+            <a:pPr fontAlgn="ctr"/>
+            <a:endParaRPr lang="en-US" dirty="0" smtClean="0"/>
+          </a:p>
+          <a:p>
+            <a:pPr fontAlgn="ctr"/>
+            <a:r>
+              <a:rPr lang="en-US" dirty="0" smtClean="0"/>
+              <a:t>Save the messages in the DTL to H2 Database</a:t>
+            </a:r>
+            <a:endParaRPr lang="en-US" dirty="0" smtClean="0"/>
+          </a:p>
+          <a:p>
+            <a:pPr lvl="1">
+              <a:buFont typeface="Arial" panose="020B0604020202020204" pitchFamily="34" charset="0"/>
+              <a:buChar char="•"/>
+            </a:pPr>
+            <a:endParaRPr lang="en-US" dirty="0" smtClean="0"/>
+          </a:p>
+          <a:p>
+            <a:pPr marL="457200" lvl="1" indent="0">
+              <a:buNone/>
+            </a:pPr>
+            <a:endParaRPr lang="en-US" dirty="0" smtClean="0"/>
+          </a:p>
+          <a:p>
+            <a:pPr lvl="1">
+              <a:buFont typeface="Arial" panose="020B0604020202020204" pitchFamily="34" charset="0"/>
+              <a:buChar char="•"/>
+            </a:pPr>
+            <a:endParaRPr lang="en-US" dirty="0" smtClean="0"/>
+          </a:p>
+          <a:p>
+            <a:pPr lvl="1">
+              <a:buFont typeface="Arial" panose="020B0604020202020204" pitchFamily="34" charset="0"/>
+              <a:buChar char="•"/>
+            </a:pPr>
+            <a:endParaRPr lang="en-US" dirty="0" smtClean="0"/>
+          </a:p>
+          <a:p>
+            <a:pPr marL="457200" lvl="1" indent="0">
+              <a:buNone/>
+            </a:pPr>
+            <a:endParaRPr lang="en-US" dirty="0" smtClean="0"/>
+          </a:p>
+        </p:txBody>
+      </p:sp>
+    </p:spTree>
+    <p:extLst>
+      <p:ext uri="{BB962C8B-B14F-4D97-AF65-F5344CB8AC3E}">
+        <p14:creationId xmlns:p14="http://schemas.microsoft.com/office/powerpoint/2010/main" val="2222161315"/>
       </p:ext>
     </p:extLst>
   </p:cSld>

</xml_diff>

<commit_message>
design and presentation artifacts
</commit_message>
<xml_diff>
--- a/PPT/Kafka-Teaching-Flow.pptx
+++ b/PPT/Kafka-Teaching-Flow.pptx
@@ -75,7 +75,11 @@
     <p:sldId id="333" r:id="rId69"/>
     <p:sldId id="332" r:id="rId70"/>
     <p:sldId id="331" r:id="rId71"/>
-    <p:sldId id="329" r:id="rId72"/>
+    <p:sldId id="334" r:id="rId72"/>
+    <p:sldId id="335" r:id="rId73"/>
+    <p:sldId id="336" r:id="rId74"/>
+    <p:sldId id="337" r:id="rId75"/>
+    <p:sldId id="329" r:id="rId76"/>
   </p:sldIdLst>
   <p:sldSz cx="9144000" cy="6858000" type="screen4x3"/>
   <p:notesSz cx="6858000" cy="9144000"/>
@@ -358,7 +362,7 @@
           <a:p>
             <a:fld id="{51149E06-0874-4241-ABF9-BAFA45916F2C}" type="datetimeFigureOut">
               <a:rPr lang="en-US" smtClean="0"/>
-              <a:t>3/10/2023</a:t>
+              <a:t>3/14/2023</a:t>
             </a:fld>
             <a:endParaRPr lang="en-US"/>
           </a:p>
@@ -528,7 +532,7 @@
           <a:p>
             <a:fld id="{51149E06-0874-4241-ABF9-BAFA45916F2C}" type="datetimeFigureOut">
               <a:rPr lang="en-US" smtClean="0"/>
-              <a:t>3/10/2023</a:t>
+              <a:t>3/14/2023</a:t>
             </a:fld>
             <a:endParaRPr lang="en-US"/>
           </a:p>
@@ -708,7 +712,7 @@
           <a:p>
             <a:fld id="{51149E06-0874-4241-ABF9-BAFA45916F2C}" type="datetimeFigureOut">
               <a:rPr lang="en-US" smtClean="0"/>
-              <a:t>3/10/2023</a:t>
+              <a:t>3/14/2023</a:t>
             </a:fld>
             <a:endParaRPr lang="en-US"/>
           </a:p>
@@ -878,7 +882,7 @@
           <a:p>
             <a:fld id="{51149E06-0874-4241-ABF9-BAFA45916F2C}" type="datetimeFigureOut">
               <a:rPr lang="en-US" smtClean="0"/>
-              <a:t>3/10/2023</a:t>
+              <a:t>3/14/2023</a:t>
             </a:fld>
             <a:endParaRPr lang="en-US"/>
           </a:p>
@@ -1124,7 +1128,7 @@
           <a:p>
             <a:fld id="{51149E06-0874-4241-ABF9-BAFA45916F2C}" type="datetimeFigureOut">
               <a:rPr lang="en-US" smtClean="0"/>
-              <a:t>3/10/2023</a:t>
+              <a:t>3/14/2023</a:t>
             </a:fld>
             <a:endParaRPr lang="en-US"/>
           </a:p>
@@ -1412,7 +1416,7 @@
           <a:p>
             <a:fld id="{51149E06-0874-4241-ABF9-BAFA45916F2C}" type="datetimeFigureOut">
               <a:rPr lang="en-US" smtClean="0"/>
-              <a:t>3/10/2023</a:t>
+              <a:t>3/14/2023</a:t>
             </a:fld>
             <a:endParaRPr lang="en-US"/>
           </a:p>
@@ -1834,7 +1838,7 @@
           <a:p>
             <a:fld id="{51149E06-0874-4241-ABF9-BAFA45916F2C}" type="datetimeFigureOut">
               <a:rPr lang="en-US" smtClean="0"/>
-              <a:t>3/10/2023</a:t>
+              <a:t>3/14/2023</a:t>
             </a:fld>
             <a:endParaRPr lang="en-US"/>
           </a:p>
@@ -1952,7 +1956,7 @@
           <a:p>
             <a:fld id="{51149E06-0874-4241-ABF9-BAFA45916F2C}" type="datetimeFigureOut">
               <a:rPr lang="en-US" smtClean="0"/>
-              <a:t>3/10/2023</a:t>
+              <a:t>3/14/2023</a:t>
             </a:fld>
             <a:endParaRPr lang="en-US"/>
           </a:p>
@@ -2047,7 +2051,7 @@
           <a:p>
             <a:fld id="{51149E06-0874-4241-ABF9-BAFA45916F2C}" type="datetimeFigureOut">
               <a:rPr lang="en-US" smtClean="0"/>
-              <a:t>3/10/2023</a:t>
+              <a:t>3/14/2023</a:t>
             </a:fld>
             <a:endParaRPr lang="en-US"/>
           </a:p>
@@ -2324,7 +2328,7 @@
           <a:p>
             <a:fld id="{51149E06-0874-4241-ABF9-BAFA45916F2C}" type="datetimeFigureOut">
               <a:rPr lang="en-US" smtClean="0"/>
-              <a:t>3/10/2023</a:t>
+              <a:t>3/14/2023</a:t>
             </a:fld>
             <a:endParaRPr lang="en-US"/>
           </a:p>
@@ -2577,7 +2581,7 @@
           <a:p>
             <a:fld id="{51149E06-0874-4241-ABF9-BAFA45916F2C}" type="datetimeFigureOut">
               <a:rPr lang="en-US" smtClean="0"/>
-              <a:t>3/10/2023</a:t>
+              <a:t>3/14/2023</a:t>
             </a:fld>
             <a:endParaRPr lang="en-US"/>
           </a:p>
@@ -2790,7 +2794,7 @@
           <a:p>
             <a:fld id="{51149E06-0874-4241-ABF9-BAFA45916F2C}" type="datetimeFigureOut">
               <a:rPr lang="en-US" smtClean="0"/>
-              <a:t>3/10/2023</a:t>
+              <a:t>3/14/2023</a:t>
             </a:fld>
             <a:endParaRPr lang="en-US"/>
           </a:p>
@@ -13170,19 +13174,7 @@
             <a:pPr fontAlgn="ctr"/>
             <a:r>
               <a:rPr lang="en-US" dirty="0" smtClean="0"/>
-              <a:t>Save the messages in the </a:t>
-            </a:r>
-            <a:r>
-              <a:rPr lang="en-US" dirty="0" smtClean="0"/>
-              <a:t>DLT </a:t>
-            </a:r>
-            <a:r>
-              <a:rPr lang="en-US" dirty="0" smtClean="0"/>
-              <a:t>to H2 </a:t>
-            </a:r>
-            <a:r>
-              <a:rPr lang="en-US" dirty="0" smtClean="0"/>
-              <a:t>Database</a:t>
+              <a:t>Save the messages in the DLT to H2 Database</a:t>
             </a:r>
           </a:p>
           <a:p>
@@ -13195,7 +13187,6 @@
               <a:rPr lang="en-US" dirty="0" smtClean="0"/>
               <a:t>Explore Transactions</a:t>
             </a:r>
-            <a:endParaRPr lang="en-US" dirty="0" smtClean="0"/>
           </a:p>
           <a:p>
             <a:pPr lvl="1">
@@ -13286,11 +13277,7 @@
           <a:p>
             <a:r>
               <a:rPr lang="en-US" dirty="0" smtClean="0"/>
-              <a:t>Day </a:t>
-            </a:r>
-            <a:r>
-              <a:rPr lang="en-US" dirty="0" smtClean="0"/>
-              <a:t>15, 16,17</a:t>
+              <a:t>Day 15, 16,17</a:t>
             </a:r>
             <a:endParaRPr lang="en-US" dirty="0"/>
           </a:p>
@@ -13421,11 +13408,7 @@
           <a:p>
             <a:r>
               <a:rPr lang="en-US" dirty="0" smtClean="0"/>
-              <a:t>Agenda - Day </a:t>
-            </a:r>
-            <a:r>
-              <a:rPr lang="en-US" dirty="0" smtClean="0"/>
-              <a:t>15, 16,17</a:t>
+              <a:t>Agenda - Day 15, 16,17</a:t>
             </a:r>
             <a:endParaRPr lang="en-US" dirty="0"/>
           </a:p>
@@ -13613,20 +13596,12 @@
               <a:rPr lang="en-US" sz="3200" dirty="0" smtClean="0"/>
               <a:t>Encryption Authentication &amp; Authorization</a:t>
             </a:r>
-            <a:r>
-              <a:rPr lang="en-US" sz="3200" dirty="0" smtClean="0"/>
-              <a:t/>
-            </a:r>
             <a:br>
               <a:rPr lang="en-US" sz="3200" dirty="0" smtClean="0"/>
             </a:br>
             <a:r>
               <a:rPr lang="en-US" sz="3200" dirty="0" smtClean="0"/>
-              <a:t>- Day </a:t>
-            </a:r>
-            <a:r>
-              <a:rPr lang="en-US" sz="3200" dirty="0" smtClean="0"/>
-              <a:t>15,16,17</a:t>
+              <a:t>- Day 15,16,17</a:t>
             </a:r>
             <a:endParaRPr lang="en-US" sz="3200" dirty="0"/>
           </a:p>
@@ -13796,11 +13771,7 @@
             </a:pPr>
             <a:r>
               <a:rPr lang="en-US" sz="3200" dirty="0" smtClean="0"/>
-              <a:t>Kafka Security Protocols – </a:t>
-            </a:r>
-            <a:r>
-              <a:rPr lang="en-US" sz="3200" smtClean="0"/>
-              <a:t>Day 15,16,17</a:t>
+              <a:t>Kafka Security Protocols – Day 15,16,17</a:t>
             </a:r>
             <a:endParaRPr lang="en-US" sz="3200" dirty="0"/>
           </a:p>
@@ -13836,11 +13807,7 @@
             </a:pPr>
             <a:r>
               <a:rPr lang="en-US" dirty="0" smtClean="0"/>
-              <a:t>SSL - </a:t>
-            </a:r>
-            <a:r>
-              <a:rPr lang="en-US" dirty="0" smtClean="0"/>
-              <a:t>Secured </a:t>
+              <a:t>SSL - Secured </a:t>
             </a:r>
             <a:r>
               <a:rPr lang="en-US" dirty="0"/>
@@ -13892,7 +13859,6 @@
               <a:rPr lang="en-US" dirty="0" smtClean="0"/>
               <a:t>Refer Draw.io</a:t>
             </a:r>
-            <a:endParaRPr lang="en-US" dirty="0" smtClean="0"/>
           </a:p>
           <a:p>
             <a:pPr lvl="1">
@@ -13976,7 +13942,7 @@
             </a:r>
             <a:r>
               <a:rPr lang="en-US" sz="3200" dirty="0" smtClean="0"/>
-              <a:t>Day 15</a:t>
+              <a:t>Day 15,16,17</a:t>
             </a:r>
             <a:endParaRPr lang="en-US" sz="3200" dirty="0"/>
           </a:p>
@@ -14279,7 +14245,11 @@
             </a:br>
             <a:r>
               <a:rPr lang="en-US" sz="3200" dirty="0" smtClean="0"/>
-              <a:t>- Day 15</a:t>
+              <a:t>- </a:t>
+            </a:r>
+            <a:r>
+              <a:rPr lang="en-US" sz="3200" dirty="0" smtClean="0"/>
+              <a:t>Day 15,16,17</a:t>
             </a:r>
             <a:endParaRPr lang="en-US" sz="3200" dirty="0"/>
           </a:p>
@@ -14515,14 +14485,21 @@
         </p:nvSpPr>
         <p:spPr/>
         <p:txBody>
-          <a:bodyPr/>
-          <a:lstStyle/>
-          <a:p>
-            <a:r>
-              <a:rPr lang="en-US" dirty="0" smtClean="0"/>
-              <a:t>DIY Exercise - Day 15</a:t>
-            </a:r>
-            <a:endParaRPr lang="en-US" dirty="0"/>
+          <a:bodyPr>
+            <a:noAutofit/>
+          </a:bodyPr>
+          <a:lstStyle/>
+          <a:p>
+            <a:pPr lvl="1" algn="ctr" rtl="0">
+              <a:spcBef>
+                <a:spcPct val="0"/>
+              </a:spcBef>
+            </a:pPr>
+            <a:r>
+              <a:rPr lang="en-US" sz="3200" dirty="0" smtClean="0"/>
+              <a:t>SASL - Simple Authentication and Security Layer – Day 15,16,17 </a:t>
+            </a:r>
+            <a:endParaRPr lang="en-US" sz="3200" dirty="0"/>
           </a:p>
         </p:txBody>
       </p:sp>
@@ -14543,19 +14520,843 @@
           </a:bodyPr>
           <a:lstStyle/>
           <a:p>
-            <a:pPr lvl="1">
-              <a:buFont typeface="Arial" panose="020B0604020202020204" pitchFamily="34" charset="0"/>
-              <a:buChar char="•"/>
-            </a:pPr>
-            <a:endParaRPr lang="en-US" dirty="0" smtClean="0"/>
-          </a:p>
-          <a:p>
-            <a:pPr lvl="1">
-              <a:buFont typeface="Arial" panose="020B0604020202020204" pitchFamily="34" charset="0"/>
-              <a:buChar char="•"/>
-            </a:pPr>
+            <a:endParaRPr lang="en-US" sz="1800" dirty="0" smtClean="0"/>
+          </a:p>
+          <a:p>
+            <a:endParaRPr lang="en-US" sz="1800" dirty="0" smtClean="0"/>
+          </a:p>
+          <a:p>
+            <a:r>
+              <a:rPr lang="en-US" sz="1800" dirty="0" smtClean="0"/>
+              <a:t>SASL </a:t>
+            </a:r>
+            <a:r>
+              <a:rPr lang="en-US" sz="1800" dirty="0"/>
+              <a:t>(Simple Authentication Security Layer) is a framework that provides developers of applications and shared libraries with mechanisms for authentication, data integrity-checking, and encryption</a:t>
+            </a:r>
+            <a:r>
+              <a:rPr lang="en-US" sz="1800" dirty="0" smtClean="0"/>
+              <a:t>.</a:t>
+            </a:r>
+          </a:p>
+          <a:p>
+            <a:endParaRPr lang="en-US" sz="1800" dirty="0" smtClean="0"/>
+          </a:p>
+          <a:p>
+            <a:r>
+              <a:rPr lang="en-US" sz="1800" dirty="0" smtClean="0"/>
+              <a:t>Clients using  SSL Authentication, would need the Certificates deployment overhead. Thus a Simple mechanisms such as username/password, </a:t>
+            </a:r>
+            <a:r>
+              <a:rPr lang="en-US" sz="1800" dirty="0" err="1" smtClean="0"/>
+              <a:t>Oauth</a:t>
+            </a:r>
+            <a:r>
+              <a:rPr lang="en-US" sz="1800" dirty="0" smtClean="0"/>
+              <a:t> Tokens etc. can help solve the overhead of SSL. </a:t>
+            </a:r>
+          </a:p>
+          <a:p>
+            <a:endParaRPr lang="en-US" sz="1800" dirty="0"/>
+          </a:p>
+          <a:p>
+            <a:r>
+              <a:rPr lang="en-US" sz="1800" dirty="0" smtClean="0"/>
+              <a:t>SASL is the common framework in Kafka to implement such Authentication Mechanisms.</a:t>
+            </a:r>
+          </a:p>
+          <a:p>
+            <a:endParaRPr lang="en-US" sz="1800" dirty="0" smtClean="0"/>
+          </a:p>
+          <a:p>
+            <a:endParaRPr lang="en-US" dirty="0" smtClean="0"/>
+          </a:p>
+          <a:p>
+            <a:pPr lvl="1">
+              <a:buFont typeface="Arial" panose="020B0604020202020204" pitchFamily="34" charset="0"/>
+              <a:buChar char="•"/>
+            </a:pPr>
+            <a:endParaRPr lang="en-US" dirty="0" smtClean="0"/>
+          </a:p>
+        </p:txBody>
+      </p:sp>
+    </p:spTree>
+    <p:extLst>
+      <p:ext uri="{BB962C8B-B14F-4D97-AF65-F5344CB8AC3E}">
+        <p14:creationId xmlns:p14="http://schemas.microsoft.com/office/powerpoint/2010/main" val="3868211381"/>
+      </p:ext>
+    </p:extLst>
+  </p:cSld>
+  <p:clrMapOvr>
+    <a:masterClrMapping/>
+  </p:clrMapOvr>
+  <p:timing>
+    <p:tnLst>
+      <p:par>
+        <p:cTn id="1" dur="indefinite" restart="never" nodeType="tmRoot"/>
+      </p:par>
+    </p:tnLst>
+  </p:timing>
+</p:sld>
+</file>
+
+<file path=ppt/slides/slide72.xml><?xml version="1.0" encoding="utf-8"?>
+<p:sld xmlns:a="http://schemas.openxmlformats.org/drawingml/2006/main" xmlns:r="http://schemas.openxmlformats.org/officeDocument/2006/relationships" xmlns:p="http://schemas.openxmlformats.org/presentationml/2006/main">
+  <p:cSld>
+    <p:spTree>
+      <p:nvGrpSpPr>
+        <p:cNvPr id="1" name=""/>
+        <p:cNvGrpSpPr/>
+        <p:nvPr/>
+      </p:nvGrpSpPr>
+      <p:grpSpPr>
+        <a:xfrm>
+          <a:off x="0" y="0"/>
+          <a:ext cx="0" cy="0"/>
+          <a:chOff x="0" y="0"/>
+          <a:chExt cx="0" cy="0"/>
+        </a:xfrm>
+      </p:grpSpPr>
+      <p:sp>
+        <p:nvSpPr>
+          <p:cNvPr id="2" name="Title 1"/>
+          <p:cNvSpPr>
+            <a:spLocks noGrp="1"/>
+          </p:cNvSpPr>
+          <p:nvPr>
+            <p:ph type="title"/>
+          </p:nvPr>
+        </p:nvSpPr>
+        <p:spPr/>
+        <p:txBody>
+          <a:bodyPr>
+            <a:noAutofit/>
+          </a:bodyPr>
+          <a:lstStyle/>
+          <a:p>
+            <a:pPr lvl="1" algn="ctr" rtl="0">
+              <a:spcBef>
+                <a:spcPct val="0"/>
+              </a:spcBef>
+            </a:pPr>
+            <a:r>
+              <a:rPr lang="en-US" sz="3200" dirty="0" smtClean="0"/>
+              <a:t>SASL - Simple Authentication and Security Layer – Day 15,16,17 </a:t>
+            </a:r>
+            <a:endParaRPr lang="en-US" sz="3200" dirty="0"/>
+          </a:p>
+        </p:txBody>
+      </p:sp>
+      <p:sp>
+        <p:nvSpPr>
+          <p:cNvPr id="3" name="Content Placeholder 2"/>
+          <p:cNvSpPr>
+            <a:spLocks noGrp="1"/>
+          </p:cNvSpPr>
+          <p:nvPr>
+            <p:ph idx="1"/>
+          </p:nvPr>
+        </p:nvSpPr>
+        <p:spPr/>
+        <p:txBody>
+          <a:bodyPr>
+            <a:normAutofit fontScale="85000" lnSpcReduction="20000"/>
+          </a:bodyPr>
+          <a:lstStyle/>
+          <a:p>
+            <a:endParaRPr lang="en-US" sz="1800" dirty="0" smtClean="0"/>
+          </a:p>
+          <a:p>
+            <a:pPr marL="0" indent="0">
+              <a:buNone/>
+            </a:pPr>
+            <a:r>
+              <a:rPr lang="en-US" sz="1800" dirty="0" smtClean="0"/>
+              <a:t>SASL enables implementing following </a:t>
+            </a:r>
+            <a:r>
+              <a:rPr lang="en-US" sz="1800" dirty="0" err="1" smtClean="0"/>
+              <a:t>Auth</a:t>
+            </a:r>
+            <a:r>
+              <a:rPr lang="en-US" sz="1800" dirty="0" smtClean="0"/>
+              <a:t> mechanisms</a:t>
+            </a:r>
+          </a:p>
+          <a:p>
+            <a:endParaRPr lang="en-US" sz="1800" dirty="0" smtClean="0"/>
+          </a:p>
+          <a:p>
+            <a:pPr lvl="1"/>
+            <a:r>
+              <a:rPr lang="en-US" sz="1400" dirty="0" smtClean="0"/>
+              <a:t>GSSAPI (Generic Security Services Application Programming Interface)</a:t>
+            </a:r>
+          </a:p>
+          <a:p>
+            <a:pPr marL="457200" lvl="1" indent="0">
+              <a:buNone/>
+            </a:pPr>
+            <a:r>
+              <a:rPr lang="en-US" sz="1400" dirty="0" smtClean="0"/>
+              <a:t>	Uses Kerberos or Active Directory server for authentication</a:t>
+            </a:r>
+          </a:p>
+          <a:p>
+            <a:pPr lvl="1"/>
+            <a:endParaRPr lang="en-US" sz="1400" dirty="0" smtClean="0"/>
+          </a:p>
+          <a:p>
+            <a:pPr lvl="1"/>
+            <a:r>
+              <a:rPr lang="en-US" sz="1400" dirty="0" smtClean="0"/>
+              <a:t>OAUTHBEARER</a:t>
+            </a:r>
+          </a:p>
+          <a:p>
+            <a:pPr marL="457200" lvl="1" indent="0">
+              <a:buNone/>
+            </a:pPr>
+            <a:r>
+              <a:rPr lang="en-US" sz="1400" dirty="0" smtClean="0"/>
+              <a:t>	Enables </a:t>
+            </a:r>
+            <a:r>
+              <a:rPr lang="en-US" sz="1400" dirty="0"/>
+              <a:t>the use the OAuth 2 Authorization framework in a SASL </a:t>
+            </a:r>
+            <a:r>
+              <a:rPr lang="en-US" sz="1400" dirty="0" smtClean="0"/>
+              <a:t>context.</a:t>
+            </a:r>
+          </a:p>
+          <a:p>
+            <a:pPr marL="457200" lvl="1" indent="0">
+              <a:buNone/>
+            </a:pPr>
+            <a:endParaRPr lang="en-US" sz="1400" dirty="0" smtClean="0"/>
+          </a:p>
+          <a:p>
+            <a:pPr lvl="1"/>
+            <a:r>
+              <a:rPr lang="en-US" sz="1400" b="1" dirty="0"/>
+              <a:t>SCRAM </a:t>
+            </a:r>
+            <a:r>
+              <a:rPr lang="en-US" sz="1400" b="1" dirty="0" smtClean="0"/>
+              <a:t>(Salted Challenge Response Authentication Mechanism)</a:t>
+            </a:r>
+          </a:p>
+          <a:p>
+            <a:pPr marL="457200" lvl="1" indent="0">
+              <a:buNone/>
+            </a:pPr>
+            <a:r>
+              <a:rPr lang="en-US" sz="1400" b="1" dirty="0" smtClean="0"/>
+              <a:t>	Uses </a:t>
+            </a:r>
+            <a:r>
+              <a:rPr lang="en-US" sz="1400" b="1" dirty="0"/>
+              <a:t>usernames and passwords stored in </a:t>
+            </a:r>
+            <a:r>
+              <a:rPr lang="en-US" sz="1400" b="1" dirty="0" err="1"/>
+              <a:t>ZooKeeper</a:t>
+            </a:r>
+            <a:r>
+              <a:rPr lang="en-US" sz="1400" b="1" dirty="0"/>
+              <a:t>. Credentials are created during installation.</a:t>
+            </a:r>
+            <a:endParaRPr lang="en-US" sz="1400" b="1" dirty="0" smtClean="0"/>
+          </a:p>
+          <a:p>
+            <a:pPr lvl="1"/>
+            <a:endParaRPr lang="en-US" sz="1400" dirty="0" smtClean="0"/>
+          </a:p>
+          <a:p>
+            <a:pPr lvl="1"/>
+            <a:r>
+              <a:rPr lang="en-US" sz="1400" dirty="0" smtClean="0"/>
+              <a:t>PLAIN</a:t>
+            </a:r>
+          </a:p>
+          <a:p>
+            <a:pPr marL="457200" lvl="1" indent="0">
+              <a:buNone/>
+            </a:pPr>
+            <a:r>
+              <a:rPr lang="en-US" sz="1400" dirty="0" smtClean="0"/>
+              <a:t>	Uses </a:t>
+            </a:r>
+            <a:r>
+              <a:rPr lang="en-US" sz="1400" dirty="0"/>
+              <a:t>a simple username and password for authentication.</a:t>
+            </a:r>
+          </a:p>
+          <a:p>
+            <a:pPr lvl="1"/>
+            <a:endParaRPr lang="en-US" sz="1400" dirty="0" smtClean="0"/>
+          </a:p>
+          <a:p>
+            <a:pPr lvl="1"/>
+            <a:r>
+              <a:rPr lang="en-US" sz="1400" dirty="0" smtClean="0"/>
+              <a:t>Delegation</a:t>
+            </a:r>
+            <a:endParaRPr lang="en-US" sz="1400" dirty="0"/>
+          </a:p>
+          <a:p>
+            <a:pPr lvl="1"/>
+            <a:endParaRPr lang="en-US" sz="1400" dirty="0" smtClean="0"/>
+          </a:p>
+          <a:p>
+            <a:pPr lvl="1"/>
+            <a:r>
+              <a:rPr lang="en-US" sz="1400" dirty="0" smtClean="0"/>
+              <a:t>LDAP</a:t>
+            </a:r>
+          </a:p>
+          <a:p>
+            <a:pPr lvl="1"/>
+            <a:endParaRPr lang="en-US" sz="1400" dirty="0" smtClean="0"/>
+          </a:p>
+          <a:p>
+            <a:pPr marL="457200" lvl="1" indent="0">
+              <a:buNone/>
+            </a:pPr>
+            <a:r>
+              <a:rPr lang="en-US" sz="1400" dirty="0"/>
+              <a:t>Ref: </a:t>
+            </a:r>
+            <a:r>
+              <a:rPr lang="en-US" sz="1400" dirty="0">
+                <a:hlinkClick r:id="rId2"/>
+              </a:rPr>
+              <a:t>https://</a:t>
+            </a:r>
+            <a:r>
+              <a:rPr lang="en-US" sz="1400" dirty="0" smtClean="0">
+                <a:hlinkClick r:id="rId2"/>
+              </a:rPr>
+              <a:t>docs.confluent.io/platform/current/kafka/overview-authentication-methods.html#mtls</a:t>
+            </a:r>
+            <a:endParaRPr lang="en-US" sz="1400" dirty="0" smtClean="0"/>
+          </a:p>
+          <a:p>
+            <a:pPr marL="457200" lvl="1" indent="0">
+              <a:buNone/>
+            </a:pPr>
+            <a:r>
+              <a:rPr lang="en-US" sz="1400" dirty="0" smtClean="0">
+                <a:hlinkClick r:id="rId3"/>
+              </a:rPr>
+              <a:t>https</a:t>
+            </a:r>
+            <a:r>
+              <a:rPr lang="en-US" sz="1400" dirty="0">
+                <a:hlinkClick r:id="rId3"/>
+              </a:rPr>
+              <a:t>://kafka.apache.org/documentation/#</a:t>
+            </a:r>
+            <a:r>
+              <a:rPr lang="en-US" sz="1400" dirty="0" smtClean="0">
+                <a:hlinkClick r:id="rId3"/>
+              </a:rPr>
+              <a:t>security</a:t>
+            </a:r>
+            <a:endParaRPr lang="en-US" sz="1400" dirty="0" smtClean="0"/>
+          </a:p>
+          <a:p>
+            <a:pPr marL="457200" lvl="1" indent="0">
+              <a:buNone/>
+            </a:pPr>
+            <a:r>
+              <a:rPr lang="en-US" sz="1400" dirty="0"/>
+              <a:t> </a:t>
+            </a:r>
+            <a:endParaRPr lang="en-US" sz="1400" dirty="0" smtClean="0"/>
+          </a:p>
+          <a:p>
+            <a:pPr lvl="1"/>
+            <a:endParaRPr lang="en-US" sz="1400" dirty="0" smtClean="0"/>
+          </a:p>
+          <a:p>
+            <a:endParaRPr lang="en-US" sz="1800" dirty="0" smtClean="0"/>
+          </a:p>
+          <a:p>
+            <a:endParaRPr lang="en-US" dirty="0" smtClean="0"/>
+          </a:p>
+          <a:p>
+            <a:pPr lvl="1">
+              <a:buFont typeface="Arial" panose="020B0604020202020204" pitchFamily="34" charset="0"/>
+              <a:buChar char="•"/>
+            </a:pPr>
+            <a:endParaRPr lang="en-US" dirty="0" smtClean="0"/>
+          </a:p>
+        </p:txBody>
+      </p:sp>
+    </p:spTree>
+    <p:extLst>
+      <p:ext uri="{BB962C8B-B14F-4D97-AF65-F5344CB8AC3E}">
+        <p14:creationId xmlns:p14="http://schemas.microsoft.com/office/powerpoint/2010/main" val="4044770538"/>
+      </p:ext>
+    </p:extLst>
+  </p:cSld>
+  <p:clrMapOvr>
+    <a:masterClrMapping/>
+  </p:clrMapOvr>
+  <p:timing>
+    <p:tnLst>
+      <p:par>
+        <p:cTn id="1" dur="indefinite" restart="never" nodeType="tmRoot"/>
+      </p:par>
+    </p:tnLst>
+  </p:timing>
+</p:sld>
+</file>
+
+<file path=ppt/slides/slide73.xml><?xml version="1.0" encoding="utf-8"?>
+<p:sld xmlns:a="http://schemas.openxmlformats.org/drawingml/2006/main" xmlns:r="http://schemas.openxmlformats.org/officeDocument/2006/relationships" xmlns:p="http://schemas.openxmlformats.org/presentationml/2006/main">
+  <p:cSld>
+    <p:spTree>
+      <p:nvGrpSpPr>
+        <p:cNvPr id="1" name=""/>
+        <p:cNvGrpSpPr/>
+        <p:nvPr/>
+      </p:nvGrpSpPr>
+      <p:grpSpPr>
+        <a:xfrm>
+          <a:off x="0" y="0"/>
+          <a:ext cx="0" cy="0"/>
+          <a:chOff x="0" y="0"/>
+          <a:chExt cx="0" cy="0"/>
+        </a:xfrm>
+      </p:grpSpPr>
+      <p:sp>
+        <p:nvSpPr>
+          <p:cNvPr id="2" name="Title 1"/>
+          <p:cNvSpPr>
+            <a:spLocks noGrp="1"/>
+          </p:cNvSpPr>
+          <p:nvPr>
+            <p:ph type="title"/>
+          </p:nvPr>
+        </p:nvSpPr>
+        <p:spPr/>
+        <p:txBody>
+          <a:bodyPr>
+            <a:noAutofit/>
+          </a:bodyPr>
+          <a:lstStyle/>
+          <a:p>
+            <a:pPr lvl="1" algn="ctr" rtl="0">
+              <a:spcBef>
+                <a:spcPct val="0"/>
+              </a:spcBef>
+            </a:pPr>
+            <a:r>
+              <a:rPr lang="en-US" sz="3200" dirty="0" smtClean="0"/>
+              <a:t>SCRAM – Salted Challenge Response Authentication Mechanism – Day 15,16,17 </a:t>
+            </a:r>
+            <a:endParaRPr lang="en-US" sz="3200" dirty="0"/>
+          </a:p>
+        </p:txBody>
+      </p:sp>
+      <p:sp>
+        <p:nvSpPr>
+          <p:cNvPr id="3" name="Content Placeholder 2"/>
+          <p:cNvSpPr>
+            <a:spLocks noGrp="1"/>
+          </p:cNvSpPr>
+          <p:nvPr>
+            <p:ph idx="1"/>
+          </p:nvPr>
+        </p:nvSpPr>
+        <p:spPr/>
+        <p:txBody>
+          <a:bodyPr>
+            <a:normAutofit/>
+          </a:bodyPr>
+          <a:lstStyle/>
+          <a:p>
+            <a:endParaRPr lang="en-US" sz="1800" dirty="0" smtClean="0"/>
+          </a:p>
+          <a:p>
+            <a:pPr lvl="1"/>
+            <a:endParaRPr lang="en-US" sz="1400" dirty="0" smtClean="0"/>
+          </a:p>
+          <a:p>
+            <a:pPr lvl="1">
+              <a:buFont typeface="Wingdings" panose="05000000000000000000" pitchFamily="2" charset="2"/>
+              <a:buChar char="§"/>
+            </a:pPr>
+            <a:r>
+              <a:rPr lang="en-US" sz="1400" dirty="0"/>
+              <a:t>Salted Challenge Response Authentication Mechanism (SCRAM), or SASL/SCRAM, is a family of SASL mechanisms that addresses the security concerns with traditional mechanisms that perform username/password authentication like </a:t>
+            </a:r>
+            <a:r>
+              <a:rPr lang="en-US" sz="1400" dirty="0" smtClean="0"/>
+              <a:t>PLAIN.</a:t>
+            </a:r>
+          </a:p>
+          <a:p>
+            <a:pPr lvl="1">
+              <a:buFont typeface="Wingdings" panose="05000000000000000000" pitchFamily="2" charset="2"/>
+              <a:buChar char="§"/>
+            </a:pPr>
+            <a:endParaRPr lang="en-US" sz="1400" dirty="0"/>
+          </a:p>
+          <a:p>
+            <a:pPr lvl="1">
+              <a:buFont typeface="Wingdings" panose="05000000000000000000" pitchFamily="2" charset="2"/>
+              <a:buChar char="§"/>
+            </a:pPr>
+            <a:r>
+              <a:rPr lang="en-US" sz="1400" dirty="0" smtClean="0"/>
+              <a:t>Authentication of secrets/passwords is done securely by transmitting a computed hash</a:t>
+            </a:r>
+          </a:p>
+          <a:p>
+            <a:pPr lvl="1">
+              <a:buFont typeface="Wingdings" panose="05000000000000000000" pitchFamily="2" charset="2"/>
+              <a:buChar char="§"/>
+            </a:pPr>
+            <a:endParaRPr lang="en-US" sz="1400" dirty="0" smtClean="0"/>
+          </a:p>
+          <a:p>
+            <a:pPr lvl="1">
+              <a:buFont typeface="Wingdings" panose="05000000000000000000" pitchFamily="2" charset="2"/>
+              <a:buChar char="§"/>
+            </a:pPr>
+            <a:r>
+              <a:rPr lang="en-US" sz="1400" dirty="0" smtClean="0"/>
+              <a:t>The </a:t>
+            </a:r>
+            <a:r>
+              <a:rPr lang="en-US" sz="1400" dirty="0"/>
+              <a:t>SCRAM implementation in Kafka stores SCRAM credentials in </a:t>
+            </a:r>
+            <a:r>
+              <a:rPr lang="en-US" sz="1400" dirty="0" err="1" smtClean="0"/>
+              <a:t>ZooKeeper</a:t>
+            </a:r>
+            <a:r>
+              <a:rPr lang="en-US" sz="1400" dirty="0" smtClean="0"/>
+              <a:t>. </a:t>
+            </a:r>
+            <a:r>
+              <a:rPr lang="en-US" sz="1400" dirty="0"/>
+              <a:t>Because of this, you must create SCRAM credentials for users in </a:t>
+            </a:r>
+            <a:r>
+              <a:rPr lang="en-US" sz="1400" dirty="0" err="1"/>
+              <a:t>ZooKeeper</a:t>
+            </a:r>
+            <a:r>
+              <a:rPr lang="en-US" sz="1400" dirty="0" smtClean="0"/>
+              <a:t>.</a:t>
+            </a:r>
+          </a:p>
+          <a:p>
+            <a:pPr lvl="1">
+              <a:buFont typeface="Wingdings" panose="05000000000000000000" pitchFamily="2" charset="2"/>
+              <a:buChar char="§"/>
+            </a:pPr>
+            <a:endParaRPr lang="en-US" sz="1400" dirty="0"/>
+          </a:p>
+          <a:p>
+            <a:pPr lvl="1">
+              <a:buFont typeface="Wingdings" panose="05000000000000000000" pitchFamily="2" charset="2"/>
+              <a:buChar char="§"/>
+            </a:pPr>
+            <a:r>
+              <a:rPr lang="en-US" sz="1400" dirty="0" smtClean="0"/>
+              <a:t>Supported Hash functions are SHA 256 and SHA 252</a:t>
+            </a:r>
+          </a:p>
+          <a:p>
+            <a:pPr marL="457200" lvl="1" indent="0">
+              <a:buNone/>
+            </a:pPr>
+            <a:endParaRPr lang="en-US" sz="1400" dirty="0" smtClean="0"/>
+          </a:p>
+          <a:p>
+            <a:pPr marL="457200" lvl="1" indent="0">
+              <a:buNone/>
+            </a:pPr>
+            <a:endParaRPr lang="en-US" sz="1400" dirty="0" smtClean="0"/>
+          </a:p>
+          <a:p>
+            <a:pPr marL="457200" lvl="1" indent="0">
+              <a:buNone/>
+            </a:pPr>
+            <a:r>
+              <a:rPr lang="en-US" sz="1400" dirty="0" smtClean="0"/>
+              <a:t>Ref</a:t>
+            </a:r>
+            <a:r>
+              <a:rPr lang="en-US" sz="1400" dirty="0"/>
+              <a:t>: </a:t>
+            </a:r>
+            <a:r>
+              <a:rPr lang="en-US" sz="1400" dirty="0">
+                <a:hlinkClick r:id="rId2"/>
+              </a:rPr>
+              <a:t>https://</a:t>
+            </a:r>
+            <a:r>
+              <a:rPr lang="en-US" sz="1400" dirty="0" smtClean="0">
+                <a:hlinkClick r:id="rId2"/>
+              </a:rPr>
+              <a:t>docs.confluent.io/platform/current/kafka/authentication_sasl/authentication_sasl_scram.html#configuring-scram</a:t>
+            </a:r>
+            <a:endParaRPr lang="en-US" sz="1400" dirty="0" smtClean="0"/>
+          </a:p>
+          <a:p>
+            <a:pPr marL="457200" lvl="1" indent="0">
+              <a:buNone/>
+            </a:pPr>
+            <a:r>
+              <a:rPr lang="en-US" sz="1400" dirty="0" smtClean="0"/>
+              <a:t> </a:t>
+            </a:r>
+          </a:p>
+          <a:p>
+            <a:pPr marL="457200" lvl="1" indent="0">
+              <a:buNone/>
+            </a:pPr>
+            <a:endParaRPr lang="en-US" sz="1400" dirty="0" smtClean="0"/>
+          </a:p>
+          <a:p>
+            <a:pPr lvl="1"/>
+            <a:endParaRPr lang="en-US" sz="1400" dirty="0" smtClean="0"/>
+          </a:p>
+          <a:p>
+            <a:endParaRPr lang="en-US" sz="1800" dirty="0" smtClean="0"/>
+          </a:p>
+          <a:p>
+            <a:endParaRPr lang="en-US" dirty="0" smtClean="0"/>
+          </a:p>
+          <a:p>
+            <a:pPr lvl="1">
+              <a:buFont typeface="Arial" panose="020B0604020202020204" pitchFamily="34" charset="0"/>
+              <a:buChar char="•"/>
+            </a:pPr>
+            <a:endParaRPr lang="en-US" dirty="0" smtClean="0"/>
+          </a:p>
+        </p:txBody>
+      </p:sp>
+    </p:spTree>
+    <p:extLst>
+      <p:ext uri="{BB962C8B-B14F-4D97-AF65-F5344CB8AC3E}">
+        <p14:creationId xmlns:p14="http://schemas.microsoft.com/office/powerpoint/2010/main" val="2252494316"/>
+      </p:ext>
+    </p:extLst>
+  </p:cSld>
+  <p:clrMapOvr>
+    <a:masterClrMapping/>
+  </p:clrMapOvr>
+  <p:timing>
+    <p:tnLst>
+      <p:par>
+        <p:cTn id="1" dur="indefinite" restart="never" nodeType="tmRoot"/>
+      </p:par>
+    </p:tnLst>
+  </p:timing>
+</p:sld>
+</file>
+
+<file path=ppt/slides/slide74.xml><?xml version="1.0" encoding="utf-8"?>
+<p:sld xmlns:a="http://schemas.openxmlformats.org/drawingml/2006/main" xmlns:r="http://schemas.openxmlformats.org/officeDocument/2006/relationships" xmlns:p="http://schemas.openxmlformats.org/presentationml/2006/main">
+  <p:cSld>
+    <p:spTree>
+      <p:nvGrpSpPr>
+        <p:cNvPr id="1" name=""/>
+        <p:cNvGrpSpPr/>
+        <p:nvPr/>
+      </p:nvGrpSpPr>
+      <p:grpSpPr>
+        <a:xfrm>
+          <a:off x="0" y="0"/>
+          <a:ext cx="0" cy="0"/>
+          <a:chOff x="0" y="0"/>
+          <a:chExt cx="0" cy="0"/>
+        </a:xfrm>
+      </p:grpSpPr>
+      <p:sp>
+        <p:nvSpPr>
+          <p:cNvPr id="2" name="Title 1"/>
+          <p:cNvSpPr>
+            <a:spLocks noGrp="1"/>
+          </p:cNvSpPr>
+          <p:nvPr>
+            <p:ph type="title"/>
+          </p:nvPr>
+        </p:nvSpPr>
+        <p:spPr/>
+        <p:txBody>
+          <a:bodyPr>
+            <a:noAutofit/>
+          </a:bodyPr>
+          <a:lstStyle/>
+          <a:p>
+            <a:pPr lvl="1" algn="ctr" rtl="0">
+              <a:spcBef>
+                <a:spcPct val="0"/>
+              </a:spcBef>
+            </a:pPr>
+            <a:r>
+              <a:rPr lang="en-US" sz="3200" dirty="0" smtClean="0"/>
+              <a:t>Authorization – Day 15,16,17 </a:t>
+            </a:r>
+            <a:endParaRPr lang="en-US" sz="3200" dirty="0"/>
+          </a:p>
+        </p:txBody>
+      </p:sp>
+      <p:sp>
+        <p:nvSpPr>
+          <p:cNvPr id="3" name="Content Placeholder 2"/>
+          <p:cNvSpPr>
+            <a:spLocks noGrp="1"/>
+          </p:cNvSpPr>
+          <p:nvPr>
+            <p:ph idx="1"/>
+          </p:nvPr>
+        </p:nvSpPr>
+        <p:spPr/>
+        <p:txBody>
+          <a:bodyPr>
+            <a:normAutofit/>
+          </a:bodyPr>
+          <a:lstStyle/>
+          <a:p>
+            <a:endParaRPr lang="en-US" sz="1800" dirty="0" smtClean="0"/>
+          </a:p>
+          <a:p>
+            <a:pPr lvl="1"/>
+            <a:endParaRPr lang="en-US" sz="1400" dirty="0" smtClean="0"/>
+          </a:p>
+          <a:p>
+            <a:pPr marL="457200" lvl="1" indent="0">
+              <a:buNone/>
+            </a:pPr>
+            <a:r>
+              <a:rPr lang="en-US" sz="1400" dirty="0" smtClean="0"/>
+              <a:t>Draw.io </a:t>
+            </a:r>
+          </a:p>
+          <a:p>
+            <a:pPr marL="457200" lvl="1" indent="0">
+              <a:buNone/>
+            </a:pPr>
+            <a:endParaRPr lang="en-US" sz="1400" dirty="0" smtClean="0"/>
+          </a:p>
+          <a:p>
+            <a:pPr lvl="1"/>
+            <a:endParaRPr lang="en-US" sz="1400" dirty="0" smtClean="0"/>
+          </a:p>
+          <a:p>
+            <a:endParaRPr lang="en-US" sz="1800" dirty="0" smtClean="0"/>
+          </a:p>
+          <a:p>
+            <a:endParaRPr lang="en-US" dirty="0" smtClean="0"/>
+          </a:p>
+          <a:p>
+            <a:pPr lvl="1">
+              <a:buFont typeface="Arial" panose="020B0604020202020204" pitchFamily="34" charset="0"/>
+              <a:buChar char="•"/>
+            </a:pPr>
+            <a:endParaRPr lang="en-US" dirty="0" smtClean="0"/>
+          </a:p>
+        </p:txBody>
+      </p:sp>
+    </p:spTree>
+    <p:extLst>
+      <p:ext uri="{BB962C8B-B14F-4D97-AF65-F5344CB8AC3E}">
+        <p14:creationId xmlns:p14="http://schemas.microsoft.com/office/powerpoint/2010/main" val="1673072215"/>
+      </p:ext>
+    </p:extLst>
+  </p:cSld>
+  <p:clrMapOvr>
+    <a:masterClrMapping/>
+  </p:clrMapOvr>
+  <p:timing>
+    <p:tnLst>
+      <p:par>
+        <p:cTn id="1" dur="indefinite" restart="never" nodeType="tmRoot"/>
+      </p:par>
+    </p:tnLst>
+  </p:timing>
+</p:sld>
+</file>
+
+<file path=ppt/slides/slide75.xml><?xml version="1.0" encoding="utf-8"?>
+<p:sld xmlns:a="http://schemas.openxmlformats.org/drawingml/2006/main" xmlns:r="http://schemas.openxmlformats.org/officeDocument/2006/relationships" xmlns:p="http://schemas.openxmlformats.org/presentationml/2006/main">
+  <p:cSld>
+    <p:spTree>
+      <p:nvGrpSpPr>
+        <p:cNvPr id="1" name=""/>
+        <p:cNvGrpSpPr/>
+        <p:nvPr/>
+      </p:nvGrpSpPr>
+      <p:grpSpPr>
+        <a:xfrm>
+          <a:off x="0" y="0"/>
+          <a:ext cx="0" cy="0"/>
+          <a:chOff x="0" y="0"/>
+          <a:chExt cx="0" cy="0"/>
+        </a:xfrm>
+      </p:grpSpPr>
+      <p:sp>
+        <p:nvSpPr>
+          <p:cNvPr id="2" name="Title 1"/>
+          <p:cNvSpPr>
+            <a:spLocks noGrp="1"/>
+          </p:cNvSpPr>
+          <p:nvPr>
+            <p:ph type="title"/>
+          </p:nvPr>
+        </p:nvSpPr>
+        <p:spPr/>
+        <p:txBody>
+          <a:bodyPr/>
+          <a:lstStyle/>
+          <a:p>
+            <a:r>
+              <a:rPr lang="en-US" dirty="0" smtClean="0"/>
+              <a:t>DIY Exercise - Day </a:t>
+            </a:r>
+            <a:r>
+              <a:rPr lang="en-US" dirty="0" smtClean="0"/>
+              <a:t>15, 16, 17</a:t>
+            </a:r>
             <a:endParaRPr lang="en-US" dirty="0"/>
           </a:p>
+        </p:txBody>
+      </p:sp>
+      <p:sp>
+        <p:nvSpPr>
+          <p:cNvPr id="3" name="Content Placeholder 2"/>
+          <p:cNvSpPr>
+            <a:spLocks noGrp="1"/>
+          </p:cNvSpPr>
+          <p:nvPr>
+            <p:ph idx="1"/>
+          </p:nvPr>
+        </p:nvSpPr>
+        <p:spPr/>
+        <p:txBody>
+          <a:bodyPr>
+            <a:normAutofit/>
+          </a:bodyPr>
+          <a:lstStyle/>
+          <a:p>
+            <a:pPr lvl="1">
+              <a:buFont typeface="Arial" panose="020B0604020202020204" pitchFamily="34" charset="0"/>
+              <a:buChar char="•"/>
+            </a:pPr>
+            <a:endParaRPr lang="en-US" dirty="0"/>
+          </a:p>
           <a:p>
             <a:pPr lvl="1">
               <a:buFont typeface="Arial" panose="020B0604020202020204" pitchFamily="34" charset="0"/>
@@ -14580,7 +15381,28 @@
             </a:pPr>
             <a:r>
               <a:rPr lang="en-US" dirty="0" smtClean="0"/>
-              <a:t>Configure 2 way SSL between Zookeeper and Kafka Servers</a:t>
+              <a:t>Configure 2 way SSL between Zookeeper and Kafka </a:t>
+            </a:r>
+            <a:r>
+              <a:rPr lang="en-US" dirty="0" smtClean="0"/>
+              <a:t>Servers</a:t>
+            </a:r>
+          </a:p>
+          <a:p>
+            <a:pPr lvl="1">
+              <a:buFont typeface="Arial" panose="020B0604020202020204" pitchFamily="34" charset="0"/>
+              <a:buChar char="•"/>
+            </a:pPr>
+            <a:endParaRPr lang="en-US" dirty="0" smtClean="0"/>
+          </a:p>
+          <a:p>
+            <a:pPr lvl="1">
+              <a:buFont typeface="Arial" panose="020B0604020202020204" pitchFamily="34" charset="0"/>
+              <a:buChar char="•"/>
+            </a:pPr>
+            <a:r>
+              <a:rPr lang="en-US" dirty="0" smtClean="0"/>
+              <a:t>Setup WSL and setup Kafka deployment and setup SASL based topology</a:t>
             </a:r>
             <a:endParaRPr lang="en-US" dirty="0" smtClean="0"/>
           </a:p>

</xml_diff>

<commit_message>
Updated streams in ppt and diagrams
Updated streams in ppt and diagrams
</commit_message>
<xml_diff>
--- a/PPT/Kafka-Teaching-Flow.pptx
+++ b/PPT/Kafka-Teaching-Flow.pptx
@@ -80,6 +80,12 @@
     <p:sldId id="336" r:id="rId74"/>
     <p:sldId id="337" r:id="rId75"/>
     <p:sldId id="329" r:id="rId76"/>
+    <p:sldId id="338" r:id="rId77"/>
+    <p:sldId id="339" r:id="rId78"/>
+    <p:sldId id="340" r:id="rId79"/>
+    <p:sldId id="341" r:id="rId80"/>
+    <p:sldId id="342" r:id="rId81"/>
+    <p:sldId id="343" r:id="rId82"/>
   </p:sldIdLst>
   <p:sldSz cx="9144000" cy="6858000" type="screen4x3"/>
   <p:notesSz cx="6858000" cy="9144000"/>
@@ -362,7 +368,7 @@
           <a:p>
             <a:fld id="{51149E06-0874-4241-ABF9-BAFA45916F2C}" type="datetimeFigureOut">
               <a:rPr lang="en-US" smtClean="0"/>
-              <a:t>3/14/2023</a:t>
+              <a:t>3/21/2023</a:t>
             </a:fld>
             <a:endParaRPr lang="en-US"/>
           </a:p>
@@ -532,7 +538,7 @@
           <a:p>
             <a:fld id="{51149E06-0874-4241-ABF9-BAFA45916F2C}" type="datetimeFigureOut">
               <a:rPr lang="en-US" smtClean="0"/>
-              <a:t>3/14/2023</a:t>
+              <a:t>3/21/2023</a:t>
             </a:fld>
             <a:endParaRPr lang="en-US"/>
           </a:p>
@@ -712,7 +718,7 @@
           <a:p>
             <a:fld id="{51149E06-0874-4241-ABF9-BAFA45916F2C}" type="datetimeFigureOut">
               <a:rPr lang="en-US" smtClean="0"/>
-              <a:t>3/14/2023</a:t>
+              <a:t>3/21/2023</a:t>
             </a:fld>
             <a:endParaRPr lang="en-US"/>
           </a:p>
@@ -882,7 +888,7 @@
           <a:p>
             <a:fld id="{51149E06-0874-4241-ABF9-BAFA45916F2C}" type="datetimeFigureOut">
               <a:rPr lang="en-US" smtClean="0"/>
-              <a:t>3/14/2023</a:t>
+              <a:t>3/21/2023</a:t>
             </a:fld>
             <a:endParaRPr lang="en-US"/>
           </a:p>
@@ -1128,7 +1134,7 @@
           <a:p>
             <a:fld id="{51149E06-0874-4241-ABF9-BAFA45916F2C}" type="datetimeFigureOut">
               <a:rPr lang="en-US" smtClean="0"/>
-              <a:t>3/14/2023</a:t>
+              <a:t>3/21/2023</a:t>
             </a:fld>
             <a:endParaRPr lang="en-US"/>
           </a:p>
@@ -1416,7 +1422,7 @@
           <a:p>
             <a:fld id="{51149E06-0874-4241-ABF9-BAFA45916F2C}" type="datetimeFigureOut">
               <a:rPr lang="en-US" smtClean="0"/>
-              <a:t>3/14/2023</a:t>
+              <a:t>3/21/2023</a:t>
             </a:fld>
             <a:endParaRPr lang="en-US"/>
           </a:p>
@@ -1838,7 +1844,7 @@
           <a:p>
             <a:fld id="{51149E06-0874-4241-ABF9-BAFA45916F2C}" type="datetimeFigureOut">
               <a:rPr lang="en-US" smtClean="0"/>
-              <a:t>3/14/2023</a:t>
+              <a:t>3/21/2023</a:t>
             </a:fld>
             <a:endParaRPr lang="en-US"/>
           </a:p>
@@ -1956,7 +1962,7 @@
           <a:p>
             <a:fld id="{51149E06-0874-4241-ABF9-BAFA45916F2C}" type="datetimeFigureOut">
               <a:rPr lang="en-US" smtClean="0"/>
-              <a:t>3/14/2023</a:t>
+              <a:t>3/21/2023</a:t>
             </a:fld>
             <a:endParaRPr lang="en-US"/>
           </a:p>
@@ -2051,7 +2057,7 @@
           <a:p>
             <a:fld id="{51149E06-0874-4241-ABF9-BAFA45916F2C}" type="datetimeFigureOut">
               <a:rPr lang="en-US" smtClean="0"/>
-              <a:t>3/14/2023</a:t>
+              <a:t>3/21/2023</a:t>
             </a:fld>
             <a:endParaRPr lang="en-US"/>
           </a:p>
@@ -2328,7 +2334,7 @@
           <a:p>
             <a:fld id="{51149E06-0874-4241-ABF9-BAFA45916F2C}" type="datetimeFigureOut">
               <a:rPr lang="en-US" smtClean="0"/>
-              <a:t>3/14/2023</a:t>
+              <a:t>3/21/2023</a:t>
             </a:fld>
             <a:endParaRPr lang="en-US"/>
           </a:p>
@@ -2581,7 +2587,7 @@
           <a:p>
             <a:fld id="{51149E06-0874-4241-ABF9-BAFA45916F2C}" type="datetimeFigureOut">
               <a:rPr lang="en-US" smtClean="0"/>
-              <a:t>3/14/2023</a:t>
+              <a:t>3/21/2023</a:t>
             </a:fld>
             <a:endParaRPr lang="en-US"/>
           </a:p>
@@ -2794,7 +2800,7 @@
           <a:p>
             <a:fld id="{51149E06-0874-4241-ABF9-BAFA45916F2C}" type="datetimeFigureOut">
               <a:rPr lang="en-US" smtClean="0"/>
-              <a:t>3/14/2023</a:t>
+              <a:t>3/21/2023</a:t>
             </a:fld>
             <a:endParaRPr lang="en-US"/>
           </a:p>
@@ -13938,11 +13944,7 @@
             </a:r>
             <a:r>
               <a:rPr lang="en-US" sz="3200" dirty="0" smtClean="0"/>
-              <a:t>- </a:t>
-            </a:r>
-            <a:r>
-              <a:rPr lang="en-US" sz="3200" dirty="0" smtClean="0"/>
-              <a:t>Day 15,16,17</a:t>
+              <a:t>- Day 15,16,17</a:t>
             </a:r>
             <a:endParaRPr lang="en-US" sz="3200" dirty="0"/>
           </a:p>
@@ -14245,11 +14247,7 @@
             </a:br>
             <a:r>
               <a:rPr lang="en-US" sz="3200" dirty="0" smtClean="0"/>
-              <a:t>- </a:t>
-            </a:r>
-            <a:r>
-              <a:rPr lang="en-US" sz="3200" dirty="0" smtClean="0"/>
-              <a:t>Day 15,16,17</a:t>
+              <a:t>- Day 15,16,17</a:t>
             </a:r>
             <a:endParaRPr lang="en-US" sz="3200" dirty="0"/>
           </a:p>
@@ -15324,11 +15322,7 @@
           <a:p>
             <a:r>
               <a:rPr lang="en-US" dirty="0" smtClean="0"/>
-              <a:t>DIY Exercise - Day </a:t>
-            </a:r>
-            <a:r>
-              <a:rPr lang="en-US" dirty="0" smtClean="0"/>
-              <a:t>15, 16, 17</a:t>
+              <a:t>DIY Exercise - Day 15, 16, 17</a:t>
             </a:r>
             <a:endParaRPr lang="en-US" dirty="0"/>
           </a:p>
@@ -15381,11 +15375,7 @@
             </a:pPr>
             <a:r>
               <a:rPr lang="en-US" dirty="0" smtClean="0"/>
-              <a:t>Configure 2 way SSL between Zookeeper and Kafka </a:t>
-            </a:r>
-            <a:r>
-              <a:rPr lang="en-US" dirty="0" smtClean="0"/>
-              <a:t>Servers</a:t>
+              <a:t>Configure 2 way SSL between Zookeeper and Kafka Servers</a:t>
             </a:r>
           </a:p>
           <a:p>
@@ -15404,7 +15394,6 @@
               <a:rPr lang="en-US" dirty="0" smtClean="0"/>
               <a:t>Setup WSL and setup Kafka deployment and setup SASL based topology</a:t>
             </a:r>
-            <a:endParaRPr lang="en-US" dirty="0" smtClean="0"/>
           </a:p>
           <a:p>
             <a:pPr lvl="1">
@@ -15419,6 +15408,712 @@
     <p:extLst>
       <p:ext uri="{BB962C8B-B14F-4D97-AF65-F5344CB8AC3E}">
         <p14:creationId xmlns:p14="http://schemas.microsoft.com/office/powerpoint/2010/main" val="549754311"/>
+      </p:ext>
+    </p:extLst>
+  </p:cSld>
+  <p:clrMapOvr>
+    <a:masterClrMapping/>
+  </p:clrMapOvr>
+  <p:timing>
+    <p:tnLst>
+      <p:par>
+        <p:cTn id="1" dur="indefinite" restart="never" nodeType="tmRoot"/>
+      </p:par>
+    </p:tnLst>
+  </p:timing>
+</p:sld>
+</file>
+
+<file path=ppt/slides/slide76.xml><?xml version="1.0" encoding="utf-8"?>
+<p:sld xmlns:a="http://schemas.openxmlformats.org/drawingml/2006/main" xmlns:r="http://schemas.openxmlformats.org/officeDocument/2006/relationships" xmlns:p="http://schemas.openxmlformats.org/presentationml/2006/main">
+  <p:cSld>
+    <p:spTree>
+      <p:nvGrpSpPr>
+        <p:cNvPr id="1" name=""/>
+        <p:cNvGrpSpPr/>
+        <p:nvPr/>
+      </p:nvGrpSpPr>
+      <p:grpSpPr>
+        <a:xfrm>
+          <a:off x="0" y="0"/>
+          <a:ext cx="0" cy="0"/>
+          <a:chOff x="0" y="0"/>
+          <a:chExt cx="0" cy="0"/>
+        </a:xfrm>
+      </p:grpSpPr>
+      <p:sp>
+        <p:nvSpPr>
+          <p:cNvPr id="2" name="Title 1"/>
+          <p:cNvSpPr>
+            <a:spLocks noGrp="1"/>
+          </p:cNvSpPr>
+          <p:nvPr>
+            <p:ph type="title"/>
+          </p:nvPr>
+        </p:nvSpPr>
+        <p:spPr/>
+        <p:txBody>
+          <a:bodyPr/>
+          <a:lstStyle/>
+          <a:p>
+            <a:r>
+              <a:rPr lang="en-US" dirty="0" smtClean="0"/>
+              <a:t>Day </a:t>
+            </a:r>
+            <a:r>
+              <a:rPr lang="en-US" dirty="0" smtClean="0"/>
+              <a:t>18</a:t>
+            </a:r>
+            <a:endParaRPr lang="en-US" dirty="0"/>
+          </a:p>
+        </p:txBody>
+      </p:sp>
+      <p:sp>
+        <p:nvSpPr>
+          <p:cNvPr id="3" name="Content Placeholder 2"/>
+          <p:cNvSpPr>
+            <a:spLocks noGrp="1"/>
+          </p:cNvSpPr>
+          <p:nvPr>
+            <p:ph idx="1"/>
+          </p:nvPr>
+        </p:nvSpPr>
+        <p:spPr/>
+        <p:txBody>
+          <a:bodyPr>
+            <a:normAutofit/>
+          </a:bodyPr>
+          <a:lstStyle/>
+          <a:p>
+            <a:pPr marL="0" indent="0">
+              <a:buNone/>
+            </a:pPr>
+            <a:r>
+              <a:rPr lang="en-US" b="1" dirty="0" smtClean="0"/>
+              <a:t>Theme</a:t>
+            </a:r>
+          </a:p>
+          <a:p>
+            <a:pPr lvl="1"/>
+            <a:endParaRPr lang="en-US" dirty="0" smtClean="0"/>
+          </a:p>
+          <a:p>
+            <a:pPr marL="457200" lvl="1" indent="0">
+              <a:buNone/>
+            </a:pPr>
+            <a:endParaRPr lang="en-US" dirty="0"/>
+          </a:p>
+          <a:p>
+            <a:pPr lvl="1">
+              <a:buFont typeface="Arial" panose="020B0604020202020204" pitchFamily="34" charset="0"/>
+              <a:buChar char="•"/>
+            </a:pPr>
+            <a:r>
+              <a:rPr lang="en-US" dirty="0" smtClean="0"/>
+              <a:t>Handling Data Streams from Kafka Topics</a:t>
+            </a:r>
+            <a:endParaRPr lang="en-US" dirty="0" smtClean="0"/>
+          </a:p>
+          <a:p>
+            <a:pPr lvl="1">
+              <a:buFont typeface="Arial" panose="020B0604020202020204" pitchFamily="34" charset="0"/>
+              <a:buChar char="•"/>
+            </a:pPr>
+            <a:endParaRPr lang="en-US" dirty="0" smtClean="0"/>
+          </a:p>
+          <a:p>
+            <a:pPr lvl="1">
+              <a:buFont typeface="Arial" panose="020B0604020202020204" pitchFamily="34" charset="0"/>
+              <a:buChar char="•"/>
+            </a:pPr>
+            <a:endParaRPr lang="en-US" dirty="0" smtClean="0"/>
+          </a:p>
+          <a:p>
+            <a:pPr marL="457200" lvl="1" indent="0">
+              <a:buNone/>
+            </a:pPr>
+            <a:endParaRPr lang="en-US" dirty="0" smtClean="0"/>
+          </a:p>
+          <a:p>
+            <a:pPr lvl="1"/>
+            <a:endParaRPr lang="en-US" dirty="0" smtClean="0"/>
+          </a:p>
+        </p:txBody>
+      </p:sp>
+    </p:spTree>
+    <p:extLst>
+      <p:ext uri="{BB962C8B-B14F-4D97-AF65-F5344CB8AC3E}">
+        <p14:creationId xmlns:p14="http://schemas.microsoft.com/office/powerpoint/2010/main" val="152729484"/>
+      </p:ext>
+    </p:extLst>
+  </p:cSld>
+  <p:clrMapOvr>
+    <a:masterClrMapping/>
+  </p:clrMapOvr>
+  <p:timing>
+    <p:tnLst>
+      <p:par>
+        <p:cTn id="1" dur="indefinite" restart="never" nodeType="tmRoot"/>
+      </p:par>
+    </p:tnLst>
+  </p:timing>
+</p:sld>
+</file>
+
+<file path=ppt/slides/slide77.xml><?xml version="1.0" encoding="utf-8"?>
+<p:sld xmlns:a="http://schemas.openxmlformats.org/drawingml/2006/main" xmlns:r="http://schemas.openxmlformats.org/officeDocument/2006/relationships" xmlns:p="http://schemas.openxmlformats.org/presentationml/2006/main">
+  <p:cSld>
+    <p:spTree>
+      <p:nvGrpSpPr>
+        <p:cNvPr id="1" name=""/>
+        <p:cNvGrpSpPr/>
+        <p:nvPr/>
+      </p:nvGrpSpPr>
+      <p:grpSpPr>
+        <a:xfrm>
+          <a:off x="0" y="0"/>
+          <a:ext cx="0" cy="0"/>
+          <a:chOff x="0" y="0"/>
+          <a:chExt cx="0" cy="0"/>
+        </a:xfrm>
+      </p:grpSpPr>
+      <p:sp>
+        <p:nvSpPr>
+          <p:cNvPr id="2" name="Title 1"/>
+          <p:cNvSpPr>
+            <a:spLocks noGrp="1"/>
+          </p:cNvSpPr>
+          <p:nvPr>
+            <p:ph type="title"/>
+          </p:nvPr>
+        </p:nvSpPr>
+        <p:spPr/>
+        <p:txBody>
+          <a:bodyPr/>
+          <a:lstStyle/>
+          <a:p>
+            <a:r>
+              <a:rPr lang="en-US" dirty="0" smtClean="0"/>
+              <a:t>Agenda - Day </a:t>
+            </a:r>
+            <a:r>
+              <a:rPr lang="en-US" dirty="0" smtClean="0"/>
+              <a:t>18</a:t>
+            </a:r>
+            <a:endParaRPr lang="en-US" dirty="0"/>
+          </a:p>
+        </p:txBody>
+      </p:sp>
+      <p:sp>
+        <p:nvSpPr>
+          <p:cNvPr id="3" name="Content Placeholder 2"/>
+          <p:cNvSpPr>
+            <a:spLocks noGrp="1"/>
+          </p:cNvSpPr>
+          <p:nvPr>
+            <p:ph idx="1"/>
+          </p:nvPr>
+        </p:nvSpPr>
+        <p:spPr/>
+        <p:txBody>
+          <a:bodyPr>
+            <a:normAutofit fontScale="85000" lnSpcReduction="20000"/>
+          </a:bodyPr>
+          <a:lstStyle/>
+          <a:p>
+            <a:pPr lvl="1">
+              <a:buFont typeface="Arial" panose="020B0604020202020204" pitchFamily="34" charset="0"/>
+              <a:buChar char="•"/>
+            </a:pPr>
+            <a:endParaRPr lang="en-US" dirty="0" smtClean="0"/>
+          </a:p>
+          <a:p>
+            <a:pPr lvl="1">
+              <a:buFont typeface="Arial" panose="020B0604020202020204" pitchFamily="34" charset="0"/>
+              <a:buChar char="•"/>
+            </a:pPr>
+            <a:r>
+              <a:rPr lang="en-US" dirty="0"/>
+              <a:t>Day </a:t>
+            </a:r>
+            <a:r>
+              <a:rPr lang="en-US" dirty="0" smtClean="0"/>
+              <a:t>15, 16, 17  </a:t>
+            </a:r>
+            <a:r>
+              <a:rPr lang="en-US" dirty="0"/>
+              <a:t>Recap &amp; </a:t>
+            </a:r>
+            <a:r>
+              <a:rPr lang="en-US" dirty="0" err="1"/>
+              <a:t>QnA</a:t>
+            </a:r>
+            <a:endParaRPr lang="en-US" dirty="0"/>
+          </a:p>
+          <a:p>
+            <a:pPr lvl="1">
+              <a:buFont typeface="Arial" panose="020B0604020202020204" pitchFamily="34" charset="0"/>
+              <a:buChar char="•"/>
+            </a:pPr>
+            <a:endParaRPr lang="en-US" dirty="0" smtClean="0"/>
+          </a:p>
+          <a:p>
+            <a:pPr lvl="1">
+              <a:buFont typeface="Arial" panose="020B0604020202020204" pitchFamily="34" charset="0"/>
+              <a:buChar char="•"/>
+            </a:pPr>
+            <a:r>
+              <a:rPr lang="en-US" dirty="0" smtClean="0"/>
+              <a:t>Kafka Streams – Introduction</a:t>
+            </a:r>
+          </a:p>
+          <a:p>
+            <a:pPr lvl="1">
+              <a:buFont typeface="Arial" panose="020B0604020202020204" pitchFamily="34" charset="0"/>
+              <a:buChar char="•"/>
+            </a:pPr>
+            <a:endParaRPr lang="en-US" dirty="0" smtClean="0"/>
+          </a:p>
+          <a:p>
+            <a:pPr lvl="1">
+              <a:buFont typeface="Arial" panose="020B0604020202020204" pitchFamily="34" charset="0"/>
+              <a:buChar char="•"/>
+            </a:pPr>
+            <a:r>
+              <a:rPr lang="en-US" dirty="0" smtClean="0"/>
+              <a:t>Streaming Frameworks</a:t>
+            </a:r>
+          </a:p>
+          <a:p>
+            <a:pPr lvl="1">
+              <a:buFont typeface="Arial" panose="020B0604020202020204" pitchFamily="34" charset="0"/>
+              <a:buChar char="•"/>
+            </a:pPr>
+            <a:endParaRPr lang="en-US" dirty="0"/>
+          </a:p>
+          <a:p>
+            <a:pPr lvl="1">
+              <a:buFont typeface="Arial" panose="020B0604020202020204" pitchFamily="34" charset="0"/>
+              <a:buChar char="•"/>
+            </a:pPr>
+            <a:r>
+              <a:rPr lang="en-US" dirty="0" smtClean="0"/>
+              <a:t>Kafka Streaming Concepts</a:t>
+            </a:r>
+            <a:endParaRPr lang="en-US" dirty="0" smtClean="0"/>
+          </a:p>
+          <a:p>
+            <a:pPr lvl="1">
+              <a:buFont typeface="Arial" panose="020B0604020202020204" pitchFamily="34" charset="0"/>
+              <a:buChar char="•"/>
+            </a:pPr>
+            <a:endParaRPr lang="en-US" dirty="0" smtClean="0"/>
+          </a:p>
+          <a:p>
+            <a:pPr lvl="1">
+              <a:buFont typeface="Arial" panose="020B0604020202020204" pitchFamily="34" charset="0"/>
+              <a:buChar char="•"/>
+            </a:pPr>
+            <a:r>
+              <a:rPr lang="en-US" dirty="0" smtClean="0"/>
+              <a:t>End-to-End Kafka Streaming Application</a:t>
+            </a:r>
+          </a:p>
+          <a:p>
+            <a:pPr lvl="2"/>
+            <a:endParaRPr lang="en-US" dirty="0" smtClean="0"/>
+          </a:p>
+          <a:p>
+            <a:pPr lvl="1">
+              <a:buFont typeface="Arial" panose="020B0604020202020204" pitchFamily="34" charset="0"/>
+              <a:buChar char="•"/>
+            </a:pPr>
+            <a:r>
+              <a:rPr lang="en-US" dirty="0" smtClean="0"/>
+              <a:t>Kafka Streaming Architecture</a:t>
+            </a:r>
+            <a:endParaRPr lang="en-US" dirty="0" smtClean="0"/>
+          </a:p>
+        </p:txBody>
+      </p:sp>
+    </p:spTree>
+    <p:extLst>
+      <p:ext uri="{BB962C8B-B14F-4D97-AF65-F5344CB8AC3E}">
+        <p14:creationId xmlns:p14="http://schemas.microsoft.com/office/powerpoint/2010/main" val="3778348586"/>
+      </p:ext>
+    </p:extLst>
+  </p:cSld>
+  <p:clrMapOvr>
+    <a:masterClrMapping/>
+  </p:clrMapOvr>
+  <p:timing>
+    <p:tnLst>
+      <p:par>
+        <p:cTn id="1" dur="indefinite" restart="never" nodeType="tmRoot"/>
+      </p:par>
+    </p:tnLst>
+  </p:timing>
+</p:sld>
+</file>
+
+<file path=ppt/slides/slide78.xml><?xml version="1.0" encoding="utf-8"?>
+<p:sld xmlns:a="http://schemas.openxmlformats.org/drawingml/2006/main" xmlns:r="http://schemas.openxmlformats.org/officeDocument/2006/relationships" xmlns:p="http://schemas.openxmlformats.org/presentationml/2006/main">
+  <p:cSld>
+    <p:spTree>
+      <p:nvGrpSpPr>
+        <p:cNvPr id="1" name=""/>
+        <p:cNvGrpSpPr/>
+        <p:nvPr/>
+      </p:nvGrpSpPr>
+      <p:grpSpPr>
+        <a:xfrm>
+          <a:off x="0" y="0"/>
+          <a:ext cx="0" cy="0"/>
+          <a:chOff x="0" y="0"/>
+          <a:chExt cx="0" cy="0"/>
+        </a:xfrm>
+      </p:grpSpPr>
+      <p:sp>
+        <p:nvSpPr>
+          <p:cNvPr id="2" name="Title 1"/>
+          <p:cNvSpPr>
+            <a:spLocks noGrp="1"/>
+          </p:cNvSpPr>
+          <p:nvPr>
+            <p:ph type="title"/>
+          </p:nvPr>
+        </p:nvSpPr>
+        <p:spPr/>
+        <p:txBody>
+          <a:bodyPr>
+            <a:noAutofit/>
+          </a:bodyPr>
+          <a:lstStyle/>
+          <a:p>
+            <a:pPr lvl="1" algn="ctr" rtl="0">
+              <a:spcBef>
+                <a:spcPct val="0"/>
+              </a:spcBef>
+            </a:pPr>
+            <a:r>
+              <a:rPr lang="en-US" sz="3600" dirty="0" smtClean="0"/>
+              <a:t>Kafka Streams – Introduction - </a:t>
+            </a:r>
+            <a:r>
+              <a:rPr lang="en-US" sz="3600" dirty="0" smtClean="0"/>
+              <a:t>Day </a:t>
+            </a:r>
+            <a:r>
+              <a:rPr lang="en-US" sz="3600" dirty="0" smtClean="0"/>
+              <a:t>18</a:t>
+            </a:r>
+            <a:endParaRPr lang="en-US" sz="3600" dirty="0"/>
+          </a:p>
+        </p:txBody>
+      </p:sp>
+      <p:sp>
+        <p:nvSpPr>
+          <p:cNvPr id="3" name="Content Placeholder 2"/>
+          <p:cNvSpPr>
+            <a:spLocks noGrp="1"/>
+          </p:cNvSpPr>
+          <p:nvPr>
+            <p:ph idx="1"/>
+          </p:nvPr>
+        </p:nvSpPr>
+        <p:spPr/>
+        <p:txBody>
+          <a:bodyPr>
+            <a:normAutofit fontScale="92500" lnSpcReduction="20000"/>
+          </a:bodyPr>
+          <a:lstStyle/>
+          <a:p>
+            <a:pPr lvl="1">
+              <a:buFont typeface="Arial" panose="020B0604020202020204" pitchFamily="34" charset="0"/>
+              <a:buChar char="•"/>
+            </a:pPr>
+            <a:r>
+              <a:rPr lang="en-US" dirty="0" smtClean="0"/>
+              <a:t>Data Processing and transformation library within Kafka SDK</a:t>
+            </a:r>
+          </a:p>
+          <a:p>
+            <a:pPr lvl="1">
+              <a:buFont typeface="Arial" panose="020B0604020202020204" pitchFamily="34" charset="0"/>
+              <a:buChar char="•"/>
+            </a:pPr>
+            <a:endParaRPr lang="en-US" dirty="0" smtClean="0"/>
+          </a:p>
+          <a:p>
+            <a:pPr lvl="1">
+              <a:buFont typeface="Arial" panose="020B0604020202020204" pitchFamily="34" charset="0"/>
+              <a:buChar char="•"/>
+            </a:pPr>
+            <a:r>
+              <a:rPr lang="en-US" dirty="0" smtClean="0"/>
+              <a:t>Standard Java Application</a:t>
+            </a:r>
+          </a:p>
+          <a:p>
+            <a:pPr lvl="1">
+              <a:buFont typeface="Arial" panose="020B0604020202020204" pitchFamily="34" charset="0"/>
+              <a:buChar char="•"/>
+            </a:pPr>
+            <a:endParaRPr lang="en-US" dirty="0" smtClean="0"/>
+          </a:p>
+          <a:p>
+            <a:pPr lvl="1">
+              <a:buFont typeface="Arial" panose="020B0604020202020204" pitchFamily="34" charset="0"/>
+              <a:buChar char="•"/>
+            </a:pPr>
+            <a:r>
+              <a:rPr lang="en-US" dirty="0" smtClean="0"/>
+              <a:t>Highly Scalable, elastic, fault tolerant</a:t>
+            </a:r>
+          </a:p>
+          <a:p>
+            <a:pPr lvl="1">
+              <a:buFont typeface="Arial" panose="020B0604020202020204" pitchFamily="34" charset="0"/>
+              <a:buChar char="•"/>
+            </a:pPr>
+            <a:endParaRPr lang="en-US" dirty="0" smtClean="0"/>
+          </a:p>
+          <a:p>
+            <a:pPr lvl="1">
+              <a:buFont typeface="Arial" panose="020B0604020202020204" pitchFamily="34" charset="0"/>
+              <a:buChar char="•"/>
+            </a:pPr>
+            <a:r>
+              <a:rPr lang="en-US" dirty="0" smtClean="0"/>
+              <a:t>Exactly Ones Capability</a:t>
+            </a:r>
+          </a:p>
+          <a:p>
+            <a:pPr lvl="1">
+              <a:buFont typeface="Arial" panose="020B0604020202020204" pitchFamily="34" charset="0"/>
+              <a:buChar char="•"/>
+            </a:pPr>
+            <a:endParaRPr lang="en-US" dirty="0" smtClean="0"/>
+          </a:p>
+          <a:p>
+            <a:pPr lvl="1">
+              <a:buFont typeface="Arial" panose="020B0604020202020204" pitchFamily="34" charset="0"/>
+              <a:buChar char="•"/>
+            </a:pPr>
+            <a:r>
+              <a:rPr lang="en-US" dirty="0" smtClean="0"/>
+              <a:t>One Record at a time Processing. True streaming and not Batching</a:t>
+            </a:r>
+            <a:endParaRPr lang="en-US" dirty="0" smtClean="0"/>
+          </a:p>
+        </p:txBody>
+      </p:sp>
+    </p:spTree>
+    <p:extLst>
+      <p:ext uri="{BB962C8B-B14F-4D97-AF65-F5344CB8AC3E}">
+        <p14:creationId xmlns:p14="http://schemas.microsoft.com/office/powerpoint/2010/main" val="2161747199"/>
+      </p:ext>
+    </p:extLst>
+  </p:cSld>
+  <p:clrMapOvr>
+    <a:masterClrMapping/>
+  </p:clrMapOvr>
+  <p:timing>
+    <p:tnLst>
+      <p:par>
+        <p:cTn id="1" dur="indefinite" restart="never" nodeType="tmRoot"/>
+      </p:par>
+    </p:tnLst>
+  </p:timing>
+</p:sld>
+</file>
+
+<file path=ppt/slides/slide79.xml><?xml version="1.0" encoding="utf-8"?>
+<p:sld xmlns:a="http://schemas.openxmlformats.org/drawingml/2006/main" xmlns:r="http://schemas.openxmlformats.org/officeDocument/2006/relationships" xmlns:p="http://schemas.openxmlformats.org/presentationml/2006/main">
+  <p:cSld>
+    <p:spTree>
+      <p:nvGrpSpPr>
+        <p:cNvPr id="1" name=""/>
+        <p:cNvGrpSpPr/>
+        <p:nvPr/>
+      </p:nvGrpSpPr>
+      <p:grpSpPr>
+        <a:xfrm>
+          <a:off x="0" y="0"/>
+          <a:ext cx="0" cy="0"/>
+          <a:chOff x="0" y="0"/>
+          <a:chExt cx="0" cy="0"/>
+        </a:xfrm>
+      </p:grpSpPr>
+      <p:sp>
+        <p:nvSpPr>
+          <p:cNvPr id="2" name="Title 1"/>
+          <p:cNvSpPr>
+            <a:spLocks noGrp="1"/>
+          </p:cNvSpPr>
+          <p:nvPr>
+            <p:ph type="title"/>
+          </p:nvPr>
+        </p:nvSpPr>
+        <p:spPr/>
+        <p:txBody>
+          <a:bodyPr>
+            <a:noAutofit/>
+          </a:bodyPr>
+          <a:lstStyle/>
+          <a:p>
+            <a:pPr lvl="1" algn="ctr" rtl="0">
+              <a:spcBef>
+                <a:spcPct val="0"/>
+              </a:spcBef>
+            </a:pPr>
+            <a:r>
+              <a:rPr lang="en-US" sz="3600" dirty="0" smtClean="0"/>
+              <a:t>Streaming Frameworks - </a:t>
+            </a:r>
+            <a:r>
+              <a:rPr lang="en-US" sz="3600" dirty="0" smtClean="0"/>
+              <a:t>Day </a:t>
+            </a:r>
+            <a:r>
+              <a:rPr lang="en-US" sz="3600" dirty="0" smtClean="0"/>
+              <a:t>18</a:t>
+            </a:r>
+            <a:endParaRPr lang="en-US" sz="3600" dirty="0"/>
+          </a:p>
+        </p:txBody>
+      </p:sp>
+      <p:sp>
+        <p:nvSpPr>
+          <p:cNvPr id="3" name="Content Placeholder 2"/>
+          <p:cNvSpPr>
+            <a:spLocks noGrp="1"/>
+          </p:cNvSpPr>
+          <p:nvPr>
+            <p:ph idx="1"/>
+          </p:nvPr>
+        </p:nvSpPr>
+        <p:spPr/>
+        <p:txBody>
+          <a:bodyPr>
+            <a:normAutofit fontScale="92500" lnSpcReduction="10000"/>
+          </a:bodyPr>
+          <a:lstStyle/>
+          <a:p>
+            <a:pPr lvl="1">
+              <a:buFont typeface="Arial" panose="020B0604020202020204" pitchFamily="34" charset="0"/>
+              <a:buChar char="•"/>
+            </a:pPr>
+            <a:r>
+              <a:rPr lang="en-US" dirty="0" smtClean="0"/>
+              <a:t>Other Streaming Frameworks – </a:t>
+            </a:r>
+            <a:r>
+              <a:rPr lang="en-US" dirty="0" err="1" smtClean="0"/>
+              <a:t>Flink</a:t>
+            </a:r>
+            <a:r>
+              <a:rPr lang="en-US" dirty="0" smtClean="0"/>
+              <a:t>, Storm, Spark etc.,</a:t>
+            </a:r>
+          </a:p>
+          <a:p>
+            <a:pPr lvl="1">
+              <a:buFont typeface="Arial" panose="020B0604020202020204" pitchFamily="34" charset="0"/>
+              <a:buChar char="•"/>
+            </a:pPr>
+            <a:endParaRPr lang="en-US" dirty="0" smtClean="0"/>
+          </a:p>
+          <a:p>
+            <a:pPr lvl="1">
+              <a:buFont typeface="Arial" panose="020B0604020202020204" pitchFamily="34" charset="0"/>
+              <a:buChar char="•"/>
+            </a:pPr>
+            <a:r>
+              <a:rPr lang="en-US" dirty="0" smtClean="0"/>
+              <a:t>Micro batching vs per </a:t>
+            </a:r>
+            <a:r>
+              <a:rPr lang="en-US" dirty="0"/>
+              <a:t>D</a:t>
+            </a:r>
+            <a:r>
+              <a:rPr lang="en-US" dirty="0" smtClean="0"/>
+              <a:t>ata </a:t>
+            </a:r>
+            <a:r>
+              <a:rPr lang="en-US" dirty="0" smtClean="0"/>
+              <a:t>S</a:t>
+            </a:r>
+            <a:r>
+              <a:rPr lang="en-US" dirty="0" smtClean="0"/>
+              <a:t>treaming</a:t>
+            </a:r>
+          </a:p>
+          <a:p>
+            <a:pPr lvl="1">
+              <a:buFont typeface="Arial" panose="020B0604020202020204" pitchFamily="34" charset="0"/>
+              <a:buChar char="•"/>
+            </a:pPr>
+            <a:endParaRPr lang="en-US" dirty="0"/>
+          </a:p>
+          <a:p>
+            <a:pPr lvl="1">
+              <a:buFont typeface="Arial" panose="020B0604020202020204" pitchFamily="34" charset="0"/>
+              <a:buChar char="•"/>
+            </a:pPr>
+            <a:r>
+              <a:rPr lang="en-US" dirty="0" smtClean="0"/>
+              <a:t>Cluster versus No Cluster</a:t>
+            </a:r>
+          </a:p>
+          <a:p>
+            <a:pPr lvl="1">
+              <a:buFont typeface="Arial" panose="020B0604020202020204" pitchFamily="34" charset="0"/>
+              <a:buChar char="•"/>
+            </a:pPr>
+            <a:endParaRPr lang="en-US" dirty="0" smtClean="0"/>
+          </a:p>
+          <a:p>
+            <a:pPr lvl="1">
+              <a:buFont typeface="Arial" panose="020B0604020202020204" pitchFamily="34" charset="0"/>
+              <a:buChar char="•"/>
+            </a:pPr>
+            <a:r>
+              <a:rPr lang="en-US" dirty="0" smtClean="0"/>
+              <a:t>Scaling easily (No Configuration needed)</a:t>
+            </a:r>
+          </a:p>
+          <a:p>
+            <a:pPr lvl="1">
+              <a:buFont typeface="Arial" panose="020B0604020202020204" pitchFamily="34" charset="0"/>
+              <a:buChar char="•"/>
+            </a:pPr>
+            <a:endParaRPr lang="en-US" dirty="0" smtClean="0"/>
+          </a:p>
+          <a:p>
+            <a:pPr lvl="1">
+              <a:buFont typeface="Arial" panose="020B0604020202020204" pitchFamily="34" charset="0"/>
+              <a:buChar char="•"/>
+            </a:pPr>
+            <a:r>
+              <a:rPr lang="en-US" dirty="0" smtClean="0"/>
+              <a:t>Exactly Ones vs At least Ones</a:t>
+            </a:r>
+          </a:p>
+          <a:p>
+            <a:pPr lvl="1">
+              <a:buFont typeface="Arial" panose="020B0604020202020204" pitchFamily="34" charset="0"/>
+              <a:buChar char="•"/>
+            </a:pPr>
+            <a:endParaRPr lang="en-US" dirty="0" smtClean="0"/>
+          </a:p>
+        </p:txBody>
+      </p:sp>
+    </p:spTree>
+    <p:extLst>
+      <p:ext uri="{BB962C8B-B14F-4D97-AF65-F5344CB8AC3E}">
+        <p14:creationId xmlns:p14="http://schemas.microsoft.com/office/powerpoint/2010/main" val="3008349822"/>
       </p:ext>
     </p:extLst>
   </p:cSld>
@@ -15604,6 +16299,383 @@
     <p:extLst>
       <p:ext uri="{BB962C8B-B14F-4D97-AF65-F5344CB8AC3E}">
         <p14:creationId xmlns:p14="http://schemas.microsoft.com/office/powerpoint/2010/main" val="3037516435"/>
+      </p:ext>
+    </p:extLst>
+  </p:cSld>
+  <p:clrMapOvr>
+    <a:masterClrMapping/>
+  </p:clrMapOvr>
+  <p:timing>
+    <p:tnLst>
+      <p:par>
+        <p:cTn id="1" dur="indefinite" restart="never" nodeType="tmRoot"/>
+      </p:par>
+    </p:tnLst>
+  </p:timing>
+</p:sld>
+</file>
+
+<file path=ppt/slides/slide80.xml><?xml version="1.0" encoding="utf-8"?>
+<p:sld xmlns:a="http://schemas.openxmlformats.org/drawingml/2006/main" xmlns:r="http://schemas.openxmlformats.org/officeDocument/2006/relationships" xmlns:p="http://schemas.openxmlformats.org/presentationml/2006/main">
+  <p:cSld>
+    <p:spTree>
+      <p:nvGrpSpPr>
+        <p:cNvPr id="1" name=""/>
+        <p:cNvGrpSpPr/>
+        <p:nvPr/>
+      </p:nvGrpSpPr>
+      <p:grpSpPr>
+        <a:xfrm>
+          <a:off x="0" y="0"/>
+          <a:ext cx="0" cy="0"/>
+          <a:chOff x="0" y="0"/>
+          <a:chExt cx="0" cy="0"/>
+        </a:xfrm>
+      </p:grpSpPr>
+      <p:sp>
+        <p:nvSpPr>
+          <p:cNvPr id="2" name="Title 1"/>
+          <p:cNvSpPr>
+            <a:spLocks noGrp="1"/>
+          </p:cNvSpPr>
+          <p:nvPr>
+            <p:ph type="title"/>
+          </p:nvPr>
+        </p:nvSpPr>
+        <p:spPr/>
+        <p:txBody>
+          <a:bodyPr>
+            <a:noAutofit/>
+          </a:bodyPr>
+          <a:lstStyle/>
+          <a:p>
+            <a:pPr lvl="1" algn="ctr" rtl="0">
+              <a:spcBef>
+                <a:spcPct val="0"/>
+              </a:spcBef>
+            </a:pPr>
+            <a:r>
+              <a:rPr lang="en-US" sz="3600" dirty="0" smtClean="0"/>
+              <a:t>Kafka Streaming Concepts – Day 18</a:t>
+            </a:r>
+            <a:endParaRPr lang="en-US" sz="3600" dirty="0"/>
+          </a:p>
+        </p:txBody>
+      </p:sp>
+      <p:sp>
+        <p:nvSpPr>
+          <p:cNvPr id="4" name="TextBox 3"/>
+          <p:cNvSpPr txBox="1"/>
+          <p:nvPr/>
+        </p:nvSpPr>
+        <p:spPr>
+          <a:xfrm>
+            <a:off x="899592" y="1763524"/>
+            <a:ext cx="3600400" cy="4524315"/>
+          </a:xfrm>
+          <a:prstGeom prst="rect">
+            <a:avLst/>
+          </a:prstGeom>
+          <a:noFill/>
+        </p:spPr>
+        <p:txBody>
+          <a:bodyPr wrap="square" rtlCol="0">
+            <a:spAutoFit/>
+          </a:bodyPr>
+          <a:lstStyle/>
+          <a:p>
+            <a:r>
+              <a:rPr lang="en-US" b="1" dirty="0" smtClean="0"/>
+              <a:t>Stream</a:t>
+            </a:r>
+          </a:p>
+          <a:p>
+            <a:r>
+              <a:rPr lang="en-US" dirty="0" smtClean="0"/>
+              <a:t>Is a sequence of immutable data records that is ordered, can be replayed, and is fault tolerant </a:t>
+            </a:r>
+          </a:p>
+          <a:p>
+            <a:endParaRPr lang="en-US" dirty="0" smtClean="0"/>
+          </a:p>
+          <a:p>
+            <a:endParaRPr lang="en-US" dirty="0"/>
+          </a:p>
+          <a:p>
+            <a:r>
+              <a:rPr lang="en-US" b="1" dirty="0" smtClean="0"/>
+              <a:t>Processors</a:t>
+            </a:r>
+          </a:p>
+          <a:p>
+            <a:r>
+              <a:rPr lang="en-US" dirty="0"/>
+              <a:t>Is a Node </a:t>
+            </a:r>
+            <a:r>
+              <a:rPr lang="en-US" dirty="0" smtClean="0"/>
+              <a:t>in the processor topology (graph). It transforms incoming streams record by record and may create a new stream from it.</a:t>
+            </a:r>
+          </a:p>
+          <a:p>
+            <a:endParaRPr lang="en-US" dirty="0"/>
+          </a:p>
+          <a:p>
+            <a:r>
+              <a:rPr lang="en-US" b="1" dirty="0" smtClean="0"/>
+              <a:t>Topology</a:t>
+            </a:r>
+          </a:p>
+          <a:p>
+            <a:r>
+              <a:rPr lang="en-US" dirty="0" smtClean="0"/>
+              <a:t>Is a graph of processors chained together by streams</a:t>
+            </a:r>
+            <a:endParaRPr lang="en-US" dirty="0"/>
+          </a:p>
+          <a:p>
+            <a:endParaRPr lang="en-US" dirty="0"/>
+          </a:p>
+        </p:txBody>
+      </p:sp>
+      <p:pic>
+        <p:nvPicPr>
+          <p:cNvPr id="1028" name="Picture 4"/>
+          <p:cNvPicPr>
+            <a:picLocks noChangeAspect="1" noChangeArrowheads="1"/>
+          </p:cNvPicPr>
+          <p:nvPr/>
+        </p:nvPicPr>
+        <p:blipFill>
+          <a:blip r:embed="rId2">
+            <a:extLst>
+              <a:ext uri="{28A0092B-C50C-407E-A947-70E740481C1C}">
+                <a14:useLocalDpi xmlns:a14="http://schemas.microsoft.com/office/drawing/2010/main" val="0"/>
+              </a:ext>
+            </a:extLst>
+          </a:blip>
+          <a:srcRect/>
+          <a:stretch>
+            <a:fillRect/>
+          </a:stretch>
+        </p:blipFill>
+        <p:spPr bwMode="auto">
+          <a:xfrm>
+            <a:off x="4499992" y="1484784"/>
+            <a:ext cx="4083546" cy="4850492"/>
+          </a:xfrm>
+          <a:prstGeom prst="rect">
+            <a:avLst/>
+          </a:prstGeom>
+          <a:noFill/>
+          <a:ln>
+            <a:noFill/>
+          </a:ln>
+          <a:extLst>
+            <a:ext uri="{909E8E84-426E-40DD-AFC4-6F175D3DCCD1}">
+              <a14:hiddenFill xmlns:a14="http://schemas.microsoft.com/office/drawing/2010/main">
+                <a:solidFill>
+                  <a:schemeClr val="accent1"/>
+                </a:solidFill>
+              </a14:hiddenFill>
+            </a:ext>
+            <a:ext uri="{91240B29-F687-4F45-9708-019B960494DF}">
+              <a14:hiddenLine xmlns:a14="http://schemas.microsoft.com/office/drawing/2010/main" w="9525">
+                <a:solidFill>
+                  <a:schemeClr val="tx1"/>
+                </a:solidFill>
+                <a:miter lim="800000"/>
+                <a:headEnd/>
+                <a:tailEnd/>
+              </a14:hiddenLine>
+            </a:ext>
+          </a:extLst>
+        </p:spPr>
+      </p:pic>
+    </p:spTree>
+    <p:extLst>
+      <p:ext uri="{BB962C8B-B14F-4D97-AF65-F5344CB8AC3E}">
+        <p14:creationId xmlns:p14="http://schemas.microsoft.com/office/powerpoint/2010/main" val="3328676338"/>
+      </p:ext>
+    </p:extLst>
+  </p:cSld>
+  <p:clrMapOvr>
+    <a:masterClrMapping/>
+  </p:clrMapOvr>
+  <p:timing>
+    <p:tnLst>
+      <p:par>
+        <p:cTn id="1" dur="indefinite" restart="never" nodeType="tmRoot"/>
+      </p:par>
+    </p:tnLst>
+  </p:timing>
+</p:sld>
+</file>
+
+<file path=ppt/slides/slide81.xml><?xml version="1.0" encoding="utf-8"?>
+<p:sld xmlns:a="http://schemas.openxmlformats.org/drawingml/2006/main" xmlns:r="http://schemas.openxmlformats.org/officeDocument/2006/relationships" xmlns:p="http://schemas.openxmlformats.org/presentationml/2006/main">
+  <p:cSld>
+    <p:spTree>
+      <p:nvGrpSpPr>
+        <p:cNvPr id="1" name=""/>
+        <p:cNvGrpSpPr/>
+        <p:nvPr/>
+      </p:nvGrpSpPr>
+      <p:grpSpPr>
+        <a:xfrm>
+          <a:off x="0" y="0"/>
+          <a:ext cx="0" cy="0"/>
+          <a:chOff x="0" y="0"/>
+          <a:chExt cx="0" cy="0"/>
+        </a:xfrm>
+      </p:grpSpPr>
+      <p:sp>
+        <p:nvSpPr>
+          <p:cNvPr id="2" name="Title 1"/>
+          <p:cNvSpPr>
+            <a:spLocks noGrp="1"/>
+          </p:cNvSpPr>
+          <p:nvPr>
+            <p:ph type="title"/>
+          </p:nvPr>
+        </p:nvSpPr>
+        <p:spPr/>
+        <p:txBody>
+          <a:bodyPr>
+            <a:noAutofit/>
+          </a:bodyPr>
+          <a:lstStyle/>
+          <a:p>
+            <a:pPr lvl="1" algn="ctr" rtl="0">
+              <a:spcBef>
+                <a:spcPct val="0"/>
+              </a:spcBef>
+            </a:pPr>
+            <a:r>
+              <a:rPr lang="en-US" sz="3600" dirty="0" smtClean="0"/>
+              <a:t>Kafka Streaming Concepts… – Day 18</a:t>
+            </a:r>
+            <a:endParaRPr lang="en-US" sz="3600" dirty="0"/>
+          </a:p>
+        </p:txBody>
+      </p:sp>
+      <p:sp>
+        <p:nvSpPr>
+          <p:cNvPr id="4" name="TextBox 3"/>
+          <p:cNvSpPr txBox="1"/>
+          <p:nvPr/>
+        </p:nvSpPr>
+        <p:spPr>
+          <a:xfrm>
+            <a:off x="899592" y="1763524"/>
+            <a:ext cx="3600400" cy="4524315"/>
+          </a:xfrm>
+          <a:prstGeom prst="rect">
+            <a:avLst/>
+          </a:prstGeom>
+          <a:noFill/>
+        </p:spPr>
+        <p:txBody>
+          <a:bodyPr wrap="square" rtlCol="0">
+            <a:spAutoFit/>
+          </a:bodyPr>
+          <a:lstStyle/>
+          <a:p>
+            <a:r>
+              <a:rPr lang="en-US" b="1" dirty="0" smtClean="0"/>
+              <a:t>Source Processor</a:t>
+            </a:r>
+          </a:p>
+          <a:p>
+            <a:r>
+              <a:rPr lang="en-US" dirty="0" smtClean="0"/>
+              <a:t>Is Special Processor that takes its data directly from a Kafka Topic. It has no predecessor Processor in a Topology and does not transform data. It however generates a Stream.</a:t>
+            </a:r>
+          </a:p>
+          <a:p>
+            <a:endParaRPr lang="en-US" dirty="0" smtClean="0"/>
+          </a:p>
+          <a:p>
+            <a:endParaRPr lang="en-US" dirty="0"/>
+          </a:p>
+          <a:p>
+            <a:r>
+              <a:rPr lang="en-US" b="1" dirty="0" smtClean="0"/>
+              <a:t>Sink Processor</a:t>
+            </a:r>
+          </a:p>
+          <a:p>
+            <a:r>
+              <a:rPr lang="en-US" dirty="0" smtClean="0"/>
+              <a:t>Is the Special Processor that does not have successors in a Topology. It sends the Stream data to the Kafka Topic directly.</a:t>
+            </a:r>
+          </a:p>
+          <a:p>
+            <a:endParaRPr lang="en-US" dirty="0"/>
+          </a:p>
+          <a:p>
+            <a:endParaRPr lang="en-US" dirty="0"/>
+          </a:p>
+        </p:txBody>
+      </p:sp>
+      <p:pic>
+        <p:nvPicPr>
+          <p:cNvPr id="2050" name="Picture 2"/>
+          <p:cNvPicPr>
+            <a:picLocks noChangeAspect="1" noChangeArrowheads="1"/>
+          </p:cNvPicPr>
+          <p:nvPr/>
+        </p:nvPicPr>
+        <p:blipFill>
+          <a:blip r:embed="rId2">
+            <a:extLst>
+              <a:ext uri="{28A0092B-C50C-407E-A947-70E740481C1C}">
+                <a14:useLocalDpi xmlns:a14="http://schemas.microsoft.com/office/drawing/2010/main" val="0"/>
+              </a:ext>
+            </a:extLst>
+          </a:blip>
+          <a:srcRect/>
+          <a:stretch>
+            <a:fillRect/>
+          </a:stretch>
+        </p:blipFill>
+        <p:spPr bwMode="auto">
+          <a:xfrm>
+            <a:off x="4427985" y="1556793"/>
+            <a:ext cx="4176463" cy="4464496"/>
+          </a:xfrm>
+          <a:prstGeom prst="rect">
+            <a:avLst/>
+          </a:prstGeom>
+          <a:noFill/>
+          <a:ln>
+            <a:noFill/>
+          </a:ln>
+          <a:extLst>
+            <a:ext uri="{909E8E84-426E-40DD-AFC4-6F175D3DCCD1}">
+              <a14:hiddenFill xmlns:a14="http://schemas.microsoft.com/office/drawing/2010/main">
+                <a:solidFill>
+                  <a:schemeClr val="accent1"/>
+                </a:solidFill>
+              </a14:hiddenFill>
+            </a:ext>
+            <a:ext uri="{91240B29-F687-4F45-9708-019B960494DF}">
+              <a14:hiddenLine xmlns:a14="http://schemas.microsoft.com/office/drawing/2010/main" w="9525">
+                <a:solidFill>
+                  <a:schemeClr val="tx1"/>
+                </a:solidFill>
+                <a:miter lim="800000"/>
+                <a:headEnd/>
+                <a:tailEnd/>
+              </a14:hiddenLine>
+            </a:ext>
+          </a:extLst>
+        </p:spPr>
+      </p:pic>
+    </p:spTree>
+    <p:extLst>
+      <p:ext uri="{BB962C8B-B14F-4D97-AF65-F5344CB8AC3E}">
+        <p14:creationId xmlns:p14="http://schemas.microsoft.com/office/powerpoint/2010/main" val="3560049508"/>
       </p:ext>
     </p:extLst>
   </p:cSld>

</xml_diff>

<commit_message>
updated diagram & ppt
updated for detailing KTables, DSL processors
</commit_message>
<xml_diff>
--- a/PPT/Kafka-Teaching-Flow.pptx
+++ b/PPT/Kafka-Teaching-Flow.pptx
@@ -92,7 +92,13 @@
     <p:sldId id="347" r:id="rId86"/>
     <p:sldId id="348" r:id="rId87"/>
     <p:sldId id="349" r:id="rId88"/>
-    <p:sldId id="350" r:id="rId89"/>
+    <p:sldId id="352" r:id="rId89"/>
+    <p:sldId id="354" r:id="rId90"/>
+    <p:sldId id="355" r:id="rId91"/>
+    <p:sldId id="351" r:id="rId92"/>
+    <p:sldId id="350" r:id="rId93"/>
+    <p:sldId id="356" r:id="rId94"/>
+    <p:sldId id="357" r:id="rId95"/>
   </p:sldIdLst>
   <p:sldSz cx="9144000" cy="6858000" type="screen4x3"/>
   <p:notesSz cx="6858000" cy="9144000"/>
@@ -375,7 +381,7 @@
           <a:p>
             <a:fld id="{51149E06-0874-4241-ABF9-BAFA45916F2C}" type="datetimeFigureOut">
               <a:rPr lang="en-US" smtClean="0"/>
-              <a:t>3/21/2023</a:t>
+              <a:t>3/22/2023</a:t>
             </a:fld>
             <a:endParaRPr lang="en-US"/>
           </a:p>
@@ -545,7 +551,7 @@
           <a:p>
             <a:fld id="{51149E06-0874-4241-ABF9-BAFA45916F2C}" type="datetimeFigureOut">
               <a:rPr lang="en-US" smtClean="0"/>
-              <a:t>3/21/2023</a:t>
+              <a:t>3/22/2023</a:t>
             </a:fld>
             <a:endParaRPr lang="en-US"/>
           </a:p>
@@ -725,7 +731,7 @@
           <a:p>
             <a:fld id="{51149E06-0874-4241-ABF9-BAFA45916F2C}" type="datetimeFigureOut">
               <a:rPr lang="en-US" smtClean="0"/>
-              <a:t>3/21/2023</a:t>
+              <a:t>3/22/2023</a:t>
             </a:fld>
             <a:endParaRPr lang="en-US"/>
           </a:p>
@@ -895,7 +901,7 @@
           <a:p>
             <a:fld id="{51149E06-0874-4241-ABF9-BAFA45916F2C}" type="datetimeFigureOut">
               <a:rPr lang="en-US" smtClean="0"/>
-              <a:t>3/21/2023</a:t>
+              <a:t>3/22/2023</a:t>
             </a:fld>
             <a:endParaRPr lang="en-US"/>
           </a:p>
@@ -1141,7 +1147,7 @@
           <a:p>
             <a:fld id="{51149E06-0874-4241-ABF9-BAFA45916F2C}" type="datetimeFigureOut">
               <a:rPr lang="en-US" smtClean="0"/>
-              <a:t>3/21/2023</a:t>
+              <a:t>3/22/2023</a:t>
             </a:fld>
             <a:endParaRPr lang="en-US"/>
           </a:p>
@@ -1429,7 +1435,7 @@
           <a:p>
             <a:fld id="{51149E06-0874-4241-ABF9-BAFA45916F2C}" type="datetimeFigureOut">
               <a:rPr lang="en-US" smtClean="0"/>
-              <a:t>3/21/2023</a:t>
+              <a:t>3/22/2023</a:t>
             </a:fld>
             <a:endParaRPr lang="en-US"/>
           </a:p>
@@ -1851,7 +1857,7 @@
           <a:p>
             <a:fld id="{51149E06-0874-4241-ABF9-BAFA45916F2C}" type="datetimeFigureOut">
               <a:rPr lang="en-US" smtClean="0"/>
-              <a:t>3/21/2023</a:t>
+              <a:t>3/22/2023</a:t>
             </a:fld>
             <a:endParaRPr lang="en-US"/>
           </a:p>
@@ -1969,7 +1975,7 @@
           <a:p>
             <a:fld id="{51149E06-0874-4241-ABF9-BAFA45916F2C}" type="datetimeFigureOut">
               <a:rPr lang="en-US" smtClean="0"/>
-              <a:t>3/21/2023</a:t>
+              <a:t>3/22/2023</a:t>
             </a:fld>
             <a:endParaRPr lang="en-US"/>
           </a:p>
@@ -2064,7 +2070,7 @@
           <a:p>
             <a:fld id="{51149E06-0874-4241-ABF9-BAFA45916F2C}" type="datetimeFigureOut">
               <a:rPr lang="en-US" smtClean="0"/>
-              <a:t>3/21/2023</a:t>
+              <a:t>3/22/2023</a:t>
             </a:fld>
             <a:endParaRPr lang="en-US"/>
           </a:p>
@@ -2341,7 +2347,7 @@
           <a:p>
             <a:fld id="{51149E06-0874-4241-ABF9-BAFA45916F2C}" type="datetimeFigureOut">
               <a:rPr lang="en-US" smtClean="0"/>
-              <a:t>3/21/2023</a:t>
+              <a:t>3/22/2023</a:t>
             </a:fld>
             <a:endParaRPr lang="en-US"/>
           </a:p>
@@ -2594,7 +2600,7 @@
           <a:p>
             <a:fld id="{51149E06-0874-4241-ABF9-BAFA45916F2C}" type="datetimeFigureOut">
               <a:rPr lang="en-US" smtClean="0"/>
-              <a:t>3/21/2023</a:t>
+              <a:t>3/22/2023</a:t>
             </a:fld>
             <a:endParaRPr lang="en-US"/>
           </a:p>
@@ -2807,7 +2813,7 @@
           <a:p>
             <a:fld id="{51149E06-0874-4241-ABF9-BAFA45916F2C}" type="datetimeFigureOut">
               <a:rPr lang="en-US" smtClean="0"/>
-              <a:t>3/21/2023</a:t>
+              <a:t>3/22/2023</a:t>
             </a:fld>
             <a:endParaRPr lang="en-US"/>
           </a:p>
@@ -16687,11 +16693,7 @@
           <a:p>
             <a:r>
               <a:rPr lang="en-US" dirty="0" smtClean="0"/>
-              <a:t>Day </a:t>
-            </a:r>
-            <a:r>
-              <a:rPr lang="en-US" dirty="0" smtClean="0"/>
-              <a:t>19</a:t>
+              <a:t>Day 19</a:t>
             </a:r>
             <a:endParaRPr lang="en-US" dirty="0"/>
           </a:p>
@@ -16741,7 +16743,6 @@
               <a:rPr lang="en-US" dirty="0" smtClean="0"/>
               <a:t>Kafka Streams Architecture and DSL (Domain Specific Language)</a:t>
             </a:r>
-            <a:endParaRPr lang="en-US" dirty="0" smtClean="0"/>
           </a:p>
           <a:p>
             <a:pPr lvl="1">
@@ -16823,11 +16824,7 @@
           <a:p>
             <a:r>
               <a:rPr lang="en-US" dirty="0" smtClean="0"/>
-              <a:t>Agenda - Day </a:t>
-            </a:r>
-            <a:r>
-              <a:rPr lang="en-US" dirty="0" smtClean="0"/>
-              <a:t>19</a:t>
+              <a:t>Agenda - Day 19</a:t>
             </a:r>
             <a:endParaRPr lang="en-US" dirty="0"/>
           </a:p>
@@ -16893,11 +16890,7 @@
             </a:pPr>
             <a:r>
               <a:rPr lang="en-US" dirty="0" smtClean="0"/>
-              <a:t>Kafka Streams </a:t>
-            </a:r>
-            <a:r>
-              <a:rPr lang="en-US" dirty="0" smtClean="0"/>
-              <a:t>Architecture</a:t>
+              <a:t>Kafka Streams Architecture</a:t>
             </a:r>
           </a:p>
           <a:p>
@@ -17012,15 +17005,7 @@
             </a:r>
             <a:r>
               <a:rPr lang="en-US" sz="3200" dirty="0" smtClean="0"/>
-              <a:t>- </a:t>
-            </a:r>
-            <a:r>
-              <a:rPr lang="en-US" sz="3200" dirty="0" smtClean="0"/>
-              <a:t>Day </a:t>
-            </a:r>
-            <a:r>
-              <a:rPr lang="en-US" sz="3200" dirty="0" smtClean="0"/>
-              <a:t>19</a:t>
+              <a:t>- Day 19</a:t>
             </a:r>
             <a:endParaRPr lang="en-US" sz="3200" dirty="0"/>
           </a:p>
@@ -17134,15 +17119,7 @@
           <a:p>
             <a:r>
               <a:rPr lang="en-US" dirty="0" smtClean="0"/>
-              <a:t>DSL - </a:t>
-            </a:r>
-            <a:r>
-              <a:rPr lang="en-US" dirty="0" smtClean="0"/>
-              <a:t>Day </a:t>
-            </a:r>
-            <a:r>
-              <a:rPr lang="en-US" dirty="0" smtClean="0"/>
-              <a:t>19</a:t>
+              <a:t>DSL - Day 19</a:t>
             </a:r>
             <a:endParaRPr lang="en-US" dirty="0"/>
           </a:p>
@@ -17467,15 +17444,7 @@
           <a:p>
             <a:r>
               <a:rPr lang="en-US" dirty="0" smtClean="0"/>
-              <a:t>Word Count Streaming App - </a:t>
-            </a:r>
-            <a:r>
-              <a:rPr lang="en-US" dirty="0" smtClean="0"/>
-              <a:t>Day </a:t>
-            </a:r>
-            <a:r>
-              <a:rPr lang="en-US" dirty="0" smtClean="0"/>
-              <a:t>19</a:t>
+              <a:t>Word Count Streaming App - Day 19</a:t>
             </a:r>
             <a:endParaRPr lang="en-US" dirty="0"/>
           </a:p>
@@ -17600,15 +17569,7 @@
           <a:p>
             <a:r>
               <a:rPr lang="en-US" dirty="0" smtClean="0"/>
-              <a:t>DIY Exercise - </a:t>
-            </a:r>
-            <a:r>
-              <a:rPr lang="en-US" dirty="0" smtClean="0"/>
-              <a:t>Day </a:t>
-            </a:r>
-            <a:r>
-              <a:rPr lang="en-US" dirty="0" smtClean="0"/>
-              <a:t>19</a:t>
+              <a:t>DIY Exercise - Day 19</a:t>
             </a:r>
             <a:endParaRPr lang="en-US" dirty="0"/>
           </a:p>
@@ -17859,7 +17820,7 @@
           <p:nvPr>
             <p:extLst>
               <p:ext uri="{D42A27DB-BD31-4B8C-83A1-F6EECF244321}">
-                <p14:modId xmlns:p14="http://schemas.microsoft.com/office/powerpoint/2010/main" val="1789756549"/>
+                <p14:modId xmlns:p14="http://schemas.microsoft.com/office/powerpoint/2010/main" val="358507466"/>
               </p:ext>
             </p:extLst>
           </p:nvPr>
@@ -17989,6 +17950,7 @@
                         <a:rPr lang="en-US" sz="1200" baseline="0" dirty="0" smtClean="0"/>
                         <a:t>,0</a:t>
                       </a:r>
+                      <a:endParaRPr lang="en-US" sz="1200" baseline="0" dirty="0" smtClean="0"/>
                     </a:p>
                     <a:p>
                       <a:r>
@@ -17999,8 +17961,13 @@
                     <a:p>
                       <a:r>
                         <a:rPr lang="en-US" sz="1200" baseline="0" dirty="0" smtClean="0"/>
-                        <a:t>Green, 2</a:t>
+                        <a:t>Green, </a:t>
                       </a:r>
+                      <a:r>
+                        <a:rPr lang="en-US" sz="1200" baseline="0" dirty="0" smtClean="0"/>
+                        <a:t>2</a:t>
+                      </a:r>
+                      <a:endParaRPr lang="en-US" sz="1200" baseline="0" dirty="0" smtClean="0"/>
                     </a:p>
                   </a:txBody>
                   <a:tcPr/>
@@ -18064,15 +18031,11 @@
           <a:p>
             <a:r>
               <a:rPr lang="en-US" dirty="0" smtClean="0"/>
-              <a:t>DSL Stateless </a:t>
-            </a:r>
-            <a:r>
-              <a:rPr lang="en-US" dirty="0" smtClean="0"/>
-              <a:t>Processing - </a:t>
-            </a:r>
-            <a:r>
-              <a:rPr lang="en-US" dirty="0" smtClean="0"/>
-              <a:t>Day 20</a:t>
+              <a:t>Day </a:t>
+            </a:r>
+            <a:r>
+              <a:rPr lang="en-US" dirty="0" smtClean="0"/>
+              <a:t>20</a:t>
             </a:r>
             <a:endParaRPr lang="en-US" dirty="0"/>
           </a:p>
@@ -18088,18 +18051,26 @@
             <p:ph idx="1"/>
           </p:nvPr>
         </p:nvSpPr>
-        <p:spPr>
-          <a:xfrm>
-            <a:off x="323528" y="1124744"/>
-            <a:ext cx="8229600" cy="4525963"/>
-          </a:xfrm>
-        </p:spPr>
+        <p:spPr/>
         <p:txBody>
           <a:bodyPr>
             <a:normAutofit/>
           </a:bodyPr>
           <a:lstStyle/>
           <a:p>
+            <a:pPr marL="0" indent="0">
+              <a:buNone/>
+            </a:pPr>
+            <a:r>
+              <a:rPr lang="en-US" b="1" dirty="0" smtClean="0"/>
+              <a:t>Theme</a:t>
+            </a:r>
+          </a:p>
+          <a:p>
+            <a:pPr lvl="1"/>
+            <a:endParaRPr lang="en-US" dirty="0" smtClean="0"/>
+          </a:p>
+          <a:p>
             <a:pPr marL="457200" lvl="1" indent="0">
               <a:buNone/>
             </a:pPr>
@@ -18107,127 +18078,253 @@
           </a:p>
           <a:p>
             <a:pPr lvl="1">
-              <a:buFont typeface="Wingdings" panose="05000000000000000000" pitchFamily="2" charset="2"/>
-              <a:buChar char="§"/>
-            </a:pPr>
-            <a:r>
-              <a:rPr lang="en-US" sz="1600" dirty="0" err="1" smtClean="0"/>
-              <a:t>KStream</a:t>
-            </a:r>
-            <a:r>
-              <a:rPr lang="en-US" sz="1600" dirty="0" smtClean="0"/>
-              <a:t> &amp; </a:t>
-            </a:r>
-            <a:r>
-              <a:rPr lang="en-US" sz="1600" dirty="0" err="1" smtClean="0"/>
-              <a:t>KTable</a:t>
-            </a:r>
-            <a:endParaRPr lang="en-US" sz="1200" dirty="0" smtClean="0"/>
-          </a:p>
-          <a:p>
-            <a:pPr lvl="1">
-              <a:buFont typeface="Wingdings" panose="05000000000000000000" pitchFamily="2" charset="2"/>
-              <a:buChar char="§"/>
-            </a:pPr>
-            <a:r>
-              <a:rPr lang="en-US" sz="1600" dirty="0" err="1" smtClean="0"/>
-              <a:t>mapValues</a:t>
-            </a:r>
-            <a:r>
-              <a:rPr lang="en-US" sz="1600" dirty="0" smtClean="0"/>
-              <a:t>/map</a:t>
-            </a:r>
-          </a:p>
-          <a:p>
-            <a:pPr lvl="1">
-              <a:buFont typeface="Wingdings" panose="05000000000000000000" pitchFamily="2" charset="2"/>
-              <a:buChar char="§"/>
-            </a:pPr>
-            <a:r>
-              <a:rPr lang="en-US" sz="1600" dirty="0" smtClean="0"/>
-              <a:t>filter/</a:t>
-            </a:r>
-            <a:r>
-              <a:rPr lang="en-US" sz="1600" dirty="0" err="1" smtClean="0"/>
-              <a:t>filterNot</a:t>
-            </a:r>
-            <a:endParaRPr lang="en-US" sz="1600" dirty="0" smtClean="0"/>
-          </a:p>
-          <a:p>
-            <a:pPr lvl="1">
-              <a:buFont typeface="Wingdings" panose="05000000000000000000" pitchFamily="2" charset="2"/>
-              <a:buChar char="§"/>
-            </a:pPr>
-            <a:r>
-              <a:rPr lang="en-US" sz="1600" dirty="0" err="1" smtClean="0"/>
-              <a:t>flatMap</a:t>
-            </a:r>
-            <a:r>
-              <a:rPr lang="en-US" sz="1600" dirty="0" smtClean="0"/>
-              <a:t>/</a:t>
-            </a:r>
-            <a:r>
-              <a:rPr lang="en-US" sz="1600" dirty="0" err="1" smtClean="0"/>
-              <a:t>flatMapValues</a:t>
-            </a:r>
-            <a:endParaRPr lang="en-US" sz="1600" dirty="0" smtClean="0"/>
-          </a:p>
-          <a:p>
-            <a:pPr lvl="1">
-              <a:buFont typeface="Wingdings" panose="05000000000000000000" pitchFamily="2" charset="2"/>
-              <a:buChar char="§"/>
-            </a:pPr>
-            <a:r>
-              <a:rPr lang="en-US" sz="1600" dirty="0" err="1" smtClean="0"/>
-              <a:t>selectKey</a:t>
-            </a:r>
-            <a:endParaRPr lang="en-US" sz="1600" dirty="0" smtClean="0"/>
-          </a:p>
-          <a:p>
-            <a:pPr lvl="1">
-              <a:buFont typeface="Wingdings" panose="05000000000000000000" pitchFamily="2" charset="2"/>
-              <a:buChar char="§"/>
-            </a:pPr>
-            <a:endParaRPr lang="en-US" sz="1600" dirty="0" smtClean="0"/>
-          </a:p>
-          <a:p>
-            <a:pPr lvl="1">
-              <a:buFont typeface="Wingdings" panose="05000000000000000000" pitchFamily="2" charset="2"/>
-              <a:buChar char="§"/>
-            </a:pPr>
-            <a:endParaRPr lang="en-US" sz="1600" dirty="0" smtClean="0"/>
-          </a:p>
-          <a:p>
-            <a:pPr marL="1371600" lvl="3" indent="0">
-              <a:buNone/>
-            </a:pPr>
-            <a:endParaRPr lang="en-US" sz="800" dirty="0" smtClean="0"/>
-          </a:p>
-          <a:p>
-            <a:pPr lvl="2">
-              <a:buFont typeface="Wingdings" panose="05000000000000000000" pitchFamily="2" charset="2"/>
-              <a:buChar char="§"/>
-            </a:pPr>
-            <a:endParaRPr lang="en-US" sz="1200" dirty="0" smtClean="0"/>
+              <a:buFont typeface="Arial" panose="020B0604020202020204" pitchFamily="34" charset="0"/>
+              <a:buChar char="•"/>
+            </a:pPr>
+            <a:r>
+              <a:rPr lang="en-US" dirty="0" smtClean="0"/>
+              <a:t>Few More Streaming Application Examples</a:t>
+            </a:r>
+          </a:p>
+          <a:p>
+            <a:pPr lvl="1">
+              <a:buFont typeface="Arial" panose="020B0604020202020204" pitchFamily="34" charset="0"/>
+              <a:buChar char="•"/>
+            </a:pPr>
+            <a:r>
+              <a:rPr lang="en-US" dirty="0" smtClean="0"/>
+              <a:t>Deeper Understand DSL </a:t>
+            </a:r>
+            <a:endParaRPr lang="en-US" dirty="0" smtClean="0"/>
+          </a:p>
+          <a:p>
+            <a:pPr lvl="1">
+              <a:buFont typeface="Arial" panose="020B0604020202020204" pitchFamily="34" charset="0"/>
+              <a:buChar char="•"/>
+            </a:pPr>
+            <a:endParaRPr lang="en-US" dirty="0" smtClean="0"/>
+          </a:p>
+          <a:p>
+            <a:pPr lvl="1">
+              <a:buFont typeface="Arial" panose="020B0604020202020204" pitchFamily="34" charset="0"/>
+              <a:buChar char="•"/>
+            </a:pPr>
+            <a:endParaRPr lang="en-US" dirty="0" smtClean="0"/>
           </a:p>
           <a:p>
             <a:pPr marL="457200" lvl="1" indent="0">
               <a:buNone/>
             </a:pPr>
-            <a:endParaRPr lang="en-US" sz="1600" dirty="0"/>
-          </a:p>
-          <a:p>
-            <a:pPr marL="457200" lvl="1" indent="0">
-              <a:buNone/>
-            </a:pPr>
-            <a:endParaRPr lang="en-US" sz="1600" dirty="0" smtClean="0"/>
+            <a:endParaRPr lang="en-US" dirty="0" smtClean="0"/>
+          </a:p>
+          <a:p>
+            <a:pPr lvl="1"/>
+            <a:endParaRPr lang="en-US" dirty="0" smtClean="0"/>
           </a:p>
         </p:txBody>
       </p:sp>
     </p:spTree>
     <p:extLst>
       <p:ext uri="{BB962C8B-B14F-4D97-AF65-F5344CB8AC3E}">
-        <p14:creationId xmlns:p14="http://schemas.microsoft.com/office/powerpoint/2010/main" val="407744568"/>
+        <p14:creationId xmlns:p14="http://schemas.microsoft.com/office/powerpoint/2010/main" val="687136625"/>
+      </p:ext>
+    </p:extLst>
+  </p:cSld>
+  <p:clrMapOvr>
+    <a:masterClrMapping/>
+  </p:clrMapOvr>
+  <p:timing>
+    <p:tnLst>
+      <p:par>
+        <p:cTn id="1" dur="indefinite" restart="never" nodeType="tmRoot"/>
+      </p:par>
+    </p:tnLst>
+  </p:timing>
+</p:sld>
+</file>
+
+<file path=ppt/slides/slide89.xml><?xml version="1.0" encoding="utf-8"?>
+<p:sld xmlns:a="http://schemas.openxmlformats.org/drawingml/2006/main" xmlns:r="http://schemas.openxmlformats.org/officeDocument/2006/relationships" xmlns:p="http://schemas.openxmlformats.org/presentationml/2006/main">
+  <p:cSld>
+    <p:spTree>
+      <p:nvGrpSpPr>
+        <p:cNvPr id="1" name=""/>
+        <p:cNvGrpSpPr/>
+        <p:nvPr/>
+      </p:nvGrpSpPr>
+      <p:grpSpPr>
+        <a:xfrm>
+          <a:off x="0" y="0"/>
+          <a:ext cx="0" cy="0"/>
+          <a:chOff x="0" y="0"/>
+          <a:chExt cx="0" cy="0"/>
+        </a:xfrm>
+      </p:grpSpPr>
+      <p:sp>
+        <p:nvSpPr>
+          <p:cNvPr id="2" name="Title 1"/>
+          <p:cNvSpPr>
+            <a:spLocks noGrp="1"/>
+          </p:cNvSpPr>
+          <p:nvPr>
+            <p:ph type="title"/>
+          </p:nvPr>
+        </p:nvSpPr>
+        <p:spPr/>
+        <p:txBody>
+          <a:bodyPr/>
+          <a:lstStyle/>
+          <a:p>
+            <a:r>
+              <a:rPr lang="en-US" dirty="0" smtClean="0"/>
+              <a:t>Agenda - Day </a:t>
+            </a:r>
+            <a:r>
+              <a:rPr lang="en-US" dirty="0" smtClean="0"/>
+              <a:t>20</a:t>
+            </a:r>
+            <a:endParaRPr lang="en-US" dirty="0"/>
+          </a:p>
+        </p:txBody>
+      </p:sp>
+      <p:sp>
+        <p:nvSpPr>
+          <p:cNvPr id="3" name="Content Placeholder 2"/>
+          <p:cNvSpPr>
+            <a:spLocks noGrp="1"/>
+          </p:cNvSpPr>
+          <p:nvPr>
+            <p:ph idx="1"/>
+          </p:nvPr>
+        </p:nvSpPr>
+        <p:spPr/>
+        <p:txBody>
+          <a:bodyPr>
+            <a:normAutofit fontScale="92500" lnSpcReduction="10000"/>
+          </a:bodyPr>
+          <a:lstStyle/>
+          <a:p>
+            <a:pPr lvl="1">
+              <a:buFont typeface="Arial" panose="020B0604020202020204" pitchFamily="34" charset="0"/>
+              <a:buChar char="•"/>
+            </a:pPr>
+            <a:endParaRPr lang="en-US" dirty="0" smtClean="0"/>
+          </a:p>
+          <a:p>
+            <a:pPr lvl="1">
+              <a:buFont typeface="Arial" panose="020B0604020202020204" pitchFamily="34" charset="0"/>
+              <a:buChar char="•"/>
+            </a:pPr>
+            <a:r>
+              <a:rPr lang="en-US" dirty="0"/>
+              <a:t>Day </a:t>
+            </a:r>
+            <a:r>
+              <a:rPr lang="en-US" dirty="0" smtClean="0"/>
+              <a:t>19 Recap </a:t>
+            </a:r>
+            <a:r>
+              <a:rPr lang="en-US" dirty="0"/>
+              <a:t>&amp; </a:t>
+            </a:r>
+            <a:r>
+              <a:rPr lang="en-US" dirty="0" err="1"/>
+              <a:t>QnA</a:t>
+            </a:r>
+            <a:endParaRPr lang="en-US" dirty="0"/>
+          </a:p>
+          <a:p>
+            <a:pPr lvl="1">
+              <a:buFont typeface="Arial" panose="020B0604020202020204" pitchFamily="34" charset="0"/>
+              <a:buChar char="•"/>
+            </a:pPr>
+            <a:endParaRPr lang="en-US" dirty="0" smtClean="0"/>
+          </a:p>
+          <a:p>
+            <a:pPr lvl="1">
+              <a:buFont typeface="Arial" panose="020B0604020202020204" pitchFamily="34" charset="0"/>
+              <a:buChar char="•"/>
+            </a:pPr>
+            <a:r>
+              <a:rPr lang="en-US" dirty="0" smtClean="0"/>
+              <a:t>Few More Streaming Applications</a:t>
+            </a:r>
+            <a:endParaRPr lang="en-US" dirty="0" smtClean="0"/>
+          </a:p>
+          <a:p>
+            <a:pPr lvl="1">
+              <a:buFont typeface="Arial" panose="020B0604020202020204" pitchFamily="34" charset="0"/>
+              <a:buChar char="•"/>
+            </a:pPr>
+            <a:endParaRPr lang="en-US" dirty="0"/>
+          </a:p>
+          <a:p>
+            <a:pPr lvl="1">
+              <a:buFont typeface="Arial" panose="020B0604020202020204" pitchFamily="34" charset="0"/>
+              <a:buChar char="•"/>
+            </a:pPr>
+            <a:r>
+              <a:rPr lang="en-US" dirty="0" err="1" smtClean="0"/>
+              <a:t>KStreams</a:t>
+            </a:r>
+            <a:r>
+              <a:rPr lang="en-US" dirty="0" smtClean="0"/>
+              <a:t> vs </a:t>
+            </a:r>
+            <a:r>
+              <a:rPr lang="en-US" dirty="0" err="1" smtClean="0"/>
+              <a:t>Ktables</a:t>
+            </a:r>
+            <a:endParaRPr lang="en-US" dirty="0" smtClean="0"/>
+          </a:p>
+          <a:p>
+            <a:pPr lvl="1">
+              <a:buFont typeface="Arial" panose="020B0604020202020204" pitchFamily="34" charset="0"/>
+              <a:buChar char="•"/>
+            </a:pPr>
+            <a:endParaRPr lang="en-US" dirty="0" smtClean="0"/>
+          </a:p>
+          <a:p>
+            <a:pPr lvl="1">
+              <a:buFont typeface="Arial" panose="020B0604020202020204" pitchFamily="34" charset="0"/>
+              <a:buChar char="•"/>
+            </a:pPr>
+            <a:r>
+              <a:rPr lang="en-US" dirty="0" err="1" smtClean="0"/>
+              <a:t>KTables</a:t>
+            </a:r>
+            <a:endParaRPr lang="en-US" dirty="0" smtClean="0"/>
+          </a:p>
+          <a:p>
+            <a:pPr lvl="1">
+              <a:buFont typeface="Arial" panose="020B0604020202020204" pitchFamily="34" charset="0"/>
+              <a:buChar char="•"/>
+            </a:pPr>
+            <a:endParaRPr lang="en-US" dirty="0" smtClean="0"/>
+          </a:p>
+          <a:p>
+            <a:pPr lvl="1">
+              <a:buFont typeface="Arial" panose="020B0604020202020204" pitchFamily="34" charset="0"/>
+              <a:buChar char="•"/>
+            </a:pPr>
+            <a:r>
+              <a:rPr lang="en-US" dirty="0" smtClean="0"/>
+              <a:t>DSL Processors</a:t>
+            </a:r>
+            <a:endParaRPr lang="en-US" dirty="0" smtClean="0"/>
+          </a:p>
+          <a:p>
+            <a:pPr marL="457200" lvl="1" indent="0">
+              <a:buNone/>
+            </a:pPr>
+            <a:endParaRPr lang="en-US" dirty="0" smtClean="0"/>
+          </a:p>
+        </p:txBody>
+      </p:sp>
+    </p:spTree>
+    <p:extLst>
+      <p:ext uri="{BB962C8B-B14F-4D97-AF65-F5344CB8AC3E}">
+        <p14:creationId xmlns:p14="http://schemas.microsoft.com/office/powerpoint/2010/main" val="2688591658"/>
       </p:ext>
     </p:extLst>
   </p:cSld>
@@ -18316,6 +18413,2291 @@
     <p:extLst>
       <p:ext uri="{BB962C8B-B14F-4D97-AF65-F5344CB8AC3E}">
         <p14:creationId xmlns:p14="http://schemas.microsoft.com/office/powerpoint/2010/main" val="498536547"/>
+      </p:ext>
+    </p:extLst>
+  </p:cSld>
+  <p:clrMapOvr>
+    <a:masterClrMapping/>
+  </p:clrMapOvr>
+  <p:timing>
+    <p:tnLst>
+      <p:par>
+        <p:cTn id="1" dur="indefinite" restart="never" nodeType="tmRoot"/>
+      </p:par>
+    </p:tnLst>
+  </p:timing>
+</p:sld>
+</file>
+
+<file path=ppt/slides/slide90.xml><?xml version="1.0" encoding="utf-8"?>
+<p:sld xmlns:a="http://schemas.openxmlformats.org/drawingml/2006/main" xmlns:r="http://schemas.openxmlformats.org/officeDocument/2006/relationships" xmlns:p="http://schemas.openxmlformats.org/presentationml/2006/main">
+  <p:cSld>
+    <p:spTree>
+      <p:nvGrpSpPr>
+        <p:cNvPr id="1" name=""/>
+        <p:cNvGrpSpPr/>
+        <p:nvPr/>
+      </p:nvGrpSpPr>
+      <p:grpSpPr>
+        <a:xfrm>
+          <a:off x="0" y="0"/>
+          <a:ext cx="0" cy="0"/>
+          <a:chOff x="0" y="0"/>
+          <a:chExt cx="0" cy="0"/>
+        </a:xfrm>
+      </p:grpSpPr>
+      <p:sp>
+        <p:nvSpPr>
+          <p:cNvPr id="2" name="Title 1"/>
+          <p:cNvSpPr>
+            <a:spLocks noGrp="1"/>
+          </p:cNvSpPr>
+          <p:nvPr>
+            <p:ph type="title"/>
+          </p:nvPr>
+        </p:nvSpPr>
+        <p:spPr/>
+        <p:txBody>
+          <a:bodyPr/>
+          <a:lstStyle/>
+          <a:p>
+            <a:r>
+              <a:rPr lang="en-US" dirty="0" smtClean="0"/>
+              <a:t>DSL </a:t>
+            </a:r>
+            <a:r>
+              <a:rPr lang="en-US" dirty="0" err="1" smtClean="0"/>
+              <a:t>Ktable</a:t>
+            </a:r>
+            <a:r>
+              <a:rPr lang="en-US" dirty="0" smtClean="0"/>
+              <a:t> &amp; </a:t>
+            </a:r>
+            <a:r>
+              <a:rPr lang="en-US" dirty="0" err="1" smtClean="0"/>
+              <a:t>KStream</a:t>
+            </a:r>
+            <a:r>
+              <a:rPr lang="en-US" dirty="0" smtClean="0"/>
+              <a:t> - </a:t>
+            </a:r>
+            <a:r>
+              <a:rPr lang="en-US" dirty="0" smtClean="0"/>
+              <a:t>Day 20</a:t>
+            </a:r>
+            <a:endParaRPr lang="en-US" dirty="0"/>
+          </a:p>
+        </p:txBody>
+      </p:sp>
+      <p:sp>
+        <p:nvSpPr>
+          <p:cNvPr id="3" name="Content Placeholder 2"/>
+          <p:cNvSpPr>
+            <a:spLocks noGrp="1"/>
+          </p:cNvSpPr>
+          <p:nvPr>
+            <p:ph idx="1"/>
+          </p:nvPr>
+        </p:nvSpPr>
+        <p:spPr>
+          <a:xfrm>
+            <a:off x="323528" y="1124744"/>
+            <a:ext cx="8229600" cy="4525963"/>
+          </a:xfrm>
+        </p:spPr>
+        <p:txBody>
+          <a:bodyPr>
+            <a:normAutofit/>
+          </a:bodyPr>
+          <a:lstStyle/>
+          <a:p>
+            <a:pPr marL="457200" lvl="1" indent="0">
+              <a:buNone/>
+            </a:pPr>
+            <a:endParaRPr lang="en-US" dirty="0"/>
+          </a:p>
+          <a:p>
+            <a:pPr marL="457200" lvl="1" indent="0">
+              <a:buNone/>
+            </a:pPr>
+            <a:r>
+              <a:rPr lang="en-US" sz="1600" dirty="0" smtClean="0"/>
+              <a:t>Refer Draw.io</a:t>
+            </a:r>
+            <a:endParaRPr lang="en-US" sz="1600" dirty="0" smtClean="0"/>
+          </a:p>
+          <a:p>
+            <a:pPr lvl="1">
+              <a:buFont typeface="Wingdings" panose="05000000000000000000" pitchFamily="2" charset="2"/>
+              <a:buChar char="§"/>
+            </a:pPr>
+            <a:endParaRPr lang="en-US" sz="1600" dirty="0" smtClean="0"/>
+          </a:p>
+          <a:p>
+            <a:pPr lvl="1">
+              <a:buFont typeface="Wingdings" panose="05000000000000000000" pitchFamily="2" charset="2"/>
+              <a:buChar char="§"/>
+            </a:pPr>
+            <a:endParaRPr lang="en-US" sz="1600" dirty="0" smtClean="0"/>
+          </a:p>
+          <a:p>
+            <a:pPr marL="1371600" lvl="3" indent="0">
+              <a:buNone/>
+            </a:pPr>
+            <a:endParaRPr lang="en-US" sz="800" dirty="0" smtClean="0"/>
+          </a:p>
+          <a:p>
+            <a:pPr lvl="2">
+              <a:buFont typeface="Wingdings" panose="05000000000000000000" pitchFamily="2" charset="2"/>
+              <a:buChar char="§"/>
+            </a:pPr>
+            <a:endParaRPr lang="en-US" sz="1200" dirty="0" smtClean="0"/>
+          </a:p>
+          <a:p>
+            <a:pPr marL="457200" lvl="1" indent="0">
+              <a:buNone/>
+            </a:pPr>
+            <a:endParaRPr lang="en-US" sz="1600" dirty="0"/>
+          </a:p>
+          <a:p>
+            <a:pPr marL="457200" lvl="1" indent="0">
+              <a:buNone/>
+            </a:pPr>
+            <a:endParaRPr lang="en-US" sz="1600" dirty="0" smtClean="0"/>
+          </a:p>
+        </p:txBody>
+      </p:sp>
+    </p:spTree>
+    <p:extLst>
+      <p:ext uri="{BB962C8B-B14F-4D97-AF65-F5344CB8AC3E}">
+        <p14:creationId xmlns:p14="http://schemas.microsoft.com/office/powerpoint/2010/main" val="2160340078"/>
+      </p:ext>
+    </p:extLst>
+  </p:cSld>
+  <p:clrMapOvr>
+    <a:masterClrMapping/>
+  </p:clrMapOvr>
+  <p:timing>
+    <p:tnLst>
+      <p:par>
+        <p:cTn id="1" dur="indefinite" restart="never" nodeType="tmRoot"/>
+      </p:par>
+    </p:tnLst>
+  </p:timing>
+</p:sld>
+</file>
+
+<file path=ppt/slides/slide91.xml><?xml version="1.0" encoding="utf-8"?>
+<p:sld xmlns:a="http://schemas.openxmlformats.org/drawingml/2006/main" xmlns:r="http://schemas.openxmlformats.org/officeDocument/2006/relationships" xmlns:p="http://schemas.openxmlformats.org/presentationml/2006/main">
+  <p:cSld>
+    <p:spTree>
+      <p:nvGrpSpPr>
+        <p:cNvPr id="1" name=""/>
+        <p:cNvGrpSpPr/>
+        <p:nvPr/>
+      </p:nvGrpSpPr>
+      <p:grpSpPr>
+        <a:xfrm>
+          <a:off x="0" y="0"/>
+          <a:ext cx="0" cy="0"/>
+          <a:chOff x="0" y="0"/>
+          <a:chExt cx="0" cy="0"/>
+        </a:xfrm>
+      </p:grpSpPr>
+      <p:sp>
+        <p:nvSpPr>
+          <p:cNvPr id="2" name="Title 1"/>
+          <p:cNvSpPr>
+            <a:spLocks noGrp="1"/>
+          </p:cNvSpPr>
+          <p:nvPr>
+            <p:ph type="title"/>
+          </p:nvPr>
+        </p:nvSpPr>
+        <p:spPr/>
+        <p:txBody>
+          <a:bodyPr/>
+          <a:lstStyle/>
+          <a:p>
+            <a:r>
+              <a:rPr lang="en-US" dirty="0" smtClean="0"/>
+              <a:t>DSL </a:t>
+            </a:r>
+            <a:r>
+              <a:rPr lang="en-US" dirty="0" err="1" smtClean="0"/>
+              <a:t>KTable</a:t>
+            </a:r>
+            <a:r>
+              <a:rPr lang="en-US" dirty="0" smtClean="0"/>
+              <a:t> - </a:t>
+            </a:r>
+            <a:r>
+              <a:rPr lang="en-US" dirty="0" smtClean="0"/>
+              <a:t>Day 20</a:t>
+            </a:r>
+            <a:endParaRPr lang="en-US" dirty="0"/>
+          </a:p>
+        </p:txBody>
+      </p:sp>
+      <p:sp>
+        <p:nvSpPr>
+          <p:cNvPr id="3" name="Content Placeholder 2"/>
+          <p:cNvSpPr>
+            <a:spLocks noGrp="1"/>
+          </p:cNvSpPr>
+          <p:nvPr>
+            <p:ph idx="1"/>
+          </p:nvPr>
+        </p:nvSpPr>
+        <p:spPr>
+          <a:xfrm>
+            <a:off x="323528" y="1124744"/>
+            <a:ext cx="8229600" cy="4525963"/>
+          </a:xfrm>
+        </p:spPr>
+        <p:txBody>
+          <a:bodyPr>
+            <a:normAutofit/>
+          </a:bodyPr>
+          <a:lstStyle/>
+          <a:p>
+            <a:pPr marL="457200" lvl="1" indent="0">
+              <a:buNone/>
+            </a:pPr>
+            <a:endParaRPr lang="en-US" dirty="0"/>
+          </a:p>
+          <a:p>
+            <a:pPr lvl="1">
+              <a:buFont typeface="Wingdings" panose="05000000000000000000" pitchFamily="2" charset="2"/>
+              <a:buChar char="§"/>
+            </a:pPr>
+            <a:endParaRPr lang="en-US" sz="1600" dirty="0" smtClean="0"/>
+          </a:p>
+          <a:p>
+            <a:pPr lvl="1">
+              <a:buFont typeface="Wingdings" panose="05000000000000000000" pitchFamily="2" charset="2"/>
+              <a:buChar char="§"/>
+            </a:pPr>
+            <a:r>
+              <a:rPr lang="en-US" sz="1600" dirty="0" err="1" smtClean="0"/>
+              <a:t>Upserts</a:t>
+            </a:r>
+            <a:r>
+              <a:rPr lang="en-US" sz="1600" dirty="0" smtClean="0"/>
+              <a:t> (With A Demo)</a:t>
+            </a:r>
+          </a:p>
+          <a:p>
+            <a:pPr lvl="1">
+              <a:buFont typeface="Wingdings" panose="05000000000000000000" pitchFamily="2" charset="2"/>
+              <a:buChar char="§"/>
+            </a:pPr>
+            <a:endParaRPr lang="en-US" sz="1600" dirty="0" smtClean="0"/>
+          </a:p>
+          <a:p>
+            <a:pPr lvl="1">
+              <a:buFont typeface="Wingdings" panose="05000000000000000000" pitchFamily="2" charset="2"/>
+              <a:buChar char="§"/>
+            </a:pPr>
+            <a:endParaRPr lang="en-US" sz="1600" dirty="0" smtClean="0"/>
+          </a:p>
+          <a:p>
+            <a:pPr lvl="1">
+              <a:buFont typeface="Wingdings" panose="05000000000000000000" pitchFamily="2" charset="2"/>
+              <a:buChar char="§"/>
+            </a:pPr>
+            <a:r>
+              <a:rPr lang="en-US" sz="1600" dirty="0" smtClean="0"/>
+              <a:t>Repartitioning - Keys selection and its impact on </a:t>
+            </a:r>
+            <a:r>
+              <a:rPr lang="en-US" sz="1600" dirty="0" err="1" smtClean="0"/>
+              <a:t>Stateful</a:t>
+            </a:r>
+            <a:r>
+              <a:rPr lang="en-US" sz="1600" dirty="0" smtClean="0"/>
+              <a:t> Operations like Count</a:t>
+            </a:r>
+          </a:p>
+          <a:p>
+            <a:pPr lvl="1">
+              <a:buFont typeface="Wingdings" panose="05000000000000000000" pitchFamily="2" charset="2"/>
+              <a:buChar char="§"/>
+            </a:pPr>
+            <a:endParaRPr lang="en-US" sz="1600" dirty="0" smtClean="0"/>
+          </a:p>
+          <a:p>
+            <a:pPr lvl="1">
+              <a:buFont typeface="Wingdings" panose="05000000000000000000" pitchFamily="2" charset="2"/>
+              <a:buChar char="§"/>
+            </a:pPr>
+            <a:endParaRPr lang="en-US" sz="1600" dirty="0" smtClean="0"/>
+          </a:p>
+          <a:p>
+            <a:pPr lvl="1">
+              <a:buFont typeface="Wingdings" panose="05000000000000000000" pitchFamily="2" charset="2"/>
+              <a:buChar char="§"/>
+            </a:pPr>
+            <a:r>
+              <a:rPr lang="en-US" sz="1600" dirty="0" smtClean="0"/>
+              <a:t>Changelog – State Stores Fault Tolerance</a:t>
+            </a:r>
+          </a:p>
+          <a:p>
+            <a:pPr lvl="1">
+              <a:buFont typeface="Wingdings" panose="05000000000000000000" pitchFamily="2" charset="2"/>
+              <a:buChar char="§"/>
+            </a:pPr>
+            <a:endParaRPr lang="en-US" sz="1600" dirty="0" smtClean="0"/>
+          </a:p>
+          <a:p>
+            <a:pPr lvl="1">
+              <a:buFont typeface="Wingdings" panose="05000000000000000000" pitchFamily="2" charset="2"/>
+              <a:buChar char="§"/>
+            </a:pPr>
+            <a:endParaRPr lang="en-US" sz="1600" dirty="0"/>
+          </a:p>
+          <a:p>
+            <a:pPr lvl="1">
+              <a:buFont typeface="Wingdings" panose="05000000000000000000" pitchFamily="2" charset="2"/>
+              <a:buChar char="§"/>
+            </a:pPr>
+            <a:r>
+              <a:rPr lang="en-US" sz="1600" dirty="0" smtClean="0"/>
+              <a:t>Table Cache &amp; Emit rates</a:t>
+            </a:r>
+          </a:p>
+          <a:p>
+            <a:pPr lvl="1">
+              <a:buFont typeface="Wingdings" panose="05000000000000000000" pitchFamily="2" charset="2"/>
+              <a:buChar char="§"/>
+            </a:pPr>
+            <a:endParaRPr lang="en-US" sz="1600" dirty="0" smtClean="0"/>
+          </a:p>
+          <a:p>
+            <a:pPr marL="457200" lvl="1" indent="0">
+              <a:buNone/>
+            </a:pPr>
+            <a:endParaRPr lang="en-US" sz="1600" dirty="0" smtClean="0"/>
+          </a:p>
+          <a:p>
+            <a:pPr lvl="1">
+              <a:buFont typeface="Wingdings" panose="05000000000000000000" pitchFamily="2" charset="2"/>
+              <a:buChar char="§"/>
+            </a:pPr>
+            <a:endParaRPr lang="en-US" sz="1600" dirty="0" smtClean="0"/>
+          </a:p>
+          <a:p>
+            <a:pPr lvl="1">
+              <a:buFont typeface="Wingdings" panose="05000000000000000000" pitchFamily="2" charset="2"/>
+              <a:buChar char="§"/>
+            </a:pPr>
+            <a:endParaRPr lang="en-US" sz="1600" dirty="0" smtClean="0"/>
+          </a:p>
+          <a:p>
+            <a:pPr lvl="1">
+              <a:buFontTx/>
+              <a:buChar char="-"/>
+            </a:pPr>
+            <a:endParaRPr lang="en-US" sz="1600" dirty="0" smtClean="0"/>
+          </a:p>
+          <a:p>
+            <a:pPr lvl="1">
+              <a:buFont typeface="Wingdings" panose="05000000000000000000" pitchFamily="2" charset="2"/>
+              <a:buChar char="§"/>
+            </a:pPr>
+            <a:endParaRPr lang="en-US" sz="1600" dirty="0" smtClean="0"/>
+          </a:p>
+          <a:p>
+            <a:pPr lvl="1">
+              <a:buFont typeface="Wingdings" panose="05000000000000000000" pitchFamily="2" charset="2"/>
+              <a:buChar char="§"/>
+            </a:pPr>
+            <a:endParaRPr lang="en-US" sz="1600" dirty="0" smtClean="0"/>
+          </a:p>
+          <a:p>
+            <a:pPr marL="1371600" lvl="3" indent="0">
+              <a:buNone/>
+            </a:pPr>
+            <a:endParaRPr lang="en-US" sz="800" dirty="0" smtClean="0"/>
+          </a:p>
+          <a:p>
+            <a:pPr lvl="2">
+              <a:buFont typeface="Wingdings" panose="05000000000000000000" pitchFamily="2" charset="2"/>
+              <a:buChar char="§"/>
+            </a:pPr>
+            <a:endParaRPr lang="en-US" sz="1200" dirty="0" smtClean="0"/>
+          </a:p>
+          <a:p>
+            <a:pPr marL="457200" lvl="1" indent="0">
+              <a:buNone/>
+            </a:pPr>
+            <a:endParaRPr lang="en-US" sz="1600" dirty="0"/>
+          </a:p>
+          <a:p>
+            <a:pPr marL="457200" lvl="1" indent="0">
+              <a:buNone/>
+            </a:pPr>
+            <a:endParaRPr lang="en-US" sz="1600" dirty="0" smtClean="0"/>
+          </a:p>
+        </p:txBody>
+      </p:sp>
+    </p:spTree>
+    <p:extLst>
+      <p:ext uri="{BB962C8B-B14F-4D97-AF65-F5344CB8AC3E}">
+        <p14:creationId xmlns:p14="http://schemas.microsoft.com/office/powerpoint/2010/main" val="3299701317"/>
+      </p:ext>
+    </p:extLst>
+  </p:cSld>
+  <p:clrMapOvr>
+    <a:masterClrMapping/>
+  </p:clrMapOvr>
+  <p:timing>
+    <p:tnLst>
+      <p:par>
+        <p:cTn id="1" dur="indefinite" restart="never" nodeType="tmRoot"/>
+      </p:par>
+    </p:tnLst>
+  </p:timing>
+</p:sld>
+</file>
+
+<file path=ppt/slides/slide92.xml><?xml version="1.0" encoding="utf-8"?>
+<p:sld xmlns:a="http://schemas.openxmlformats.org/drawingml/2006/main" xmlns:r="http://schemas.openxmlformats.org/officeDocument/2006/relationships" xmlns:p="http://schemas.openxmlformats.org/presentationml/2006/main">
+  <p:cSld>
+    <p:spTree>
+      <p:nvGrpSpPr>
+        <p:cNvPr id="1" name=""/>
+        <p:cNvGrpSpPr/>
+        <p:nvPr/>
+      </p:nvGrpSpPr>
+      <p:grpSpPr>
+        <a:xfrm>
+          <a:off x="0" y="0"/>
+          <a:ext cx="0" cy="0"/>
+          <a:chOff x="0" y="0"/>
+          <a:chExt cx="0" cy="0"/>
+        </a:xfrm>
+      </p:grpSpPr>
+      <p:sp>
+        <p:nvSpPr>
+          <p:cNvPr id="2" name="Title 1"/>
+          <p:cNvSpPr>
+            <a:spLocks noGrp="1"/>
+          </p:cNvSpPr>
+          <p:nvPr>
+            <p:ph type="title"/>
+          </p:nvPr>
+        </p:nvSpPr>
+        <p:spPr/>
+        <p:txBody>
+          <a:bodyPr/>
+          <a:lstStyle/>
+          <a:p>
+            <a:r>
+              <a:rPr lang="en-US" dirty="0" smtClean="0"/>
+              <a:t>DSL Stateless </a:t>
+            </a:r>
+            <a:r>
+              <a:rPr lang="en-US" dirty="0" smtClean="0"/>
+              <a:t>Processors- </a:t>
+            </a:r>
+            <a:r>
+              <a:rPr lang="en-US" dirty="0" smtClean="0"/>
+              <a:t>Day 20</a:t>
+            </a:r>
+            <a:endParaRPr lang="en-US" dirty="0"/>
+          </a:p>
+        </p:txBody>
+      </p:sp>
+      <p:sp>
+        <p:nvSpPr>
+          <p:cNvPr id="3" name="Content Placeholder 2"/>
+          <p:cNvSpPr>
+            <a:spLocks noGrp="1"/>
+          </p:cNvSpPr>
+          <p:nvPr>
+            <p:ph idx="1"/>
+          </p:nvPr>
+        </p:nvSpPr>
+        <p:spPr>
+          <a:xfrm>
+            <a:off x="323528" y="1124744"/>
+            <a:ext cx="8229600" cy="4525963"/>
+          </a:xfrm>
+        </p:spPr>
+        <p:txBody>
+          <a:bodyPr>
+            <a:normAutofit/>
+          </a:bodyPr>
+          <a:lstStyle/>
+          <a:p>
+            <a:pPr marL="457200" lvl="1" indent="0">
+              <a:buNone/>
+            </a:pPr>
+            <a:endParaRPr lang="en-US" dirty="0"/>
+          </a:p>
+          <a:p>
+            <a:pPr lvl="1">
+              <a:buFont typeface="Wingdings" panose="05000000000000000000" pitchFamily="2" charset="2"/>
+              <a:buChar char="§"/>
+            </a:pPr>
+            <a:r>
+              <a:rPr lang="en-US" sz="1600" dirty="0" err="1" smtClean="0"/>
+              <a:t>mapValues</a:t>
+            </a:r>
+            <a:r>
+              <a:rPr lang="en-US" sz="1600" dirty="0" smtClean="0"/>
+              <a:t>/map</a:t>
+            </a:r>
+          </a:p>
+          <a:p>
+            <a:pPr marL="457200" lvl="1" indent="0">
+              <a:buNone/>
+            </a:pPr>
+            <a:r>
+              <a:rPr lang="en-US" sz="1600" dirty="0"/>
+              <a:t>	</a:t>
+            </a:r>
+            <a:r>
+              <a:rPr lang="en-US" sz="1600" dirty="0" smtClean="0"/>
+              <a:t>Transforms the data from one form to other based on processing logic</a:t>
+            </a:r>
+          </a:p>
+          <a:p>
+            <a:pPr marL="457200" lvl="1" indent="0">
+              <a:buNone/>
+            </a:pPr>
+            <a:endParaRPr lang="en-US" sz="1600" dirty="0" smtClean="0"/>
+          </a:p>
+          <a:p>
+            <a:pPr marL="457200" lvl="1" indent="0">
+              <a:buNone/>
+            </a:pPr>
+            <a:endParaRPr lang="en-US" sz="1600" dirty="0" smtClean="0"/>
+          </a:p>
+          <a:p>
+            <a:pPr lvl="1">
+              <a:buFont typeface="Wingdings" panose="05000000000000000000" pitchFamily="2" charset="2"/>
+              <a:buChar char="§"/>
+            </a:pPr>
+            <a:endParaRPr lang="en-US" sz="1600" dirty="0" smtClean="0"/>
+          </a:p>
+          <a:p>
+            <a:pPr lvl="1">
+              <a:buFont typeface="Wingdings" panose="05000000000000000000" pitchFamily="2" charset="2"/>
+              <a:buChar char="§"/>
+            </a:pPr>
+            <a:endParaRPr lang="en-US" sz="1600" dirty="0" smtClean="0"/>
+          </a:p>
+          <a:p>
+            <a:pPr lvl="1">
+              <a:buFont typeface="Wingdings" panose="05000000000000000000" pitchFamily="2" charset="2"/>
+              <a:buChar char="§"/>
+            </a:pPr>
+            <a:endParaRPr lang="en-US" sz="1600" dirty="0"/>
+          </a:p>
+          <a:p>
+            <a:pPr lvl="1">
+              <a:buFont typeface="Wingdings" panose="05000000000000000000" pitchFamily="2" charset="2"/>
+              <a:buChar char="§"/>
+            </a:pPr>
+            <a:endParaRPr lang="en-US" sz="1600" dirty="0" smtClean="0"/>
+          </a:p>
+          <a:p>
+            <a:pPr lvl="1">
+              <a:buFont typeface="Wingdings" panose="05000000000000000000" pitchFamily="2" charset="2"/>
+              <a:buChar char="§"/>
+            </a:pPr>
+            <a:endParaRPr lang="en-US" sz="1600" dirty="0"/>
+          </a:p>
+          <a:p>
+            <a:pPr lvl="1">
+              <a:buFont typeface="Wingdings" panose="05000000000000000000" pitchFamily="2" charset="2"/>
+              <a:buChar char="§"/>
+            </a:pPr>
+            <a:r>
+              <a:rPr lang="en-US" sz="1600" dirty="0" err="1" smtClean="0"/>
+              <a:t>flatMap</a:t>
+            </a:r>
+            <a:r>
+              <a:rPr lang="en-US" sz="1600" dirty="0" smtClean="0"/>
+              <a:t>/</a:t>
+            </a:r>
+            <a:r>
+              <a:rPr lang="en-US" sz="1600" dirty="0" err="1" smtClean="0"/>
+              <a:t>flatmapValues</a:t>
+            </a:r>
+            <a:endParaRPr lang="en-US" sz="1600" dirty="0" smtClean="0"/>
+          </a:p>
+          <a:p>
+            <a:pPr marL="457200" lvl="1" indent="0">
+              <a:buNone/>
+            </a:pPr>
+            <a:r>
+              <a:rPr lang="en-US" sz="1600" dirty="0" smtClean="0"/>
+              <a:t>     Takes one record and produces zero, one or more record</a:t>
+            </a:r>
+          </a:p>
+          <a:p>
+            <a:pPr marL="457200" lvl="1" indent="0">
+              <a:buNone/>
+            </a:pPr>
+            <a:endParaRPr lang="en-US" sz="1600" dirty="0" smtClean="0"/>
+          </a:p>
+          <a:p>
+            <a:pPr marL="457200" lvl="1" indent="0">
+              <a:buNone/>
+            </a:pPr>
+            <a:endParaRPr lang="en-US" sz="1600" dirty="0" smtClean="0"/>
+          </a:p>
+          <a:p>
+            <a:pPr lvl="1">
+              <a:buFont typeface="Wingdings" panose="05000000000000000000" pitchFamily="2" charset="2"/>
+              <a:buChar char="§"/>
+            </a:pPr>
+            <a:endParaRPr lang="en-US" sz="1600" dirty="0" smtClean="0"/>
+          </a:p>
+          <a:p>
+            <a:pPr lvl="1">
+              <a:buFont typeface="Wingdings" panose="05000000000000000000" pitchFamily="2" charset="2"/>
+              <a:buChar char="§"/>
+            </a:pPr>
+            <a:endParaRPr lang="en-US" sz="1600" dirty="0" smtClean="0"/>
+          </a:p>
+          <a:p>
+            <a:pPr lvl="1">
+              <a:buFont typeface="Wingdings" panose="05000000000000000000" pitchFamily="2" charset="2"/>
+              <a:buChar char="§"/>
+            </a:pPr>
+            <a:endParaRPr lang="en-US" sz="1600" dirty="0" smtClean="0"/>
+          </a:p>
+          <a:p>
+            <a:pPr lvl="1">
+              <a:buFont typeface="Wingdings" panose="05000000000000000000" pitchFamily="2" charset="2"/>
+              <a:buChar char="§"/>
+            </a:pPr>
+            <a:endParaRPr lang="en-US" sz="1600" dirty="0" smtClean="0"/>
+          </a:p>
+          <a:p>
+            <a:pPr marL="1371600" lvl="3" indent="0">
+              <a:buNone/>
+            </a:pPr>
+            <a:endParaRPr lang="en-US" sz="800" dirty="0" smtClean="0"/>
+          </a:p>
+          <a:p>
+            <a:pPr lvl="2">
+              <a:buFont typeface="Wingdings" panose="05000000000000000000" pitchFamily="2" charset="2"/>
+              <a:buChar char="§"/>
+            </a:pPr>
+            <a:endParaRPr lang="en-US" sz="1200" dirty="0" smtClean="0"/>
+          </a:p>
+          <a:p>
+            <a:pPr marL="457200" lvl="1" indent="0">
+              <a:buNone/>
+            </a:pPr>
+            <a:endParaRPr lang="en-US" sz="1600" dirty="0"/>
+          </a:p>
+          <a:p>
+            <a:pPr marL="457200" lvl="1" indent="0">
+              <a:buNone/>
+            </a:pPr>
+            <a:endParaRPr lang="en-US" sz="1600" dirty="0" smtClean="0"/>
+          </a:p>
+        </p:txBody>
+      </p:sp>
+      <p:graphicFrame>
+        <p:nvGraphicFramePr>
+          <p:cNvPr id="4" name="Table 3"/>
+          <p:cNvGraphicFramePr>
+            <a:graphicFrameLocks noGrp="1"/>
+          </p:cNvGraphicFramePr>
+          <p:nvPr>
+            <p:extLst>
+              <p:ext uri="{D42A27DB-BD31-4B8C-83A1-F6EECF244321}">
+                <p14:modId xmlns:p14="http://schemas.microsoft.com/office/powerpoint/2010/main" val="423531399"/>
+              </p:ext>
+            </p:extLst>
+          </p:nvPr>
+        </p:nvGraphicFramePr>
+        <p:xfrm>
+          <a:off x="971600" y="2348880"/>
+          <a:ext cx="7632848" cy="1727200"/>
+        </p:xfrm>
+        <a:graphic>
+          <a:graphicData uri="http://schemas.openxmlformats.org/drawingml/2006/table">
+            <a:tbl>
+              <a:tblPr firstRow="1" bandRow="1">
+                <a:tableStyleId>{5C22544A-7EE6-4342-B048-85BDC9FD1C3A}</a:tableStyleId>
+              </a:tblPr>
+              <a:tblGrid>
+                <a:gridCol w="3816424"/>
+                <a:gridCol w="3816424"/>
+              </a:tblGrid>
+              <a:tr h="370840">
+                <a:tc>
+                  <a:txBody>
+                    <a:bodyPr/>
+                    <a:lstStyle/>
+                    <a:p>
+                      <a:r>
+                        <a:rPr lang="en-US" dirty="0" smtClean="0"/>
+                        <a:t>map</a:t>
+                      </a:r>
+                      <a:endParaRPr lang="en-US" dirty="0"/>
+                    </a:p>
+                  </a:txBody>
+                  <a:tcPr/>
+                </a:tc>
+                <a:tc>
+                  <a:txBody>
+                    <a:bodyPr/>
+                    <a:lstStyle/>
+                    <a:p>
+                      <a:r>
+                        <a:rPr lang="en-US" dirty="0" err="1" smtClean="0"/>
+                        <a:t>mapValues</a:t>
+                      </a:r>
+                      <a:endParaRPr lang="en-US" dirty="0"/>
+                    </a:p>
+                  </a:txBody>
+                  <a:tcPr/>
+                </a:tc>
+              </a:tr>
+              <a:tr h="370840">
+                <a:tc>
+                  <a:txBody>
+                    <a:bodyPr/>
+                    <a:lstStyle/>
+                    <a:p>
+                      <a:pPr marL="285750" indent="-285750">
+                        <a:buFontTx/>
+                        <a:buChar char="-"/>
+                      </a:pPr>
+                      <a:r>
+                        <a:rPr lang="en-US" sz="1100" dirty="0" smtClean="0"/>
+                        <a:t>Affects both key and value</a:t>
+                      </a:r>
+                    </a:p>
+                    <a:p>
+                      <a:pPr marL="285750" indent="-285750">
+                        <a:buFontTx/>
+                        <a:buChar char="-"/>
+                      </a:pPr>
+                      <a:r>
+                        <a:rPr lang="en-US" sz="1100" dirty="0" smtClean="0"/>
+                        <a:t>Triggers a Repartition</a:t>
+                      </a:r>
+                    </a:p>
+                    <a:p>
+                      <a:pPr marL="285750" indent="-285750">
+                        <a:buFontTx/>
+                        <a:buChar char="-"/>
+                      </a:pPr>
+                      <a:r>
+                        <a:rPr lang="en-US" sz="1100" dirty="0" smtClean="0"/>
+                        <a:t>For </a:t>
+                      </a:r>
+                      <a:r>
+                        <a:rPr lang="en-US" sz="1100" dirty="0" err="1" smtClean="0"/>
+                        <a:t>KStreams</a:t>
+                      </a:r>
+                      <a:r>
+                        <a:rPr lang="en-US" sz="1100" baseline="0" dirty="0" smtClean="0"/>
+                        <a:t> only</a:t>
+                      </a:r>
+                      <a:endParaRPr lang="en-US" sz="1100" dirty="0"/>
+                    </a:p>
+                  </a:txBody>
+                  <a:tcPr/>
+                </a:tc>
+                <a:tc>
+                  <a:txBody>
+                    <a:bodyPr/>
+                    <a:lstStyle/>
+                    <a:p>
+                      <a:pPr marL="285750" indent="-285750">
+                        <a:buFontTx/>
+                        <a:buChar char="-"/>
+                      </a:pPr>
+                      <a:r>
+                        <a:rPr lang="en-US" sz="1100" dirty="0" smtClean="0"/>
+                        <a:t>Only Effects Values</a:t>
+                      </a:r>
+                    </a:p>
+                    <a:p>
+                      <a:pPr marL="285750" indent="-285750">
+                        <a:buFontTx/>
+                        <a:buChar char="-"/>
+                      </a:pPr>
+                      <a:r>
+                        <a:rPr lang="en-US" sz="1100" dirty="0" smtClean="0"/>
+                        <a:t>Does not change keys</a:t>
+                      </a:r>
+                    </a:p>
+                    <a:p>
+                      <a:pPr marL="285750" indent="-285750">
+                        <a:buFontTx/>
+                        <a:buChar char="-"/>
+                      </a:pPr>
+                      <a:r>
+                        <a:rPr lang="en-US" sz="1100" dirty="0" smtClean="0"/>
+                        <a:t>Does</a:t>
+                      </a:r>
+                      <a:r>
+                        <a:rPr lang="en-US" sz="1100" baseline="0" dirty="0" smtClean="0"/>
+                        <a:t> not trigger repartition</a:t>
+                      </a:r>
+                    </a:p>
+                    <a:p>
+                      <a:pPr marL="285750" indent="-285750">
+                        <a:buFontTx/>
+                        <a:buChar char="-"/>
+                      </a:pPr>
+                      <a:r>
+                        <a:rPr lang="en-US" sz="1100" baseline="0" dirty="0" smtClean="0"/>
+                        <a:t>For </a:t>
+                      </a:r>
+                      <a:r>
+                        <a:rPr lang="en-US" sz="1100" baseline="0" dirty="0" err="1" smtClean="0"/>
+                        <a:t>KStreams</a:t>
+                      </a:r>
+                      <a:r>
+                        <a:rPr lang="en-US" sz="1100" baseline="0" dirty="0" smtClean="0"/>
+                        <a:t> and </a:t>
+                      </a:r>
+                      <a:r>
+                        <a:rPr lang="en-US" sz="1100" baseline="0" dirty="0" err="1" smtClean="0"/>
+                        <a:t>KTables</a:t>
+                      </a:r>
+                      <a:endParaRPr lang="en-US" sz="1100" dirty="0"/>
+                    </a:p>
+                  </a:txBody>
+                  <a:tcPr/>
+                </a:tc>
+              </a:tr>
+              <a:tr h="370840">
+                <a:tc>
+                  <a:txBody>
+                    <a:bodyPr/>
+                    <a:lstStyle/>
+                    <a:p>
+                      <a:pPr marL="0" marR="0" indent="0" algn="l" defTabSz="914400" rtl="0" eaLnBrk="1" fontAlgn="auto" latinLnBrk="0" hangingPunct="1">
+                        <a:lnSpc>
+                          <a:spcPct val="100000"/>
+                        </a:lnSpc>
+                        <a:spcBef>
+                          <a:spcPts val="0"/>
+                        </a:spcBef>
+                        <a:spcAft>
+                          <a:spcPts val="0"/>
+                        </a:spcAft>
+                        <a:buClrTx/>
+                        <a:buSzTx/>
+                        <a:buFontTx/>
+                        <a:buNone/>
+                        <a:tabLst/>
+                        <a:defRPr/>
+                      </a:pPr>
+                      <a:r>
+                        <a:rPr lang="en-US" sz="1100" kern="1200" dirty="0" smtClean="0">
+                          <a:solidFill>
+                            <a:schemeClr val="dk1"/>
+                          </a:solidFill>
+                          <a:effectLst/>
+                          <a:latin typeface="+mn-lt"/>
+                          <a:ea typeface="+mn-ea"/>
+                          <a:cs typeface="+mn-cs"/>
+                        </a:rPr>
+                        <a:t>&lt;VR&gt; </a:t>
+                      </a:r>
+                      <a:r>
+                        <a:rPr lang="en-US" sz="1100" kern="1200" dirty="0" err="1" smtClean="0">
+                          <a:solidFill>
+                            <a:schemeClr val="dk1"/>
+                          </a:solidFill>
+                          <a:effectLst/>
+                          <a:latin typeface="+mn-lt"/>
+                          <a:ea typeface="+mn-ea"/>
+                          <a:cs typeface="+mn-cs"/>
+                        </a:rPr>
+                        <a:t>KStream</a:t>
+                      </a:r>
+                      <a:r>
+                        <a:rPr lang="en-US" sz="1100" kern="1200" dirty="0" smtClean="0">
+                          <a:solidFill>
+                            <a:schemeClr val="dk1"/>
+                          </a:solidFill>
+                          <a:effectLst/>
+                          <a:latin typeface="+mn-lt"/>
+                          <a:ea typeface="+mn-ea"/>
+                          <a:cs typeface="+mn-cs"/>
+                        </a:rPr>
+                        <a:t>&lt;K, VR&gt; </a:t>
+                      </a:r>
+                      <a:r>
+                        <a:rPr lang="en-US" sz="1100" kern="1200" dirty="0" err="1" smtClean="0">
+                          <a:solidFill>
+                            <a:schemeClr val="dk1"/>
+                          </a:solidFill>
+                          <a:effectLst/>
+                          <a:latin typeface="+mn-lt"/>
+                          <a:ea typeface="+mn-ea"/>
+                          <a:cs typeface="+mn-cs"/>
+                        </a:rPr>
+                        <a:t>mapValues</a:t>
+                      </a:r>
+                      <a:r>
+                        <a:rPr lang="en-US" sz="1100" kern="1200" dirty="0" smtClean="0">
+                          <a:solidFill>
+                            <a:schemeClr val="dk1"/>
+                          </a:solidFill>
+                          <a:effectLst/>
+                          <a:latin typeface="+mn-lt"/>
+                          <a:ea typeface="+mn-ea"/>
+                          <a:cs typeface="+mn-cs"/>
+                        </a:rPr>
+                        <a:t>(final </a:t>
+                      </a:r>
+                      <a:r>
+                        <a:rPr lang="en-US" sz="1100" kern="1200" dirty="0" err="1" smtClean="0">
+                          <a:solidFill>
+                            <a:schemeClr val="dk1"/>
+                          </a:solidFill>
+                          <a:effectLst/>
+                          <a:latin typeface="+mn-lt"/>
+                          <a:ea typeface="+mn-ea"/>
+                          <a:cs typeface="+mn-cs"/>
+                        </a:rPr>
+                        <a:t>ValueMapper</a:t>
+                      </a:r>
+                      <a:r>
+                        <a:rPr lang="en-US" sz="1100" kern="1200" dirty="0" smtClean="0">
+                          <a:solidFill>
+                            <a:schemeClr val="dk1"/>
+                          </a:solidFill>
+                          <a:effectLst/>
+                          <a:latin typeface="+mn-lt"/>
+                          <a:ea typeface="+mn-ea"/>
+                          <a:cs typeface="+mn-cs"/>
+                        </a:rPr>
+                        <a:t>&lt;? super V, ? extends VR&gt; mapper);</a:t>
+                      </a:r>
+                    </a:p>
+                    <a:p>
+                      <a:pPr marL="0" indent="0">
+                        <a:buFontTx/>
+                        <a:buNone/>
+                      </a:pPr>
+                      <a:endParaRPr lang="en-US" sz="1100" dirty="0"/>
+                    </a:p>
+                  </a:txBody>
+                  <a:tcPr/>
+                </a:tc>
+                <a:tc>
+                  <a:txBody>
+                    <a:bodyPr/>
+                    <a:lstStyle/>
+                    <a:p>
+                      <a:pPr marL="0" indent="0">
+                        <a:buFontTx/>
+                        <a:buNone/>
+                      </a:pPr>
+                      <a:r>
+                        <a:rPr lang="en-US" sz="1100" dirty="0" smtClean="0"/>
+                        <a:t>&lt;KR, VR&gt; </a:t>
+                      </a:r>
+                      <a:r>
+                        <a:rPr lang="en-US" sz="1100" dirty="0" err="1" smtClean="0"/>
+                        <a:t>KStream</a:t>
+                      </a:r>
+                      <a:r>
+                        <a:rPr lang="en-US" sz="1100" dirty="0" smtClean="0"/>
+                        <a:t>&lt;KR, VR&gt; map(     </a:t>
+                      </a:r>
+                      <a:r>
+                        <a:rPr lang="en-US" sz="1100" dirty="0" err="1" smtClean="0"/>
+                        <a:t>KeyValueMapper</a:t>
+                      </a:r>
+                      <a:r>
+                        <a:rPr lang="en-US" sz="1100" dirty="0" smtClean="0"/>
+                        <a:t>&lt;? super K, ? super V, ? extends </a:t>
+                      </a:r>
+                      <a:r>
+                        <a:rPr lang="en-US" sz="1100" dirty="0" err="1" smtClean="0"/>
+                        <a:t>KeyValue</a:t>
+                      </a:r>
+                      <a:r>
+                        <a:rPr lang="en-US" sz="1100" dirty="0" smtClean="0"/>
+                        <a:t>&lt;? extends KR, ? extends VR&gt;&gt; mapper )</a:t>
+                      </a:r>
+                      <a:endParaRPr lang="en-US" sz="1100" dirty="0"/>
+                    </a:p>
+                  </a:txBody>
+                  <a:tcPr/>
+                </a:tc>
+              </a:tr>
+            </a:tbl>
+          </a:graphicData>
+        </a:graphic>
+      </p:graphicFrame>
+      <p:graphicFrame>
+        <p:nvGraphicFramePr>
+          <p:cNvPr id="5" name="Table 4"/>
+          <p:cNvGraphicFramePr>
+            <a:graphicFrameLocks noGrp="1"/>
+          </p:cNvGraphicFramePr>
+          <p:nvPr>
+            <p:extLst>
+              <p:ext uri="{D42A27DB-BD31-4B8C-83A1-F6EECF244321}">
+                <p14:modId xmlns:p14="http://schemas.microsoft.com/office/powerpoint/2010/main" val="1672462988"/>
+              </p:ext>
+            </p:extLst>
+          </p:nvPr>
+        </p:nvGraphicFramePr>
+        <p:xfrm>
+          <a:off x="683568" y="4869160"/>
+          <a:ext cx="7632848" cy="1727200"/>
+        </p:xfrm>
+        <a:graphic>
+          <a:graphicData uri="http://schemas.openxmlformats.org/drawingml/2006/table">
+            <a:tbl>
+              <a:tblPr firstRow="1" bandRow="1">
+                <a:tableStyleId>{5C22544A-7EE6-4342-B048-85BDC9FD1C3A}</a:tableStyleId>
+              </a:tblPr>
+              <a:tblGrid>
+                <a:gridCol w="3816424"/>
+                <a:gridCol w="3816424"/>
+              </a:tblGrid>
+              <a:tr h="370840">
+                <a:tc>
+                  <a:txBody>
+                    <a:bodyPr/>
+                    <a:lstStyle/>
+                    <a:p>
+                      <a:r>
+                        <a:rPr lang="en-US" dirty="0" err="1" smtClean="0"/>
+                        <a:t>flat</a:t>
+                      </a:r>
+                      <a:r>
+                        <a:rPr lang="en-US" baseline="0" dirty="0" err="1" smtClean="0"/>
+                        <a:t>M</a:t>
+                      </a:r>
+                      <a:r>
+                        <a:rPr lang="en-US" dirty="0" err="1" smtClean="0"/>
+                        <a:t>ap</a:t>
+                      </a:r>
+                      <a:endParaRPr lang="en-US" dirty="0"/>
+                    </a:p>
+                  </a:txBody>
+                  <a:tcPr/>
+                </a:tc>
+                <a:tc>
+                  <a:txBody>
+                    <a:bodyPr/>
+                    <a:lstStyle/>
+                    <a:p>
+                      <a:r>
+                        <a:rPr lang="en-US" dirty="0" err="1" smtClean="0"/>
+                        <a:t>flatMapValues</a:t>
+                      </a:r>
+                      <a:endParaRPr lang="en-US" dirty="0"/>
+                    </a:p>
+                  </a:txBody>
+                  <a:tcPr/>
+                </a:tc>
+              </a:tr>
+              <a:tr h="370840">
+                <a:tc>
+                  <a:txBody>
+                    <a:bodyPr/>
+                    <a:lstStyle/>
+                    <a:p>
+                      <a:pPr marL="285750" indent="-285750">
+                        <a:buFontTx/>
+                        <a:buChar char="-"/>
+                      </a:pPr>
+                      <a:r>
+                        <a:rPr lang="en-US" sz="1100" dirty="0" smtClean="0"/>
+                        <a:t>Changes key</a:t>
+                      </a:r>
+                    </a:p>
+                    <a:p>
+                      <a:pPr marL="285750" indent="-285750">
+                        <a:buFontTx/>
+                        <a:buChar char="-"/>
+                      </a:pPr>
+                      <a:r>
+                        <a:rPr lang="en-US" sz="1100" dirty="0" smtClean="0"/>
+                        <a:t>Triggers a Repartition</a:t>
+                      </a:r>
+                    </a:p>
+                    <a:p>
+                      <a:pPr marL="285750" indent="-285750">
+                        <a:buFontTx/>
+                        <a:buChar char="-"/>
+                      </a:pPr>
+                      <a:r>
+                        <a:rPr lang="en-US" sz="1100" dirty="0" smtClean="0"/>
+                        <a:t>For </a:t>
+                      </a:r>
+                      <a:r>
+                        <a:rPr lang="en-US" sz="1100" dirty="0" err="1" smtClean="0"/>
+                        <a:t>KStreams</a:t>
+                      </a:r>
+                      <a:r>
+                        <a:rPr lang="en-US" sz="1100" baseline="0" dirty="0" smtClean="0"/>
+                        <a:t> only</a:t>
+                      </a:r>
+                      <a:endParaRPr lang="en-US" sz="1100" dirty="0"/>
+                    </a:p>
+                  </a:txBody>
+                  <a:tcPr/>
+                </a:tc>
+                <a:tc>
+                  <a:txBody>
+                    <a:bodyPr/>
+                    <a:lstStyle/>
+                    <a:p>
+                      <a:pPr marL="285750" indent="-285750">
+                        <a:buFontTx/>
+                        <a:buChar char="-"/>
+                      </a:pPr>
+                      <a:r>
+                        <a:rPr lang="en-US" sz="1100" dirty="0" smtClean="0"/>
+                        <a:t>Only Effects Values</a:t>
+                      </a:r>
+                    </a:p>
+                    <a:p>
+                      <a:pPr marL="285750" indent="-285750">
+                        <a:buFontTx/>
+                        <a:buChar char="-"/>
+                      </a:pPr>
+                      <a:r>
+                        <a:rPr lang="en-US" sz="1100" dirty="0" smtClean="0"/>
+                        <a:t>Does not change keys</a:t>
+                      </a:r>
+                    </a:p>
+                    <a:p>
+                      <a:pPr marL="285750" indent="-285750">
+                        <a:buFontTx/>
+                        <a:buChar char="-"/>
+                      </a:pPr>
+                      <a:r>
+                        <a:rPr lang="en-US" sz="1100" dirty="0" smtClean="0"/>
+                        <a:t>Does</a:t>
+                      </a:r>
+                      <a:r>
+                        <a:rPr lang="en-US" sz="1100" baseline="0" dirty="0" smtClean="0"/>
+                        <a:t> not trigger repartition</a:t>
+                      </a:r>
+                    </a:p>
+                    <a:p>
+                      <a:pPr marL="285750" indent="-285750">
+                        <a:buFontTx/>
+                        <a:buChar char="-"/>
+                      </a:pPr>
+                      <a:r>
+                        <a:rPr lang="en-US" sz="1100" baseline="0" dirty="0" smtClean="0"/>
+                        <a:t>For </a:t>
+                      </a:r>
+                      <a:r>
+                        <a:rPr lang="en-US" sz="1100" baseline="0" dirty="0" err="1" smtClean="0"/>
+                        <a:t>KStreams</a:t>
+                      </a:r>
+                      <a:endParaRPr lang="en-US" sz="1100" dirty="0"/>
+                    </a:p>
+                  </a:txBody>
+                  <a:tcPr/>
+                </a:tc>
+              </a:tr>
+              <a:tr h="370840">
+                <a:tc>
+                  <a:txBody>
+                    <a:bodyPr/>
+                    <a:lstStyle/>
+                    <a:p>
+                      <a:pPr marL="0" marR="0" indent="0" algn="l" defTabSz="914400" rtl="0" eaLnBrk="1" fontAlgn="auto" latinLnBrk="0" hangingPunct="1">
+                        <a:lnSpc>
+                          <a:spcPct val="100000"/>
+                        </a:lnSpc>
+                        <a:spcBef>
+                          <a:spcPts val="0"/>
+                        </a:spcBef>
+                        <a:spcAft>
+                          <a:spcPts val="0"/>
+                        </a:spcAft>
+                        <a:buClrTx/>
+                        <a:buSzTx/>
+                        <a:buFontTx/>
+                        <a:buNone/>
+                        <a:tabLst/>
+                        <a:defRPr/>
+                      </a:pPr>
+                      <a:r>
+                        <a:rPr lang="en-US" sz="1100" kern="1200" dirty="0" smtClean="0">
+                          <a:solidFill>
+                            <a:schemeClr val="dk1"/>
+                          </a:solidFill>
+                          <a:effectLst/>
+                          <a:latin typeface="+mn-lt"/>
+                          <a:ea typeface="+mn-ea"/>
+                          <a:cs typeface="+mn-cs"/>
+                        </a:rPr>
+                        <a:t>&lt;KR, VR&gt; </a:t>
+                      </a:r>
+                      <a:r>
+                        <a:rPr lang="en-US" sz="1100" kern="1200" dirty="0" err="1" smtClean="0">
+                          <a:solidFill>
+                            <a:schemeClr val="dk1"/>
+                          </a:solidFill>
+                          <a:effectLst/>
+                          <a:latin typeface="+mn-lt"/>
+                          <a:ea typeface="+mn-ea"/>
+                          <a:cs typeface="+mn-cs"/>
+                        </a:rPr>
+                        <a:t>KStream</a:t>
+                      </a:r>
+                      <a:r>
+                        <a:rPr lang="en-US" sz="1100" kern="1200" dirty="0" smtClean="0">
+                          <a:solidFill>
+                            <a:schemeClr val="dk1"/>
+                          </a:solidFill>
+                          <a:effectLst/>
+                          <a:latin typeface="+mn-lt"/>
+                          <a:ea typeface="+mn-ea"/>
+                          <a:cs typeface="+mn-cs"/>
+                        </a:rPr>
+                        <a:t>&lt;KR, VR&gt; </a:t>
+                      </a:r>
+                      <a:r>
+                        <a:rPr lang="en-US" sz="1100" kern="1200" dirty="0" err="1" smtClean="0">
+                          <a:solidFill>
+                            <a:schemeClr val="dk1"/>
+                          </a:solidFill>
+                          <a:effectLst/>
+                          <a:latin typeface="+mn-lt"/>
+                          <a:ea typeface="+mn-ea"/>
+                          <a:cs typeface="+mn-cs"/>
+                        </a:rPr>
+                        <a:t>flatMap</a:t>
+                      </a:r>
+                      <a:r>
+                        <a:rPr lang="en-US" sz="1100" kern="1200" dirty="0" smtClean="0">
+                          <a:solidFill>
+                            <a:schemeClr val="dk1"/>
+                          </a:solidFill>
+                          <a:effectLst/>
+                          <a:latin typeface="+mn-lt"/>
+                          <a:ea typeface="+mn-ea"/>
+                          <a:cs typeface="+mn-cs"/>
+                        </a:rPr>
+                        <a:t>(final </a:t>
+                      </a:r>
+                      <a:r>
+                        <a:rPr lang="en-US" sz="1100" kern="1200" dirty="0" err="1" smtClean="0">
+                          <a:solidFill>
+                            <a:schemeClr val="dk1"/>
+                          </a:solidFill>
+                          <a:effectLst/>
+                          <a:latin typeface="+mn-lt"/>
+                          <a:ea typeface="+mn-ea"/>
+                          <a:cs typeface="+mn-cs"/>
+                        </a:rPr>
+                        <a:t>KeyValueMapper</a:t>
+                      </a:r>
+                      <a:r>
+                        <a:rPr lang="en-US" sz="1100" kern="1200" dirty="0" smtClean="0">
+                          <a:solidFill>
+                            <a:schemeClr val="dk1"/>
+                          </a:solidFill>
+                          <a:effectLst/>
+                          <a:latin typeface="+mn-lt"/>
+                          <a:ea typeface="+mn-ea"/>
+                          <a:cs typeface="+mn-cs"/>
+                        </a:rPr>
+                        <a:t>&lt;? super K, ? super V, ? extends </a:t>
+                      </a:r>
+                      <a:r>
+                        <a:rPr lang="en-US" sz="1100" kern="1200" dirty="0" err="1" smtClean="0">
+                          <a:solidFill>
+                            <a:schemeClr val="dk1"/>
+                          </a:solidFill>
+                          <a:effectLst/>
+                          <a:latin typeface="+mn-lt"/>
+                          <a:ea typeface="+mn-ea"/>
+                          <a:cs typeface="+mn-cs"/>
+                        </a:rPr>
+                        <a:t>Iterable</a:t>
+                      </a:r>
+                      <a:r>
+                        <a:rPr lang="en-US" sz="1100" kern="1200" dirty="0" smtClean="0">
+                          <a:solidFill>
+                            <a:schemeClr val="dk1"/>
+                          </a:solidFill>
+                          <a:effectLst/>
+                          <a:latin typeface="+mn-lt"/>
+                          <a:ea typeface="+mn-ea"/>
+                          <a:cs typeface="+mn-cs"/>
+                        </a:rPr>
+                        <a:t>&lt;? extends </a:t>
+                      </a:r>
+                      <a:r>
+                        <a:rPr lang="en-US" sz="1100" kern="1200" dirty="0" err="1" smtClean="0">
+                          <a:solidFill>
+                            <a:schemeClr val="dk1"/>
+                          </a:solidFill>
+                          <a:effectLst/>
+                          <a:latin typeface="+mn-lt"/>
+                          <a:ea typeface="+mn-ea"/>
+                          <a:cs typeface="+mn-cs"/>
+                        </a:rPr>
+                        <a:t>KeyValue</a:t>
+                      </a:r>
+                      <a:r>
+                        <a:rPr lang="en-US" sz="1100" kern="1200" dirty="0" smtClean="0">
+                          <a:solidFill>
+                            <a:schemeClr val="dk1"/>
+                          </a:solidFill>
+                          <a:effectLst/>
+                          <a:latin typeface="+mn-lt"/>
+                          <a:ea typeface="+mn-ea"/>
+                          <a:cs typeface="+mn-cs"/>
+                        </a:rPr>
+                        <a:t>&lt;? extends KR, ? extends VR&gt;&gt;&gt; mapper);</a:t>
+                      </a:r>
+                      <a:endParaRPr lang="en-US" sz="1100" dirty="0"/>
+                    </a:p>
+                  </a:txBody>
+                  <a:tcPr/>
+                </a:tc>
+                <a:tc>
+                  <a:txBody>
+                    <a:bodyPr/>
+                    <a:lstStyle/>
+                    <a:p>
+                      <a:pPr marL="0" indent="0">
+                        <a:buFontTx/>
+                        <a:buNone/>
+                      </a:pPr>
+                      <a:r>
+                        <a:rPr lang="en-US" sz="1100" kern="1200" dirty="0" smtClean="0">
+                          <a:solidFill>
+                            <a:schemeClr val="dk1"/>
+                          </a:solidFill>
+                          <a:effectLst/>
+                          <a:latin typeface="+mn-lt"/>
+                          <a:ea typeface="+mn-ea"/>
+                          <a:cs typeface="+mn-cs"/>
+                        </a:rPr>
+                        <a:t>&lt;VR&gt; </a:t>
+                      </a:r>
+                      <a:r>
+                        <a:rPr lang="en-US" sz="1100" kern="1200" dirty="0" err="1" smtClean="0">
+                          <a:solidFill>
+                            <a:schemeClr val="dk1"/>
+                          </a:solidFill>
+                          <a:effectLst/>
+                          <a:latin typeface="+mn-lt"/>
+                          <a:ea typeface="+mn-ea"/>
+                          <a:cs typeface="+mn-cs"/>
+                        </a:rPr>
+                        <a:t>KStream</a:t>
+                      </a:r>
+                      <a:r>
+                        <a:rPr lang="en-US" sz="1100" kern="1200" dirty="0" smtClean="0">
+                          <a:solidFill>
+                            <a:schemeClr val="dk1"/>
+                          </a:solidFill>
+                          <a:effectLst/>
+                          <a:latin typeface="+mn-lt"/>
+                          <a:ea typeface="+mn-ea"/>
+                          <a:cs typeface="+mn-cs"/>
+                        </a:rPr>
+                        <a:t>&lt;K, VR&gt; </a:t>
+                      </a:r>
+                      <a:r>
+                        <a:rPr lang="en-US" sz="1100" kern="1200" dirty="0" err="1" smtClean="0">
+                          <a:solidFill>
+                            <a:schemeClr val="dk1"/>
+                          </a:solidFill>
+                          <a:effectLst/>
+                          <a:latin typeface="+mn-lt"/>
+                          <a:ea typeface="+mn-ea"/>
+                          <a:cs typeface="+mn-cs"/>
+                        </a:rPr>
+                        <a:t>flatMapValues</a:t>
+                      </a:r>
+                      <a:r>
+                        <a:rPr lang="en-US" sz="1100" kern="1200" dirty="0" smtClean="0">
+                          <a:solidFill>
+                            <a:schemeClr val="dk1"/>
+                          </a:solidFill>
+                          <a:effectLst/>
+                          <a:latin typeface="+mn-lt"/>
+                          <a:ea typeface="+mn-ea"/>
+                          <a:cs typeface="+mn-cs"/>
+                        </a:rPr>
+                        <a:t>(final </a:t>
+                      </a:r>
+                      <a:r>
+                        <a:rPr lang="en-US" sz="1100" kern="1200" dirty="0" err="1" smtClean="0">
+                          <a:solidFill>
+                            <a:schemeClr val="dk1"/>
+                          </a:solidFill>
+                          <a:effectLst/>
+                          <a:latin typeface="+mn-lt"/>
+                          <a:ea typeface="+mn-ea"/>
+                          <a:cs typeface="+mn-cs"/>
+                        </a:rPr>
+                        <a:t>ValueMapper</a:t>
+                      </a:r>
+                      <a:r>
+                        <a:rPr lang="en-US" sz="1100" kern="1200" dirty="0" smtClean="0">
+                          <a:solidFill>
+                            <a:schemeClr val="dk1"/>
+                          </a:solidFill>
+                          <a:effectLst/>
+                          <a:latin typeface="+mn-lt"/>
+                          <a:ea typeface="+mn-ea"/>
+                          <a:cs typeface="+mn-cs"/>
+                        </a:rPr>
+                        <a:t>&lt;? super V, ? extends </a:t>
+                      </a:r>
+                      <a:r>
+                        <a:rPr lang="en-US" sz="1100" kern="1200" dirty="0" err="1" smtClean="0">
+                          <a:solidFill>
+                            <a:schemeClr val="dk1"/>
+                          </a:solidFill>
+                          <a:effectLst/>
+                          <a:latin typeface="+mn-lt"/>
+                          <a:ea typeface="+mn-ea"/>
+                          <a:cs typeface="+mn-cs"/>
+                        </a:rPr>
+                        <a:t>Iterable</a:t>
+                      </a:r>
+                      <a:r>
+                        <a:rPr lang="en-US" sz="1100" kern="1200" dirty="0" smtClean="0">
+                          <a:solidFill>
+                            <a:schemeClr val="dk1"/>
+                          </a:solidFill>
+                          <a:effectLst/>
+                          <a:latin typeface="+mn-lt"/>
+                          <a:ea typeface="+mn-ea"/>
+                          <a:cs typeface="+mn-cs"/>
+                        </a:rPr>
+                        <a:t>&lt;? extends VR&gt;&gt; mapper);</a:t>
+                      </a:r>
+                      <a:endParaRPr lang="en-US" sz="1100" dirty="0"/>
+                    </a:p>
+                  </a:txBody>
+                  <a:tcPr/>
+                </a:tc>
+              </a:tr>
+            </a:tbl>
+          </a:graphicData>
+        </a:graphic>
+      </p:graphicFrame>
+    </p:spTree>
+    <p:extLst>
+      <p:ext uri="{BB962C8B-B14F-4D97-AF65-F5344CB8AC3E}">
+        <p14:creationId xmlns:p14="http://schemas.microsoft.com/office/powerpoint/2010/main" val="407744568"/>
+      </p:ext>
+    </p:extLst>
+  </p:cSld>
+  <p:clrMapOvr>
+    <a:masterClrMapping/>
+  </p:clrMapOvr>
+  <p:timing>
+    <p:tnLst>
+      <p:par>
+        <p:cTn id="1" dur="indefinite" restart="never" nodeType="tmRoot"/>
+      </p:par>
+    </p:tnLst>
+  </p:timing>
+</p:sld>
+</file>
+
+<file path=ppt/slides/slide93.xml><?xml version="1.0" encoding="utf-8"?>
+<p:sld xmlns:a="http://schemas.openxmlformats.org/drawingml/2006/main" xmlns:r="http://schemas.openxmlformats.org/officeDocument/2006/relationships" xmlns:p="http://schemas.openxmlformats.org/presentationml/2006/main">
+  <p:cSld>
+    <p:spTree>
+      <p:nvGrpSpPr>
+        <p:cNvPr id="1" name=""/>
+        <p:cNvGrpSpPr/>
+        <p:nvPr/>
+      </p:nvGrpSpPr>
+      <p:grpSpPr>
+        <a:xfrm>
+          <a:off x="0" y="0"/>
+          <a:ext cx="0" cy="0"/>
+          <a:chOff x="0" y="0"/>
+          <a:chExt cx="0" cy="0"/>
+        </a:xfrm>
+      </p:grpSpPr>
+      <p:sp>
+        <p:nvSpPr>
+          <p:cNvPr id="2" name="Title 1"/>
+          <p:cNvSpPr>
+            <a:spLocks noGrp="1"/>
+          </p:cNvSpPr>
+          <p:nvPr>
+            <p:ph type="title"/>
+          </p:nvPr>
+        </p:nvSpPr>
+        <p:spPr/>
+        <p:txBody>
+          <a:bodyPr/>
+          <a:lstStyle/>
+          <a:p>
+            <a:r>
+              <a:rPr lang="en-US" dirty="0" smtClean="0"/>
+              <a:t>DSL Stateless </a:t>
+            </a:r>
+            <a:r>
+              <a:rPr lang="en-US" dirty="0" smtClean="0"/>
+              <a:t>Processors… - </a:t>
+            </a:r>
+            <a:r>
+              <a:rPr lang="en-US" dirty="0" smtClean="0"/>
+              <a:t>Day 20</a:t>
+            </a:r>
+            <a:endParaRPr lang="en-US" dirty="0"/>
+          </a:p>
+        </p:txBody>
+      </p:sp>
+      <p:sp>
+        <p:nvSpPr>
+          <p:cNvPr id="3" name="Content Placeholder 2"/>
+          <p:cNvSpPr>
+            <a:spLocks noGrp="1"/>
+          </p:cNvSpPr>
+          <p:nvPr>
+            <p:ph idx="1"/>
+          </p:nvPr>
+        </p:nvSpPr>
+        <p:spPr>
+          <a:xfrm>
+            <a:off x="323528" y="1124744"/>
+            <a:ext cx="8229600" cy="4525963"/>
+          </a:xfrm>
+        </p:spPr>
+        <p:txBody>
+          <a:bodyPr>
+            <a:normAutofit/>
+          </a:bodyPr>
+          <a:lstStyle/>
+          <a:p>
+            <a:pPr marL="457200" lvl="1" indent="0">
+              <a:buNone/>
+            </a:pPr>
+            <a:endParaRPr lang="en-US" dirty="0"/>
+          </a:p>
+          <a:p>
+            <a:pPr lvl="1">
+              <a:buFont typeface="Wingdings" panose="05000000000000000000" pitchFamily="2" charset="2"/>
+              <a:buChar char="§"/>
+            </a:pPr>
+            <a:r>
+              <a:rPr lang="en-US" sz="1600" dirty="0"/>
+              <a:t>filter/</a:t>
+            </a:r>
+            <a:r>
+              <a:rPr lang="en-US" sz="1600" dirty="0" err="1"/>
+              <a:t>filterNot</a:t>
+            </a:r>
+            <a:endParaRPr lang="en-US" sz="1600" dirty="0"/>
+          </a:p>
+          <a:p>
+            <a:pPr marL="457200" lvl="1" indent="0">
+              <a:buNone/>
+            </a:pPr>
+            <a:r>
+              <a:rPr lang="en-US" sz="1600" dirty="0"/>
+              <a:t>	</a:t>
+            </a:r>
+            <a:r>
+              <a:rPr lang="en-US" sz="1600" dirty="0" smtClean="0"/>
+              <a:t>Takes one record and produce zero or one record</a:t>
+            </a:r>
+          </a:p>
+          <a:p>
+            <a:pPr marL="457200" lvl="1" indent="0">
+              <a:buNone/>
+            </a:pPr>
+            <a:endParaRPr lang="en-US" sz="1600" dirty="0" smtClean="0"/>
+          </a:p>
+          <a:p>
+            <a:pPr marL="457200" lvl="1" indent="0">
+              <a:buNone/>
+            </a:pPr>
+            <a:endParaRPr lang="en-US" sz="1600" dirty="0" smtClean="0"/>
+          </a:p>
+          <a:p>
+            <a:pPr lvl="1">
+              <a:buFont typeface="Wingdings" panose="05000000000000000000" pitchFamily="2" charset="2"/>
+              <a:buChar char="§"/>
+            </a:pPr>
+            <a:endParaRPr lang="en-US" sz="1600" dirty="0" smtClean="0"/>
+          </a:p>
+          <a:p>
+            <a:pPr lvl="1">
+              <a:buFont typeface="Wingdings" panose="05000000000000000000" pitchFamily="2" charset="2"/>
+              <a:buChar char="§"/>
+            </a:pPr>
+            <a:endParaRPr lang="en-US" sz="1600" dirty="0" smtClean="0"/>
+          </a:p>
+          <a:p>
+            <a:pPr lvl="1">
+              <a:buFont typeface="Wingdings" panose="05000000000000000000" pitchFamily="2" charset="2"/>
+              <a:buChar char="§"/>
+            </a:pPr>
+            <a:endParaRPr lang="en-US" sz="1600" dirty="0"/>
+          </a:p>
+          <a:p>
+            <a:pPr lvl="1">
+              <a:buFont typeface="Wingdings" panose="05000000000000000000" pitchFamily="2" charset="2"/>
+              <a:buChar char="§"/>
+            </a:pPr>
+            <a:endParaRPr lang="en-US" sz="1600" dirty="0" smtClean="0"/>
+          </a:p>
+          <a:p>
+            <a:pPr lvl="1">
+              <a:buFont typeface="Wingdings" panose="05000000000000000000" pitchFamily="2" charset="2"/>
+              <a:buChar char="§"/>
+            </a:pPr>
+            <a:endParaRPr lang="en-US" sz="1600" dirty="0"/>
+          </a:p>
+          <a:p>
+            <a:pPr lvl="1">
+              <a:buFont typeface="Wingdings" panose="05000000000000000000" pitchFamily="2" charset="2"/>
+              <a:buChar char="§"/>
+            </a:pPr>
+            <a:r>
+              <a:rPr lang="en-US" sz="1600" dirty="0" err="1" smtClean="0"/>
+              <a:t>selectKey</a:t>
+            </a:r>
+            <a:endParaRPr lang="en-US" sz="1600" dirty="0" smtClean="0"/>
+          </a:p>
+          <a:p>
+            <a:pPr marL="457200" lvl="1" indent="0">
+              <a:buNone/>
+            </a:pPr>
+            <a:r>
+              <a:rPr lang="en-US" sz="1600" dirty="0" smtClean="0"/>
+              <a:t>Assigns a new key to the record</a:t>
+            </a:r>
+            <a:endParaRPr lang="en-US" sz="1600" dirty="0" smtClean="0"/>
+          </a:p>
+          <a:p>
+            <a:pPr lvl="1">
+              <a:buFont typeface="Wingdings" panose="05000000000000000000" pitchFamily="2" charset="2"/>
+              <a:buChar char="§"/>
+            </a:pPr>
+            <a:endParaRPr lang="en-US" sz="1600" dirty="0" smtClean="0"/>
+          </a:p>
+          <a:p>
+            <a:pPr lvl="1">
+              <a:buFont typeface="Wingdings" panose="05000000000000000000" pitchFamily="2" charset="2"/>
+              <a:buChar char="§"/>
+            </a:pPr>
+            <a:endParaRPr lang="en-US" sz="1600" dirty="0" smtClean="0"/>
+          </a:p>
+          <a:p>
+            <a:pPr lvl="1">
+              <a:buFont typeface="Wingdings" panose="05000000000000000000" pitchFamily="2" charset="2"/>
+              <a:buChar char="§"/>
+            </a:pPr>
+            <a:endParaRPr lang="en-US" sz="1600" dirty="0" smtClean="0"/>
+          </a:p>
+          <a:p>
+            <a:pPr marL="1371600" lvl="3" indent="0">
+              <a:buNone/>
+            </a:pPr>
+            <a:endParaRPr lang="en-US" sz="800" dirty="0" smtClean="0"/>
+          </a:p>
+          <a:p>
+            <a:pPr lvl="2">
+              <a:buFont typeface="Wingdings" panose="05000000000000000000" pitchFamily="2" charset="2"/>
+              <a:buChar char="§"/>
+            </a:pPr>
+            <a:endParaRPr lang="en-US" sz="1200" dirty="0" smtClean="0"/>
+          </a:p>
+          <a:p>
+            <a:pPr marL="457200" lvl="1" indent="0">
+              <a:buNone/>
+            </a:pPr>
+            <a:endParaRPr lang="en-US" sz="1600" dirty="0"/>
+          </a:p>
+          <a:p>
+            <a:pPr marL="457200" lvl="1" indent="0">
+              <a:buNone/>
+            </a:pPr>
+            <a:endParaRPr lang="en-US" sz="1600" dirty="0" smtClean="0"/>
+          </a:p>
+        </p:txBody>
+      </p:sp>
+      <p:graphicFrame>
+        <p:nvGraphicFramePr>
+          <p:cNvPr id="4" name="Table 3"/>
+          <p:cNvGraphicFramePr>
+            <a:graphicFrameLocks noGrp="1"/>
+          </p:cNvGraphicFramePr>
+          <p:nvPr>
+            <p:extLst>
+              <p:ext uri="{D42A27DB-BD31-4B8C-83A1-F6EECF244321}">
+                <p14:modId xmlns:p14="http://schemas.microsoft.com/office/powerpoint/2010/main" val="3091341494"/>
+              </p:ext>
+            </p:extLst>
+          </p:nvPr>
+        </p:nvGraphicFramePr>
+        <p:xfrm>
+          <a:off x="971600" y="2276872"/>
+          <a:ext cx="7632848" cy="1559560"/>
+        </p:xfrm>
+        <a:graphic>
+          <a:graphicData uri="http://schemas.openxmlformats.org/drawingml/2006/table">
+            <a:tbl>
+              <a:tblPr firstRow="1" bandRow="1">
+                <a:tableStyleId>{5C22544A-7EE6-4342-B048-85BDC9FD1C3A}</a:tableStyleId>
+              </a:tblPr>
+              <a:tblGrid>
+                <a:gridCol w="3816424"/>
+                <a:gridCol w="3816424"/>
+              </a:tblGrid>
+              <a:tr h="370840">
+                <a:tc>
+                  <a:txBody>
+                    <a:bodyPr/>
+                    <a:lstStyle/>
+                    <a:p>
+                      <a:r>
+                        <a:rPr lang="en-US" dirty="0" smtClean="0"/>
+                        <a:t>filter</a:t>
+                      </a:r>
+                      <a:endParaRPr lang="en-US" dirty="0"/>
+                    </a:p>
+                  </a:txBody>
+                  <a:tcPr/>
+                </a:tc>
+                <a:tc>
+                  <a:txBody>
+                    <a:bodyPr/>
+                    <a:lstStyle/>
+                    <a:p>
+                      <a:r>
+                        <a:rPr lang="en-US" dirty="0" err="1" smtClean="0"/>
+                        <a:t>filterNot</a:t>
+                      </a:r>
+                      <a:endParaRPr lang="en-US" dirty="0"/>
+                    </a:p>
+                  </a:txBody>
+                  <a:tcPr/>
+                </a:tc>
+              </a:tr>
+              <a:tr h="370840">
+                <a:tc>
+                  <a:txBody>
+                    <a:bodyPr/>
+                    <a:lstStyle/>
+                    <a:p>
+                      <a:pPr marL="285750" indent="-285750">
+                        <a:buFontTx/>
+                        <a:buChar char="-"/>
+                      </a:pPr>
+                      <a:r>
+                        <a:rPr lang="en-US" sz="1100" dirty="0" smtClean="0"/>
+                        <a:t>Does not change key/value</a:t>
+                      </a:r>
+                    </a:p>
+                    <a:p>
+                      <a:pPr marL="285750" indent="-285750">
+                        <a:buFontTx/>
+                        <a:buChar char="-"/>
+                      </a:pPr>
+                      <a:r>
+                        <a:rPr lang="en-US" sz="1100" dirty="0" smtClean="0"/>
+                        <a:t>Does not Triggers a Repartition</a:t>
+                      </a:r>
+                    </a:p>
+                    <a:p>
+                      <a:pPr marL="285750" indent="-285750">
+                        <a:buFontTx/>
+                        <a:buChar char="-"/>
+                      </a:pPr>
+                      <a:r>
+                        <a:rPr lang="en-US" sz="1100" dirty="0" smtClean="0"/>
+                        <a:t>For </a:t>
+                      </a:r>
+                      <a:r>
+                        <a:rPr lang="en-US" sz="1100" dirty="0" err="1" smtClean="0"/>
+                        <a:t>KStreams</a:t>
+                      </a:r>
+                      <a:r>
+                        <a:rPr lang="en-US" sz="1100" baseline="0" dirty="0" smtClean="0"/>
+                        <a:t> and </a:t>
+                      </a:r>
+                      <a:r>
+                        <a:rPr lang="en-US" sz="1100" baseline="0" dirty="0" err="1" smtClean="0"/>
+                        <a:t>KTables</a:t>
+                      </a:r>
+                      <a:endParaRPr lang="en-US" sz="1100" dirty="0"/>
+                    </a:p>
+                  </a:txBody>
+                  <a:tcPr/>
+                </a:tc>
+                <a:tc>
+                  <a:txBody>
+                    <a:bodyPr/>
+                    <a:lstStyle/>
+                    <a:p>
+                      <a:pPr marL="0" indent="0">
+                        <a:buFontTx/>
+                        <a:buNone/>
+                      </a:pPr>
+                      <a:r>
+                        <a:rPr lang="en-US" sz="1100" dirty="0" smtClean="0"/>
+                        <a:t>Inverse</a:t>
+                      </a:r>
+                      <a:r>
+                        <a:rPr lang="en-US" sz="1100" baseline="0" dirty="0" smtClean="0"/>
+                        <a:t> of filter</a:t>
+                      </a:r>
+                      <a:endParaRPr lang="en-US" sz="1100" dirty="0"/>
+                    </a:p>
+                  </a:txBody>
+                  <a:tcPr/>
+                </a:tc>
+              </a:tr>
+              <a:tr h="370840">
+                <a:tc>
+                  <a:txBody>
+                    <a:bodyPr/>
+                    <a:lstStyle/>
+                    <a:p>
+                      <a:pPr marL="0" marR="0" indent="0" algn="l" defTabSz="914400" rtl="0" eaLnBrk="1" fontAlgn="auto" latinLnBrk="0" hangingPunct="1">
+                        <a:lnSpc>
+                          <a:spcPct val="100000"/>
+                        </a:lnSpc>
+                        <a:spcBef>
+                          <a:spcPts val="0"/>
+                        </a:spcBef>
+                        <a:spcAft>
+                          <a:spcPts val="0"/>
+                        </a:spcAft>
+                        <a:buClrTx/>
+                        <a:buSzTx/>
+                        <a:buFontTx/>
+                        <a:buNone/>
+                        <a:tabLst/>
+                        <a:defRPr/>
+                      </a:pPr>
+                      <a:r>
+                        <a:rPr lang="en-US" sz="1100" kern="1200" dirty="0" smtClean="0">
+                          <a:solidFill>
+                            <a:schemeClr val="dk1"/>
+                          </a:solidFill>
+                          <a:effectLst/>
+                          <a:latin typeface="+mn-lt"/>
+                          <a:ea typeface="+mn-ea"/>
+                          <a:cs typeface="+mn-cs"/>
+                        </a:rPr>
+                        <a:t>public abstract </a:t>
+                      </a:r>
+                      <a:r>
+                        <a:rPr lang="en-US" sz="1100" kern="1200" dirty="0" err="1" smtClean="0">
+                          <a:solidFill>
+                            <a:schemeClr val="dk1"/>
+                          </a:solidFill>
+                          <a:effectLst/>
+                          <a:latin typeface="+mn-lt"/>
+                          <a:ea typeface="+mn-ea"/>
+                          <a:cs typeface="+mn-cs"/>
+                        </a:rPr>
+                        <a:t>KStream</a:t>
+                      </a:r>
+                      <a:r>
+                        <a:rPr lang="en-US" sz="1100" kern="1200" dirty="0" smtClean="0">
+                          <a:solidFill>
+                            <a:schemeClr val="dk1"/>
+                          </a:solidFill>
+                          <a:effectLst/>
+                          <a:latin typeface="+mn-lt"/>
+                          <a:ea typeface="+mn-ea"/>
+                          <a:cs typeface="+mn-cs"/>
+                        </a:rPr>
+                        <a:t>&lt;K, V&gt; filter(     </a:t>
+                      </a:r>
+                      <a:r>
+                        <a:rPr lang="en-US" sz="1100" kern="1200" dirty="0" err="1" smtClean="0">
+                          <a:solidFill>
+                            <a:schemeClr val="dk1"/>
+                          </a:solidFill>
+                          <a:effectLst/>
+                          <a:latin typeface="+mn-lt"/>
+                          <a:ea typeface="+mn-ea"/>
+                          <a:cs typeface="+mn-cs"/>
+                        </a:rPr>
+                        <a:t>org.apache.kafka.streams.kstream.Predicate</a:t>
+                      </a:r>
+                      <a:r>
+                        <a:rPr lang="en-US" sz="1100" kern="1200" dirty="0" smtClean="0">
+                          <a:solidFill>
+                            <a:schemeClr val="dk1"/>
+                          </a:solidFill>
+                          <a:effectLst/>
+                          <a:latin typeface="+mn-lt"/>
+                          <a:ea typeface="+mn-ea"/>
+                          <a:cs typeface="+mn-cs"/>
+                        </a:rPr>
+                        <a:t>&lt;? super K, ? super V&gt; predicate )</a:t>
+                      </a:r>
+                      <a:endParaRPr lang="en-US" sz="1100" dirty="0"/>
+                    </a:p>
+                  </a:txBody>
+                  <a:tcPr/>
+                </a:tc>
+                <a:tc>
+                  <a:txBody>
+                    <a:bodyPr/>
+                    <a:lstStyle/>
+                    <a:p>
+                      <a:pPr marL="0" indent="0">
+                        <a:buFontTx/>
+                        <a:buNone/>
+                      </a:pPr>
+                      <a:r>
+                        <a:rPr lang="en-US" sz="1100" dirty="0" smtClean="0"/>
+                        <a:t>public abstract </a:t>
+                      </a:r>
+                      <a:r>
+                        <a:rPr lang="en-US" sz="1100" dirty="0" err="1" smtClean="0"/>
+                        <a:t>KStream</a:t>
+                      </a:r>
+                      <a:r>
+                        <a:rPr lang="en-US" sz="1100" dirty="0" smtClean="0"/>
+                        <a:t>&lt;K, V&gt; </a:t>
+                      </a:r>
+                      <a:r>
+                        <a:rPr lang="en-US" sz="1100" dirty="0" err="1" smtClean="0"/>
+                        <a:t>filterNot</a:t>
+                      </a:r>
+                      <a:r>
+                        <a:rPr lang="en-US" sz="1100" dirty="0" smtClean="0"/>
+                        <a:t>(     </a:t>
+                      </a:r>
+                      <a:r>
+                        <a:rPr lang="en-US" sz="1100" dirty="0" err="1" smtClean="0"/>
+                        <a:t>org.apache.kafka.streams.kstream.Predicate</a:t>
+                      </a:r>
+                      <a:r>
+                        <a:rPr lang="en-US" sz="1100" dirty="0" smtClean="0"/>
+                        <a:t>&lt;? super K, ? super V&gt; predicate )</a:t>
+                      </a:r>
+                      <a:endParaRPr lang="en-US" sz="1100" dirty="0"/>
+                    </a:p>
+                  </a:txBody>
+                  <a:tcPr/>
+                </a:tc>
+              </a:tr>
+            </a:tbl>
+          </a:graphicData>
+        </a:graphic>
+      </p:graphicFrame>
+      <p:graphicFrame>
+        <p:nvGraphicFramePr>
+          <p:cNvPr id="5" name="Table 4"/>
+          <p:cNvGraphicFramePr>
+            <a:graphicFrameLocks noGrp="1"/>
+          </p:cNvGraphicFramePr>
+          <p:nvPr>
+            <p:extLst>
+              <p:ext uri="{D42A27DB-BD31-4B8C-83A1-F6EECF244321}">
+                <p14:modId xmlns:p14="http://schemas.microsoft.com/office/powerpoint/2010/main" val="2948896010"/>
+              </p:ext>
+            </p:extLst>
+          </p:nvPr>
+        </p:nvGraphicFramePr>
+        <p:xfrm>
+          <a:off x="1187624" y="5157192"/>
+          <a:ext cx="6096000" cy="1330960"/>
+        </p:xfrm>
+        <a:graphic>
+          <a:graphicData uri="http://schemas.openxmlformats.org/drawingml/2006/table">
+            <a:tbl>
+              <a:tblPr firstRow="1" bandRow="1">
+                <a:tableStyleId>{5C22544A-7EE6-4342-B048-85BDC9FD1C3A}</a:tableStyleId>
+              </a:tblPr>
+              <a:tblGrid>
+                <a:gridCol w="6096000"/>
+              </a:tblGrid>
+              <a:tr h="370840">
+                <a:tc>
+                  <a:txBody>
+                    <a:bodyPr/>
+                    <a:lstStyle/>
+                    <a:p>
+                      <a:r>
+                        <a:rPr lang="en-US" dirty="0" err="1" smtClean="0"/>
+                        <a:t>selectKey</a:t>
+                      </a:r>
+                      <a:endParaRPr lang="en-US" dirty="0"/>
+                    </a:p>
+                  </a:txBody>
+                  <a:tcPr/>
+                </a:tc>
+              </a:tr>
+              <a:tr h="370840">
+                <a:tc>
+                  <a:txBody>
+                    <a:bodyPr/>
+                    <a:lstStyle/>
+                    <a:p>
+                      <a:pPr marL="285750" indent="-285750">
+                        <a:buFontTx/>
+                        <a:buChar char="-"/>
+                      </a:pPr>
+                      <a:r>
+                        <a:rPr lang="en-US" sz="1100" baseline="0" dirty="0" smtClean="0"/>
+                        <a:t>Marks data for repartitioning</a:t>
+                      </a:r>
+                    </a:p>
+                    <a:p>
+                      <a:pPr marL="285750" indent="-285750">
+                        <a:buFontTx/>
+                        <a:buChar char="-"/>
+                      </a:pPr>
+                      <a:r>
+                        <a:rPr lang="en-US" sz="1100" baseline="0" dirty="0" smtClean="0"/>
+                        <a:t>Best practice is to isolate that transformation to know exactly where the partitioning helps</a:t>
+                      </a:r>
+                      <a:endParaRPr lang="en-US" sz="1100" dirty="0"/>
+                    </a:p>
+                  </a:txBody>
+                  <a:tcPr/>
+                </a:tc>
+              </a:tr>
+              <a:tr h="370840">
+                <a:tc>
+                  <a:txBody>
+                    <a:bodyPr/>
+                    <a:lstStyle/>
+                    <a:p>
+                      <a:pPr marL="0" marR="0" indent="0" algn="l" defTabSz="914400" rtl="0" eaLnBrk="1" fontAlgn="auto" latinLnBrk="0" hangingPunct="1">
+                        <a:lnSpc>
+                          <a:spcPct val="100000"/>
+                        </a:lnSpc>
+                        <a:spcBef>
+                          <a:spcPts val="0"/>
+                        </a:spcBef>
+                        <a:spcAft>
+                          <a:spcPts val="0"/>
+                        </a:spcAft>
+                        <a:buClrTx/>
+                        <a:buSzTx/>
+                        <a:buFontTx/>
+                        <a:buNone/>
+                        <a:tabLst/>
+                        <a:defRPr/>
+                      </a:pPr>
+                      <a:r>
+                        <a:rPr lang="en-US" sz="1100" kern="1200" dirty="0" smtClean="0">
+                          <a:solidFill>
+                            <a:schemeClr val="dk1"/>
+                          </a:solidFill>
+                          <a:effectLst/>
+                          <a:latin typeface="+mn-lt"/>
+                          <a:ea typeface="+mn-ea"/>
+                          <a:cs typeface="+mn-cs"/>
+                        </a:rPr>
+                        <a:t>&lt;KR&gt; </a:t>
+                      </a:r>
+                      <a:r>
+                        <a:rPr lang="en-US" sz="1100" kern="1200" dirty="0" err="1" smtClean="0">
+                          <a:solidFill>
+                            <a:schemeClr val="dk1"/>
+                          </a:solidFill>
+                          <a:effectLst/>
+                          <a:latin typeface="+mn-lt"/>
+                          <a:ea typeface="+mn-ea"/>
+                          <a:cs typeface="+mn-cs"/>
+                        </a:rPr>
+                        <a:t>KStream</a:t>
+                      </a:r>
+                      <a:r>
+                        <a:rPr lang="en-US" sz="1100" kern="1200" dirty="0" smtClean="0">
+                          <a:solidFill>
+                            <a:schemeClr val="dk1"/>
+                          </a:solidFill>
+                          <a:effectLst/>
+                          <a:latin typeface="+mn-lt"/>
+                          <a:ea typeface="+mn-ea"/>
+                          <a:cs typeface="+mn-cs"/>
+                        </a:rPr>
+                        <a:t>&lt;KR, V&gt; </a:t>
+                      </a:r>
+                      <a:r>
+                        <a:rPr lang="en-US" sz="1100" kern="1200" dirty="0" err="1" smtClean="0">
+                          <a:solidFill>
+                            <a:schemeClr val="dk1"/>
+                          </a:solidFill>
+                          <a:effectLst/>
+                          <a:latin typeface="+mn-lt"/>
+                          <a:ea typeface="+mn-ea"/>
+                          <a:cs typeface="+mn-cs"/>
+                        </a:rPr>
+                        <a:t>selectKey</a:t>
+                      </a:r>
+                      <a:r>
+                        <a:rPr lang="en-US" sz="1100" kern="1200" dirty="0" smtClean="0">
+                          <a:solidFill>
+                            <a:schemeClr val="dk1"/>
+                          </a:solidFill>
+                          <a:effectLst/>
+                          <a:latin typeface="+mn-lt"/>
+                          <a:ea typeface="+mn-ea"/>
+                          <a:cs typeface="+mn-cs"/>
+                        </a:rPr>
+                        <a:t>(final </a:t>
+                      </a:r>
+                      <a:r>
+                        <a:rPr lang="en-US" sz="1100" kern="1200" dirty="0" err="1" smtClean="0">
+                          <a:solidFill>
+                            <a:schemeClr val="dk1"/>
+                          </a:solidFill>
+                          <a:effectLst/>
+                          <a:latin typeface="+mn-lt"/>
+                          <a:ea typeface="+mn-ea"/>
+                          <a:cs typeface="+mn-cs"/>
+                        </a:rPr>
+                        <a:t>KeyValueMapper</a:t>
+                      </a:r>
+                      <a:r>
+                        <a:rPr lang="en-US" sz="1100" kern="1200" dirty="0" smtClean="0">
+                          <a:solidFill>
+                            <a:schemeClr val="dk1"/>
+                          </a:solidFill>
+                          <a:effectLst/>
+                          <a:latin typeface="+mn-lt"/>
+                          <a:ea typeface="+mn-ea"/>
+                          <a:cs typeface="+mn-cs"/>
+                        </a:rPr>
+                        <a:t>&lt;? super K, ? super V, ? extends KR&gt; mapper);</a:t>
+                      </a:r>
+                    </a:p>
+                    <a:p>
+                      <a:endParaRPr lang="en-US" dirty="0"/>
+                    </a:p>
+                  </a:txBody>
+                  <a:tcPr/>
+                </a:tc>
+              </a:tr>
+            </a:tbl>
+          </a:graphicData>
+        </a:graphic>
+      </p:graphicFrame>
+    </p:spTree>
+    <p:extLst>
+      <p:ext uri="{BB962C8B-B14F-4D97-AF65-F5344CB8AC3E}">
+        <p14:creationId xmlns:p14="http://schemas.microsoft.com/office/powerpoint/2010/main" val="2273078145"/>
+      </p:ext>
+    </p:extLst>
+  </p:cSld>
+  <p:clrMapOvr>
+    <a:masterClrMapping/>
+  </p:clrMapOvr>
+  <p:timing>
+    <p:tnLst>
+      <p:par>
+        <p:cTn id="1" dur="indefinite" restart="never" nodeType="tmRoot"/>
+      </p:par>
+    </p:tnLst>
+  </p:timing>
+</p:sld>
+</file>
+
+<file path=ppt/slides/slide94.xml><?xml version="1.0" encoding="utf-8"?>
+<p:sld xmlns:a="http://schemas.openxmlformats.org/drawingml/2006/main" xmlns:r="http://schemas.openxmlformats.org/officeDocument/2006/relationships" xmlns:p="http://schemas.openxmlformats.org/presentationml/2006/main">
+  <p:cSld>
+    <p:spTree>
+      <p:nvGrpSpPr>
+        <p:cNvPr id="1" name=""/>
+        <p:cNvGrpSpPr/>
+        <p:nvPr/>
+      </p:nvGrpSpPr>
+      <p:grpSpPr>
+        <a:xfrm>
+          <a:off x="0" y="0"/>
+          <a:ext cx="0" cy="0"/>
+          <a:chOff x="0" y="0"/>
+          <a:chExt cx="0" cy="0"/>
+        </a:xfrm>
+      </p:grpSpPr>
+      <p:sp>
+        <p:nvSpPr>
+          <p:cNvPr id="2" name="Title 1"/>
+          <p:cNvSpPr>
+            <a:spLocks noGrp="1"/>
+          </p:cNvSpPr>
+          <p:nvPr>
+            <p:ph type="title"/>
+          </p:nvPr>
+        </p:nvSpPr>
+        <p:spPr/>
+        <p:txBody>
+          <a:bodyPr>
+            <a:normAutofit fontScale="90000"/>
+          </a:bodyPr>
+          <a:lstStyle/>
+          <a:p>
+            <a:r>
+              <a:rPr lang="en-US" smtClean="0"/>
+              <a:t>References</a:t>
+            </a:r>
+            <a:br>
+              <a:rPr lang="en-US" smtClean="0"/>
+            </a:br>
+            <a:endParaRPr lang="en-US" dirty="0"/>
+          </a:p>
+        </p:txBody>
+      </p:sp>
+      <p:sp>
+        <p:nvSpPr>
+          <p:cNvPr id="3" name="Content Placeholder 2"/>
+          <p:cNvSpPr>
+            <a:spLocks noGrp="1"/>
+          </p:cNvSpPr>
+          <p:nvPr>
+            <p:ph idx="1"/>
+          </p:nvPr>
+        </p:nvSpPr>
+        <p:spPr>
+          <a:xfrm>
+            <a:off x="323528" y="1124744"/>
+            <a:ext cx="8229600" cy="4525963"/>
+          </a:xfrm>
+        </p:spPr>
+        <p:txBody>
+          <a:bodyPr>
+            <a:normAutofit/>
+          </a:bodyPr>
+          <a:lstStyle/>
+          <a:p>
+            <a:pPr marL="457200" lvl="1" indent="0">
+              <a:buNone/>
+            </a:pPr>
+            <a:r>
+              <a:rPr lang="en-US" sz="1600" dirty="0"/>
+              <a:t>https://kafka.apache.org/28/documentation/streams/developer-guide/dsl-api.html</a:t>
+            </a:r>
+            <a:endParaRPr lang="en-US" sz="1600" dirty="0" smtClean="0"/>
+          </a:p>
+        </p:txBody>
+      </p:sp>
+    </p:spTree>
+    <p:extLst>
+      <p:ext uri="{BB962C8B-B14F-4D97-AF65-F5344CB8AC3E}">
+        <p14:creationId xmlns:p14="http://schemas.microsoft.com/office/powerpoint/2010/main" val="3689297232"/>
       </p:ext>
     </p:extLst>
   </p:cSld>

</xml_diff>